<commit_message>
Added mood boards to presentation.
</commit_message>
<xml_diff>
--- a/Presentation/Pitch Presentation_Group 19.pptx
+++ b/Presentation/Pitch Presentation_Group 19.pptx
@@ -5,7 +5,7 @@
     <p:sldMasterId id="2147483672" r:id="rId1"/>
   </p:sldMasterIdLst>
   <p:notesMasterIdLst>
-    <p:notesMasterId r:id="rId19"/>
+    <p:notesMasterId r:id="rId20"/>
   </p:notesMasterIdLst>
   <p:sldIdLst>
     <p:sldId id="256" r:id="rId2"/>
@@ -14,17 +14,18 @@
     <p:sldId id="282" r:id="rId5"/>
     <p:sldId id="270" r:id="rId6"/>
     <p:sldId id="285" r:id="rId7"/>
-    <p:sldId id="279" r:id="rId8"/>
-    <p:sldId id="280" r:id="rId9"/>
-    <p:sldId id="283" r:id="rId10"/>
-    <p:sldId id="284" r:id="rId11"/>
-    <p:sldId id="287" r:id="rId12"/>
-    <p:sldId id="286" r:id="rId13"/>
-    <p:sldId id="288" r:id="rId14"/>
-    <p:sldId id="276" r:id="rId15"/>
-    <p:sldId id="274" r:id="rId16"/>
-    <p:sldId id="258" r:id="rId17"/>
-    <p:sldId id="289" r:id="rId18"/>
+    <p:sldId id="290" r:id="rId8"/>
+    <p:sldId id="291" r:id="rId9"/>
+    <p:sldId id="279" r:id="rId10"/>
+    <p:sldId id="280" r:id="rId11"/>
+    <p:sldId id="283" r:id="rId12"/>
+    <p:sldId id="284" r:id="rId13"/>
+    <p:sldId id="287" r:id="rId14"/>
+    <p:sldId id="286" r:id="rId15"/>
+    <p:sldId id="288" r:id="rId16"/>
+    <p:sldId id="276" r:id="rId17"/>
+    <p:sldId id="274" r:id="rId18"/>
+    <p:sldId id="289" r:id="rId19"/>
   </p:sldIdLst>
   <p:sldSz cx="9144000" cy="6858000" type="screen4x3"/>
   <p:notesSz cx="6858000" cy="9144000"/>
@@ -125,7 +126,7 @@
   </p:defaultTextStyle>
   <p:extLst>
     <p:ext uri="{EFAFB233-063F-42B5-8137-9DF3F51BA10A}">
-      <p15:sldGuideLst xmlns:p15="http://schemas.microsoft.com/office/powerpoint/2012/main" xmlns="">
+      <p15:sldGuideLst xmlns:p15="http://schemas.microsoft.com/office/powerpoint/2012/main">
         <p15:guide id="1" orient="horz" pos="2160">
           <p15:clr>
             <a:srgbClr val="A4A3A4"/>
@@ -225,7 +226,7 @@
             <a:fld id="{54E11888-2561-4C59-8BD9-531820C31256}" type="datetimeFigureOut">
               <a:rPr lang="en-GB" smtClean="0"/>
               <a:pPr/>
-              <a:t>30/01/2017</a:t>
+              <a:t>31/01/2017</a:t>
             </a:fld>
             <a:endParaRPr lang="en-GB"/>
           </a:p>
@@ -396,7 +397,7 @@
     </p:spTree>
     <p:extLst>
       <p:ext uri="{BB962C8B-B14F-4D97-AF65-F5344CB8AC3E}">
-        <p14:creationId xmlns:p14="http://schemas.microsoft.com/office/powerpoint/2010/main" xmlns="" val="1056751185"/>
+        <p14:creationId xmlns:p14="http://schemas.microsoft.com/office/powerpoint/2010/main" val="1056751185"/>
       </p:ext>
     </p:extLst>
   </p:cSld>
@@ -548,7 +549,6 @@
               <a:rPr lang="en-GB" baseline="0" dirty="0" smtClean="0"/>
               <a:t>Welcome to the pitch presentation of group 19.</a:t>
             </a:r>
-            <a:endParaRPr lang="en-GB" baseline="0" dirty="0" smtClean="0"/>
           </a:p>
           <a:p>
             <a:pPr marL="171450" indent="-171450">
@@ -557,13 +557,8 @@
             </a:pPr>
             <a:r>
               <a:rPr lang="en-GB" baseline="0" dirty="0" smtClean="0"/>
-              <a:t>I am : </a:t>
-            </a:r>
-            <a:r>
-              <a:rPr lang="en-GB" baseline="0" dirty="0" smtClean="0"/>
-              <a:t>state names</a:t>
-            </a:r>
-            <a:endParaRPr lang="en-GB" baseline="0" dirty="0" smtClean="0"/>
+              <a:t>I am : state names</a:t>
+            </a:r>
           </a:p>
           <a:p>
             <a:pPr marL="171450" indent="-171450">
@@ -601,7 +596,7 @@
     </p:spTree>
     <p:extLst>
       <p:ext uri="{BB962C8B-B14F-4D97-AF65-F5344CB8AC3E}">
-        <p14:creationId xmlns:p14="http://schemas.microsoft.com/office/powerpoint/2010/main" xmlns="" val="2232695328"/>
+        <p14:creationId xmlns:p14="http://schemas.microsoft.com/office/powerpoint/2010/main" val="2232695328"/>
       </p:ext>
     </p:extLst>
   </p:cSld>
@@ -692,7 +687,7 @@
     </p:spTree>
     <p:extLst>
       <p:ext uri="{BB962C8B-B14F-4D97-AF65-F5344CB8AC3E}">
-        <p14:creationId xmlns:p14="http://schemas.microsoft.com/office/powerpoint/2010/main" xmlns="" val="2389549365"/>
+        <p14:creationId xmlns:p14="http://schemas.microsoft.com/office/powerpoint/2010/main" val="2389549365"/>
       </p:ext>
     </p:extLst>
   </p:cSld>
@@ -783,7 +778,7 @@
     </p:spTree>
     <p:extLst>
       <p:ext uri="{BB962C8B-B14F-4D97-AF65-F5344CB8AC3E}">
-        <p14:creationId xmlns:p14="http://schemas.microsoft.com/office/powerpoint/2010/main" xmlns="" val="2389549365"/>
+        <p14:creationId xmlns:p14="http://schemas.microsoft.com/office/powerpoint/2010/main" val="2389549365"/>
       </p:ext>
     </p:extLst>
   </p:cSld>
@@ -841,7 +836,7 @@
           <a:p>
             <a:pPr>
               <a:buFont typeface="Arial" pitchFamily="34" charset="0"/>
-              <a:buChar char="•"/>
+              <a:buNone/>
             </a:pPr>
             <a:endParaRPr lang="en-GB" baseline="0" dirty="0" smtClean="0"/>
           </a:p>
@@ -874,7 +869,7 @@
     </p:spTree>
     <p:extLst>
       <p:ext uri="{BB962C8B-B14F-4D97-AF65-F5344CB8AC3E}">
-        <p14:creationId xmlns:p14="http://schemas.microsoft.com/office/powerpoint/2010/main" xmlns="" val="2389549365"/>
+        <p14:creationId xmlns:p14="http://schemas.microsoft.com/office/powerpoint/2010/main" val="2389549365"/>
       </p:ext>
     </p:extLst>
   </p:cSld>
@@ -932,7 +927,7 @@
           <a:p>
             <a:pPr>
               <a:buFont typeface="Arial" pitchFamily="34" charset="0"/>
-              <a:buChar char="•"/>
+              <a:buNone/>
             </a:pPr>
             <a:endParaRPr lang="en-GB" baseline="0" dirty="0" smtClean="0"/>
           </a:p>
@@ -965,7 +960,7 @@
     </p:spTree>
     <p:extLst>
       <p:ext uri="{BB962C8B-B14F-4D97-AF65-F5344CB8AC3E}">
-        <p14:creationId xmlns:p14="http://schemas.microsoft.com/office/powerpoint/2010/main" xmlns="" val="2389549365"/>
+        <p14:creationId xmlns:p14="http://schemas.microsoft.com/office/powerpoint/2010/main" val="2389549365"/>
       </p:ext>
     </p:extLst>
   </p:cSld>
@@ -1021,46 +1016,11 @@
           </a:bodyPr>
           <a:lstStyle/>
           <a:p>
-            <a:r>
-              <a:rPr lang="en-GB" dirty="0" smtClean="0"/>
-              <a:t>Hard fun : Goals Obstacles and Stratergy</a:t>
-            </a:r>
-            <a:r>
-              <a:rPr lang="en-GB" baseline="0" dirty="0" smtClean="0"/>
-              <a:t> </a:t>
-            </a:r>
-          </a:p>
-          <a:p>
+            <a:pPr>
+              <a:buFont typeface="Arial" pitchFamily="34" charset="0"/>
+              <a:buChar char="•"/>
+            </a:pPr>
             <a:endParaRPr lang="en-GB" baseline="0" dirty="0" smtClean="0"/>
-          </a:p>
-          <a:p>
-            <a:r>
-              <a:rPr lang="en-GB" dirty="0" smtClean="0"/>
-              <a:t>People fun: Compete, this</a:t>
-            </a:r>
-            <a:r>
-              <a:rPr lang="en-GB" baseline="0" dirty="0" smtClean="0"/>
-              <a:t> creates an amusment emotion </a:t>
-            </a:r>
-          </a:p>
-          <a:p>
-            <a:endParaRPr lang="en-GB" baseline="0" dirty="0" smtClean="0"/>
-          </a:p>
-          <a:p>
-            <a:r>
-              <a:rPr lang="en-GB" baseline="0" dirty="0" smtClean="0"/>
-              <a:t>Serious fun: </a:t>
-            </a:r>
-          </a:p>
-          <a:p>
-            <a:endParaRPr lang="en-GB" baseline="0" dirty="0" smtClean="0"/>
-          </a:p>
-          <a:p>
-            <a:r>
-              <a:rPr lang="en-GB" baseline="0" dirty="0" smtClean="0"/>
-              <a:t>Repition, rythm  this creates excitment </a:t>
-            </a:r>
-            <a:endParaRPr lang="en-GB" dirty="0"/>
           </a:p>
         </p:txBody>
       </p:sp>
@@ -1089,6 +1049,11 @@
         </p:txBody>
       </p:sp>
     </p:spTree>
+    <p:extLst>
+      <p:ext uri="{BB962C8B-B14F-4D97-AF65-F5344CB8AC3E}">
+        <p14:creationId xmlns:p14="http://schemas.microsoft.com/office/powerpoint/2010/main" val="2389549365"/>
+      </p:ext>
+    </p:extLst>
   </p:cSld>
   <p:clrMapOvr>
     <a:masterClrMapping/>
@@ -1146,14 +1111,7 @@
               <a:buFont typeface="Arial" pitchFamily="34" charset="0"/>
               <a:buChar char="•"/>
             </a:pPr>
-            <a:endParaRPr lang="en-GB" dirty="0" smtClean="0"/>
-          </a:p>
-          <a:p>
-            <a:pPr>
-              <a:buFont typeface="Arial" pitchFamily="34" charset="0"/>
-              <a:buChar char="•"/>
-            </a:pPr>
-            <a:endParaRPr lang="en-GB" dirty="0"/>
+            <a:endParaRPr lang="en-GB" baseline="0" dirty="0" smtClean="0"/>
           </a:p>
         </p:txBody>
       </p:sp>
@@ -1184,7 +1142,7 @@
     </p:spTree>
     <p:extLst>
       <p:ext uri="{BB962C8B-B14F-4D97-AF65-F5344CB8AC3E}">
-        <p14:creationId xmlns:p14="http://schemas.microsoft.com/office/powerpoint/2010/main" xmlns="" val="3554389044"/>
+        <p14:creationId xmlns:p14="http://schemas.microsoft.com/office/powerpoint/2010/main" val="2389549365"/>
       </p:ext>
     </p:extLst>
   </p:cSld>
@@ -1240,10 +1198,45 @@
           </a:bodyPr>
           <a:lstStyle/>
           <a:p>
-            <a:pPr>
-              <a:buFont typeface="Arial" pitchFamily="34" charset="0"/>
-              <a:buChar char="•"/>
-            </a:pPr>
+            <a:r>
+              <a:rPr lang="en-GB" dirty="0" smtClean="0"/>
+              <a:t>Hard fun : Goals Obstacles and Stratergy</a:t>
+            </a:r>
+            <a:r>
+              <a:rPr lang="en-GB" baseline="0" dirty="0" smtClean="0"/>
+              <a:t> </a:t>
+            </a:r>
+          </a:p>
+          <a:p>
+            <a:endParaRPr lang="en-GB" baseline="0" dirty="0" smtClean="0"/>
+          </a:p>
+          <a:p>
+            <a:r>
+              <a:rPr lang="en-GB" dirty="0" smtClean="0"/>
+              <a:t>People fun: Compete, this</a:t>
+            </a:r>
+            <a:r>
+              <a:rPr lang="en-GB" baseline="0" dirty="0" smtClean="0"/>
+              <a:t> creates an amusment emotion </a:t>
+            </a:r>
+          </a:p>
+          <a:p>
+            <a:endParaRPr lang="en-GB" baseline="0" dirty="0" smtClean="0"/>
+          </a:p>
+          <a:p>
+            <a:r>
+              <a:rPr lang="en-GB" baseline="0" dirty="0" smtClean="0"/>
+              <a:t>Serious fun: </a:t>
+            </a:r>
+          </a:p>
+          <a:p>
+            <a:endParaRPr lang="en-GB" baseline="0" dirty="0" smtClean="0"/>
+          </a:p>
+          <a:p>
+            <a:r>
+              <a:rPr lang="en-GB" baseline="0" dirty="0" smtClean="0"/>
+              <a:t>Repition, rythm  this creates excitment </a:t>
+            </a:r>
             <a:endParaRPr lang="en-GB" dirty="0"/>
           </a:p>
         </p:txBody>
@@ -1275,7 +1268,7 @@
     </p:spTree>
     <p:extLst>
       <p:ext uri="{BB962C8B-B14F-4D97-AF65-F5344CB8AC3E}">
-        <p14:creationId xmlns:p14="http://schemas.microsoft.com/office/powerpoint/2010/main" xmlns="" val="1312158051"/>
+        <p14:creationId xmlns:p14="http://schemas.microsoft.com/office/powerpoint/2010/main" val="2267549056"/>
       </p:ext>
     </p:extLst>
   </p:cSld>
@@ -1335,6 +1328,13 @@
               <a:buFont typeface="Arial" pitchFamily="34" charset="0"/>
               <a:buChar char="•"/>
             </a:pPr>
+            <a:endParaRPr lang="en-GB" dirty="0" smtClean="0"/>
+          </a:p>
+          <a:p>
+            <a:pPr>
+              <a:buFont typeface="Arial" pitchFamily="34" charset="0"/>
+              <a:buChar char="•"/>
+            </a:pPr>
             <a:endParaRPr lang="en-GB" dirty="0"/>
           </a:p>
         </p:txBody>
@@ -1366,7 +1366,98 @@
     </p:spTree>
     <p:extLst>
       <p:ext uri="{BB962C8B-B14F-4D97-AF65-F5344CB8AC3E}">
-        <p14:creationId xmlns:p14="http://schemas.microsoft.com/office/powerpoint/2010/main" xmlns="" val="1312158051"/>
+        <p14:creationId xmlns:p14="http://schemas.microsoft.com/office/powerpoint/2010/main" val="3554389044"/>
+      </p:ext>
+    </p:extLst>
+  </p:cSld>
+  <p:clrMapOvr>
+    <a:masterClrMapping/>
+  </p:clrMapOvr>
+</p:notes>
+</file>
+
+<file path=ppt/notesSlides/notesSlide18.xml><?xml version="1.0" encoding="utf-8"?>
+<p:notes xmlns:a="http://schemas.openxmlformats.org/drawingml/2006/main" xmlns:r="http://schemas.openxmlformats.org/officeDocument/2006/relationships" xmlns:p="http://schemas.openxmlformats.org/presentationml/2006/main">
+  <p:cSld>
+    <p:spTree>
+      <p:nvGrpSpPr>
+        <p:cNvPr id="1" name=""/>
+        <p:cNvGrpSpPr/>
+        <p:nvPr/>
+      </p:nvGrpSpPr>
+      <p:grpSpPr>
+        <a:xfrm>
+          <a:off x="0" y="0"/>
+          <a:ext cx="0" cy="0"/>
+          <a:chOff x="0" y="0"/>
+          <a:chExt cx="0" cy="0"/>
+        </a:xfrm>
+      </p:grpSpPr>
+      <p:sp>
+        <p:nvSpPr>
+          <p:cNvPr id="2" name="Slide Image Placeholder 1"/>
+          <p:cNvSpPr>
+            <a:spLocks noGrp="1" noRot="1" noChangeAspect="1"/>
+          </p:cNvSpPr>
+          <p:nvPr>
+            <p:ph type="sldImg"/>
+          </p:nvPr>
+        </p:nvSpPr>
+        <p:spPr/>
+      </p:sp>
+      <p:sp>
+        <p:nvSpPr>
+          <p:cNvPr id="3" name="Notes Placeholder 2"/>
+          <p:cNvSpPr>
+            <a:spLocks noGrp="1"/>
+          </p:cNvSpPr>
+          <p:nvPr>
+            <p:ph type="body" idx="1"/>
+          </p:nvPr>
+        </p:nvSpPr>
+        <p:spPr/>
+        <p:txBody>
+          <a:bodyPr>
+            <a:normAutofit/>
+          </a:bodyPr>
+          <a:lstStyle/>
+          <a:p>
+            <a:pPr>
+              <a:buFont typeface="Arial" pitchFamily="34" charset="0"/>
+              <a:buChar char="•"/>
+            </a:pPr>
+            <a:endParaRPr lang="en-GB" dirty="0"/>
+          </a:p>
+        </p:txBody>
+      </p:sp>
+      <p:sp>
+        <p:nvSpPr>
+          <p:cNvPr id="4" name="Slide Number Placeholder 3"/>
+          <p:cNvSpPr>
+            <a:spLocks noGrp="1"/>
+          </p:cNvSpPr>
+          <p:nvPr>
+            <p:ph type="sldNum" sz="quarter" idx="10"/>
+          </p:nvPr>
+        </p:nvSpPr>
+        <p:spPr/>
+        <p:txBody>
+          <a:bodyPr/>
+          <a:lstStyle/>
+          <a:p>
+            <a:fld id="{45F5CB74-F2DC-437A-814C-76C01E4A5836}" type="slidenum">
+              <a:rPr lang="en-GB" smtClean="0"/>
+              <a:pPr/>
+              <a:t>18</a:t>
+            </a:fld>
+            <a:endParaRPr lang="en-GB"/>
+          </a:p>
+        </p:txBody>
+      </p:sp>
+    </p:spTree>
+    <p:extLst>
+      <p:ext uri="{BB962C8B-B14F-4D97-AF65-F5344CB8AC3E}">
+        <p14:creationId xmlns:p14="http://schemas.microsoft.com/office/powerpoint/2010/main" val="1312158051"/>
       </p:ext>
     </p:extLst>
   </p:cSld>
@@ -1457,7 +1548,7 @@
     </p:spTree>
     <p:extLst>
       <p:ext uri="{BB962C8B-B14F-4D97-AF65-F5344CB8AC3E}">
-        <p14:creationId xmlns:p14="http://schemas.microsoft.com/office/powerpoint/2010/main" xmlns="" val="2389549365"/>
+        <p14:creationId xmlns:p14="http://schemas.microsoft.com/office/powerpoint/2010/main" val="2389549365"/>
       </p:ext>
     </p:extLst>
   </p:cSld>
@@ -1660,7 +1751,7 @@
     </p:spTree>
     <p:extLst>
       <p:ext uri="{BB962C8B-B14F-4D97-AF65-F5344CB8AC3E}">
-        <p14:creationId xmlns:p14="http://schemas.microsoft.com/office/powerpoint/2010/main" xmlns="" val="2389549365"/>
+        <p14:creationId xmlns:p14="http://schemas.microsoft.com/office/powerpoint/2010/main" val="2389549365"/>
       </p:ext>
     </p:extLst>
   </p:cSld>
@@ -1788,7 +1879,7 @@
     </p:spTree>
     <p:extLst>
       <p:ext uri="{BB962C8B-B14F-4D97-AF65-F5344CB8AC3E}">
-        <p14:creationId xmlns:p14="http://schemas.microsoft.com/office/powerpoint/2010/main" xmlns="" val="2389549365"/>
+        <p14:creationId xmlns:p14="http://schemas.microsoft.com/office/powerpoint/2010/main" val="2389549365"/>
       </p:ext>
     </p:extLst>
   </p:cSld>
@@ -1935,7 +2026,7 @@
     </p:spTree>
     <p:extLst>
       <p:ext uri="{BB962C8B-B14F-4D97-AF65-F5344CB8AC3E}">
-        <p14:creationId xmlns:p14="http://schemas.microsoft.com/office/powerpoint/2010/main" xmlns="" val="2509897375"/>
+        <p14:creationId xmlns:p14="http://schemas.microsoft.com/office/powerpoint/2010/main" val="2509897375"/>
       </p:ext>
     </p:extLst>
   </p:cSld>
@@ -2026,7 +2117,7 @@
     </p:spTree>
     <p:extLst>
       <p:ext uri="{BB962C8B-B14F-4D97-AF65-F5344CB8AC3E}">
-        <p14:creationId xmlns:p14="http://schemas.microsoft.com/office/powerpoint/2010/main" xmlns="" val="2389549365"/>
+        <p14:creationId xmlns:p14="http://schemas.microsoft.com/office/powerpoint/2010/main" val="2389549365"/>
       </p:ext>
     </p:extLst>
   </p:cSld>
@@ -2084,7 +2175,7 @@
           <a:p>
             <a:pPr>
               <a:buFont typeface="Arial" pitchFamily="34" charset="0"/>
-              <a:buNone/>
+              <a:buChar char="•"/>
             </a:pPr>
             <a:endParaRPr lang="en-GB" baseline="0" dirty="0" smtClean="0"/>
           </a:p>
@@ -2117,7 +2208,7 @@
     </p:spTree>
     <p:extLst>
       <p:ext uri="{BB962C8B-B14F-4D97-AF65-F5344CB8AC3E}">
-        <p14:creationId xmlns:p14="http://schemas.microsoft.com/office/powerpoint/2010/main" xmlns="" val="2389549365"/>
+        <p14:creationId xmlns:p14="http://schemas.microsoft.com/office/powerpoint/2010/main" val="2429582578"/>
       </p:ext>
     </p:extLst>
   </p:cSld>
@@ -2175,7 +2266,7 @@
           <a:p>
             <a:pPr>
               <a:buFont typeface="Arial" pitchFamily="34" charset="0"/>
-              <a:buNone/>
+              <a:buChar char="•"/>
             </a:pPr>
             <a:endParaRPr lang="en-GB" baseline="0" dirty="0" smtClean="0"/>
           </a:p>
@@ -2208,7 +2299,7 @@
     </p:spTree>
     <p:extLst>
       <p:ext uri="{BB962C8B-B14F-4D97-AF65-F5344CB8AC3E}">
-        <p14:creationId xmlns:p14="http://schemas.microsoft.com/office/powerpoint/2010/main" xmlns="" val="2389549365"/>
+        <p14:creationId xmlns:p14="http://schemas.microsoft.com/office/powerpoint/2010/main" val="623160091"/>
       </p:ext>
     </p:extLst>
   </p:cSld>
@@ -2299,7 +2390,7 @@
     </p:spTree>
     <p:extLst>
       <p:ext uri="{BB962C8B-B14F-4D97-AF65-F5344CB8AC3E}">
-        <p14:creationId xmlns:p14="http://schemas.microsoft.com/office/powerpoint/2010/main" xmlns="" val="2389549365"/>
+        <p14:creationId xmlns:p14="http://schemas.microsoft.com/office/powerpoint/2010/main" val="2389549365"/>
       </p:ext>
     </p:extLst>
   </p:cSld>
@@ -2491,7 +2582,7 @@
             <a:fld id="{2DD3E666-6866-4DCE-9CAE-3D4208D50481}" type="datetimeFigureOut">
               <a:rPr lang="en-GB" smtClean="0"/>
               <a:pPr/>
-              <a:t>30/01/2017</a:t>
+              <a:t>31/01/2017</a:t>
             </a:fld>
             <a:endParaRPr lang="en-GB"/>
           </a:p>
@@ -2658,7 +2749,7 @@
             <a:fld id="{2DD3E666-6866-4DCE-9CAE-3D4208D50481}" type="datetimeFigureOut">
               <a:rPr lang="en-GB" smtClean="0"/>
               <a:pPr/>
-              <a:t>30/01/2017</a:t>
+              <a:t>31/01/2017</a:t>
             </a:fld>
             <a:endParaRPr lang="en-GB"/>
           </a:p>
@@ -2835,7 +2926,7 @@
             <a:fld id="{2DD3E666-6866-4DCE-9CAE-3D4208D50481}" type="datetimeFigureOut">
               <a:rPr lang="en-GB" smtClean="0"/>
               <a:pPr/>
-              <a:t>30/01/2017</a:t>
+              <a:t>31/01/2017</a:t>
             </a:fld>
             <a:endParaRPr lang="en-GB"/>
           </a:p>
@@ -3002,7 +3093,7 @@
             <a:fld id="{2DD3E666-6866-4DCE-9CAE-3D4208D50481}" type="datetimeFigureOut">
               <a:rPr lang="en-GB" smtClean="0"/>
               <a:pPr/>
-              <a:t>30/01/2017</a:t>
+              <a:t>31/01/2017</a:t>
             </a:fld>
             <a:endParaRPr lang="en-GB"/>
           </a:p>
@@ -3245,7 +3336,7 @@
             <a:fld id="{2DD3E666-6866-4DCE-9CAE-3D4208D50481}" type="datetimeFigureOut">
               <a:rPr lang="en-GB" smtClean="0"/>
               <a:pPr/>
-              <a:t>30/01/2017</a:t>
+              <a:t>31/01/2017</a:t>
             </a:fld>
             <a:endParaRPr lang="en-GB"/>
           </a:p>
@@ -3530,7 +3621,7 @@
             <a:fld id="{2DD3E666-6866-4DCE-9CAE-3D4208D50481}" type="datetimeFigureOut">
               <a:rPr lang="en-GB" smtClean="0"/>
               <a:pPr/>
-              <a:t>30/01/2017</a:t>
+              <a:t>31/01/2017</a:t>
             </a:fld>
             <a:endParaRPr lang="en-GB"/>
           </a:p>
@@ -3949,7 +4040,7 @@
             <a:fld id="{2DD3E666-6866-4DCE-9CAE-3D4208D50481}" type="datetimeFigureOut">
               <a:rPr lang="en-GB" smtClean="0"/>
               <a:pPr/>
-              <a:t>30/01/2017</a:t>
+              <a:t>31/01/2017</a:t>
             </a:fld>
             <a:endParaRPr lang="en-GB"/>
           </a:p>
@@ -4064,7 +4155,7 @@
             <a:fld id="{2DD3E666-6866-4DCE-9CAE-3D4208D50481}" type="datetimeFigureOut">
               <a:rPr lang="en-GB" smtClean="0"/>
               <a:pPr/>
-              <a:t>30/01/2017</a:t>
+              <a:t>31/01/2017</a:t>
             </a:fld>
             <a:endParaRPr lang="en-GB"/>
           </a:p>
@@ -4156,7 +4247,7 @@
             <a:fld id="{2DD3E666-6866-4DCE-9CAE-3D4208D50481}" type="datetimeFigureOut">
               <a:rPr lang="en-GB" smtClean="0"/>
               <a:pPr/>
-              <a:t>30/01/2017</a:t>
+              <a:t>31/01/2017</a:t>
             </a:fld>
             <a:endParaRPr lang="en-GB"/>
           </a:p>
@@ -4430,7 +4521,7 @@
             <a:fld id="{2DD3E666-6866-4DCE-9CAE-3D4208D50481}" type="datetimeFigureOut">
               <a:rPr lang="en-GB" smtClean="0"/>
               <a:pPr/>
-              <a:t>30/01/2017</a:t>
+              <a:t>31/01/2017</a:t>
             </a:fld>
             <a:endParaRPr lang="en-GB"/>
           </a:p>
@@ -4680,7 +4771,7 @@
             <a:fld id="{2DD3E666-6866-4DCE-9CAE-3D4208D50481}" type="datetimeFigureOut">
               <a:rPr lang="en-GB" smtClean="0"/>
               <a:pPr/>
-              <a:t>30/01/2017</a:t>
+              <a:t>31/01/2017</a:t>
             </a:fld>
             <a:endParaRPr lang="en-GB"/>
           </a:p>
@@ -4890,7 +4981,7 @@
             <a:fld id="{2DD3E666-6866-4DCE-9CAE-3D4208D50481}" type="datetimeFigureOut">
               <a:rPr lang="en-GB" smtClean="0"/>
               <a:pPr/>
-              <a:t>30/01/2017</a:t>
+              <a:t>31/01/2017</a:t>
             </a:fld>
             <a:endParaRPr lang="en-GB"/>
           </a:p>
@@ -5293,13 +5384,8 @@
             <a:pPr algn="ctr"/>
             <a:r>
               <a:rPr lang="en-GB" sz="7200" dirty="0" smtClean="0"/>
-              <a:t>Level 4/5 Group </a:t>
-            </a:r>
-            <a:r>
-              <a:rPr lang="en-GB" sz="7200" dirty="0" smtClean="0"/>
-              <a:t>19 </a:t>
-            </a:r>
-            <a:endParaRPr lang="en-GB" sz="7200" dirty="0" smtClean="0"/>
+              <a:t>Level 4/5 Group 19 </a:t>
+            </a:r>
           </a:p>
           <a:p>
             <a:endParaRPr lang="en-GB" sz="7200" dirty="0"/>
@@ -5347,7 +5433,6 @@
               <a:rPr lang="en-GB" sz="2400" dirty="0" smtClean="0"/>
               <a:t>Samuel Ormondroyd</a:t>
             </a:r>
-            <a:endParaRPr lang="en-GB" sz="2400" dirty="0" smtClean="0"/>
           </a:p>
           <a:p>
             <a:endParaRPr lang="en-GB" dirty="0"/>
@@ -5379,7 +5464,7 @@
         </p:blipFill>
         <p:spPr bwMode="auto">
           <a:xfrm>
-            <a:off x="2915816" y="4293096"/>
+            <a:off x="3131840" y="4293096"/>
             <a:ext cx="1843088" cy="1819275"/>
           </a:xfrm>
           <a:prstGeom prst="rect">
@@ -5413,7 +5498,7 @@
         </p:blipFill>
         <p:spPr bwMode="auto">
           <a:xfrm>
-            <a:off x="4932040" y="4365104"/>
+            <a:off x="5148064" y="4365104"/>
             <a:ext cx="1843088" cy="1819275"/>
           </a:xfrm>
           <a:prstGeom prst="rect">
@@ -5447,7 +5532,7 @@
         </p:blipFill>
         <p:spPr bwMode="auto">
           <a:xfrm>
-            <a:off x="6876256" y="4293096"/>
+            <a:off x="7092280" y="4293096"/>
             <a:ext cx="1843088" cy="1819275"/>
           </a:xfrm>
           <a:prstGeom prst="rect">
@@ -5521,13 +5606,98 @@
       </p:sp>
       <p:sp>
         <p:nvSpPr>
+          <p:cNvPr id="6" name="TextBox 5"/>
+          <p:cNvSpPr txBox="1"/>
+          <p:nvPr/>
+        </p:nvSpPr>
+        <p:spPr>
+          <a:xfrm>
+            <a:off x="539552" y="2703016"/>
+            <a:ext cx="7992888" cy="4154984"/>
+          </a:xfrm>
+          <a:prstGeom prst="rect">
+            <a:avLst/>
+          </a:prstGeom>
+          <a:noFill/>
+        </p:spPr>
+        <p:txBody>
+          <a:bodyPr wrap="square" rtlCol="0">
+            <a:spAutoFit/>
+          </a:bodyPr>
+          <a:lstStyle/>
+          <a:p>
+            <a:pPr>
+              <a:buFont typeface="Arial" pitchFamily="34" charset="0"/>
+              <a:buChar char="•"/>
+            </a:pPr>
+            <a:r>
+              <a:rPr lang="en-GB" sz="2400" dirty="0" smtClean="0"/>
+              <a:t>Players can use the stamina to either thrust bird upwards or forwards. </a:t>
+            </a:r>
+          </a:p>
+          <a:p>
+            <a:pPr>
+              <a:buFont typeface="Arial" pitchFamily="34" charset="0"/>
+              <a:buChar char="•"/>
+            </a:pPr>
+            <a:endParaRPr lang="en-GB" sz="2400" dirty="0" smtClean="0"/>
+          </a:p>
+          <a:p>
+            <a:pPr>
+              <a:buFont typeface="Arial" pitchFamily="34" charset="0"/>
+              <a:buChar char="•"/>
+            </a:pPr>
+            <a:r>
+              <a:rPr lang="en-GB" sz="2400" dirty="0" smtClean="0"/>
+              <a:t>Thrusting forwards allows the bird to travel highter, thereby increasing the momentum of eventual impact. </a:t>
+            </a:r>
+          </a:p>
+          <a:p>
+            <a:pPr>
+              <a:buFont typeface="Arial" pitchFamily="34" charset="0"/>
+              <a:buChar char="•"/>
+            </a:pPr>
+            <a:endParaRPr lang="en-GB" sz="2400" dirty="0" smtClean="0"/>
+          </a:p>
+          <a:p>
+            <a:pPr>
+              <a:buFont typeface="Arial" pitchFamily="34" charset="0"/>
+              <a:buChar char="•"/>
+            </a:pPr>
+            <a:r>
+              <a:rPr lang="en-GB" sz="2400" dirty="0" smtClean="0"/>
+              <a:t>Players can trust be repeatedly pressing the allocated keys, which inturn causes a twich mechanic.</a:t>
+            </a:r>
+          </a:p>
+          <a:p>
+            <a:pPr>
+              <a:buFont typeface="Arial" pitchFamily="34" charset="0"/>
+              <a:buChar char="•"/>
+            </a:pPr>
+            <a:endParaRPr lang="en-GB" sz="2400" dirty="0" smtClean="0"/>
+          </a:p>
+          <a:p>
+            <a:pPr>
+              <a:buFont typeface="Arial" pitchFamily="34" charset="0"/>
+              <a:buChar char="•"/>
+            </a:pPr>
+            <a:r>
+              <a:rPr lang="en-GB" sz="2400" dirty="0" smtClean="0"/>
+              <a:t>The larger the momentum upon impact, the further the bird will recoil.  </a:t>
+            </a:r>
+            <a:endParaRPr lang="en-GB" sz="2400" dirty="0"/>
+          </a:p>
+        </p:txBody>
+      </p:sp>
+      <p:sp>
+        <p:nvSpPr>
           <p:cNvPr id="8" name="Rectangle 7"/>
           <p:cNvSpPr/>
           <p:nvPr/>
         </p:nvSpPr>
         <p:spPr>
           <a:xfrm>
-            <a:off x="611560" y="1196752"/>
+            <a:off x="539552" y="1334864"/>
             <a:ext cx="7992888" cy="1224136"/>
           </a:xfrm>
           <a:prstGeom prst="rect">
@@ -5536,15 +5706,15 @@
         </p:spPr>
         <p:style>
           <a:lnRef idx="2">
-            <a:schemeClr val="accent2">
+            <a:schemeClr val="accent5">
               <a:shade val="50000"/>
             </a:schemeClr>
           </a:lnRef>
           <a:fillRef idx="1">
-            <a:schemeClr val="accent2"/>
+            <a:schemeClr val="accent5"/>
           </a:fillRef>
           <a:effectRef idx="0">
-            <a:schemeClr val="accent2"/>
+            <a:schemeClr val="accent5"/>
           </a:effectRef>
           <a:fontRef idx="minor">
             <a:schemeClr val="lt1"/>
@@ -5560,104 +5730,6 @@
               <a:t>Prototype Showcase</a:t>
             </a:r>
             <a:endParaRPr lang="en-GB" dirty="0"/>
-          </a:p>
-        </p:txBody>
-      </p:sp>
-      <p:sp>
-        <p:nvSpPr>
-          <p:cNvPr id="5" name="TextBox 4"/>
-          <p:cNvSpPr txBox="1"/>
-          <p:nvPr/>
-        </p:nvSpPr>
-        <p:spPr>
-          <a:xfrm>
-            <a:off x="611560" y="2564904"/>
-            <a:ext cx="7992888" cy="4524315"/>
-          </a:xfrm>
-          <a:prstGeom prst="rect">
-            <a:avLst/>
-          </a:prstGeom>
-          <a:noFill/>
-        </p:spPr>
-        <p:txBody>
-          <a:bodyPr wrap="square" rtlCol="0">
-            <a:spAutoFit/>
-          </a:bodyPr>
-          <a:lstStyle/>
-          <a:p>
-            <a:pPr>
-              <a:buFont typeface="Arial" pitchFamily="34" charset="0"/>
-              <a:buChar char="•"/>
-            </a:pPr>
-            <a:r>
-              <a:rPr lang="en-GB" sz="2400" dirty="0" smtClean="0"/>
-              <a:t>Players may also use the thrust function to avoid geometry based obstacles that may affect the distance travelled. </a:t>
-            </a:r>
-          </a:p>
-          <a:p>
-            <a:pPr>
-              <a:buFont typeface="Arial" pitchFamily="34" charset="0"/>
-              <a:buChar char="•"/>
-            </a:pPr>
-            <a:endParaRPr lang="en-GB" sz="2400" dirty="0" smtClean="0"/>
-          </a:p>
-          <a:p>
-            <a:pPr>
-              <a:buFont typeface="Arial" pitchFamily="34" charset="0"/>
-              <a:buChar char="•"/>
-            </a:pPr>
-            <a:r>
-              <a:rPr lang="en-GB" sz="2400" dirty="0" smtClean="0"/>
-              <a:t>Once the players bird comes to a halt the distance travelled is calculated and stored leading into the next players turn. </a:t>
-            </a:r>
-          </a:p>
-          <a:p>
-            <a:pPr>
-              <a:buFont typeface="Arial" pitchFamily="34" charset="0"/>
-              <a:buChar char="•"/>
-            </a:pPr>
-            <a:endParaRPr lang="en-GB" sz="2400" dirty="0" smtClean="0"/>
-          </a:p>
-          <a:p>
-            <a:pPr>
-              <a:buFont typeface="Arial" pitchFamily="34" charset="0"/>
-              <a:buChar char="•"/>
-            </a:pPr>
-            <a:r>
-              <a:rPr lang="en-GB" sz="2400" dirty="0" smtClean="0"/>
-              <a:t>The player who travels the furthest wins the round. </a:t>
-            </a:r>
-          </a:p>
-          <a:p>
-            <a:pPr>
-              <a:buFont typeface="Arial" pitchFamily="34" charset="0"/>
-              <a:buChar char="•"/>
-            </a:pPr>
-            <a:endParaRPr lang="en-GB" sz="2400" dirty="0" smtClean="0"/>
-          </a:p>
-          <a:p>
-            <a:pPr>
-              <a:buFont typeface="Arial" pitchFamily="34" charset="0"/>
-              <a:buChar char="•"/>
-            </a:pPr>
-            <a:r>
-              <a:rPr lang="en-GB" sz="2400" dirty="0" smtClean="0"/>
-              <a:t>The game consist of three rounds, best two out three wins the game.</a:t>
-            </a:r>
-          </a:p>
-          <a:p>
-            <a:pPr>
-              <a:buFont typeface="Arial" pitchFamily="34" charset="0"/>
-              <a:buChar char="•"/>
-            </a:pPr>
-            <a:endParaRPr lang="en-GB" sz="2400" dirty="0" smtClean="0"/>
-          </a:p>
-          <a:p>
-            <a:pPr>
-              <a:buFont typeface="Arial" pitchFamily="34" charset="0"/>
-              <a:buChar char="•"/>
-            </a:pPr>
-            <a:endParaRPr lang="en-GB" sz="2400" dirty="0"/>
           </a:p>
         </p:txBody>
       </p:sp>
@@ -5695,13 +5767,44 @@
       </p:grpSpPr>
       <p:sp>
         <p:nvSpPr>
+          <p:cNvPr id="4" name="TextBox 3"/>
+          <p:cNvSpPr txBox="1"/>
+          <p:nvPr/>
+        </p:nvSpPr>
+        <p:spPr>
+          <a:xfrm>
+            <a:off x="467544" y="620688"/>
+            <a:ext cx="8208912" cy="584775"/>
+          </a:xfrm>
+          <a:prstGeom prst="rect">
+            <a:avLst/>
+          </a:prstGeom>
+          <a:noFill/>
+        </p:spPr>
+        <p:txBody>
+          <a:bodyPr wrap="square" rtlCol="0">
+            <a:spAutoFit/>
+          </a:bodyPr>
+          <a:lstStyle/>
+          <a:p>
+            <a:pPr algn="ctr"/>
+            <a:r>
+              <a:rPr lang="en-GB" sz="3200" dirty="0" smtClean="0"/>
+              <a:t>Game play and apperence </a:t>
+            </a:r>
+            <a:endParaRPr lang="en-GB" sz="3200" dirty="0"/>
+          </a:p>
+        </p:txBody>
+      </p:sp>
+      <p:sp>
+        <p:nvSpPr>
           <p:cNvPr id="8" name="Rectangle 7"/>
           <p:cNvSpPr/>
           <p:nvPr/>
         </p:nvSpPr>
         <p:spPr>
           <a:xfrm>
-            <a:off x="539552" y="2924944"/>
+            <a:off x="611560" y="1196752"/>
             <a:ext cx="7992888" cy="1224136"/>
           </a:xfrm>
           <a:prstGeom prst="rect">
@@ -5710,15 +5813,15 @@
         </p:spPr>
         <p:style>
           <a:lnRef idx="2">
-            <a:schemeClr val="accent1">
+            <a:schemeClr val="accent3">
               <a:shade val="50000"/>
             </a:schemeClr>
           </a:lnRef>
           <a:fillRef idx="1">
-            <a:schemeClr val="accent1"/>
+            <a:schemeClr val="accent3"/>
           </a:fillRef>
           <a:effectRef idx="0">
-            <a:schemeClr val="accent1"/>
+            <a:schemeClr val="accent3"/>
           </a:effectRef>
           <a:fontRef idx="minor">
             <a:schemeClr val="lt1"/>
@@ -5734,6 +5837,91 @@
               <a:t>Prototype Showcase</a:t>
             </a:r>
             <a:endParaRPr lang="en-GB" dirty="0"/>
+          </a:p>
+        </p:txBody>
+      </p:sp>
+      <p:sp>
+        <p:nvSpPr>
+          <p:cNvPr id="5" name="TextBox 4"/>
+          <p:cNvSpPr txBox="1"/>
+          <p:nvPr/>
+        </p:nvSpPr>
+        <p:spPr>
+          <a:xfrm>
+            <a:off x="611560" y="2564904"/>
+            <a:ext cx="7992888" cy="4154984"/>
+          </a:xfrm>
+          <a:prstGeom prst="rect">
+            <a:avLst/>
+          </a:prstGeom>
+          <a:noFill/>
+        </p:spPr>
+        <p:txBody>
+          <a:bodyPr wrap="square" rtlCol="0">
+            <a:spAutoFit/>
+          </a:bodyPr>
+          <a:lstStyle/>
+          <a:p>
+            <a:pPr>
+              <a:buFont typeface="Arial" pitchFamily="34" charset="0"/>
+              <a:buChar char="•"/>
+            </a:pPr>
+            <a:r>
+              <a:rPr lang="en-GB" sz="2400" dirty="0" smtClean="0"/>
+              <a:t>Thrusting forward will allows the bird to travel further prior to impact. </a:t>
+            </a:r>
+          </a:p>
+          <a:p>
+            <a:pPr>
+              <a:buFont typeface="Arial" pitchFamily="34" charset="0"/>
+              <a:buChar char="•"/>
+            </a:pPr>
+            <a:endParaRPr lang="en-GB" sz="2400" dirty="0" smtClean="0"/>
+          </a:p>
+          <a:p>
+            <a:pPr>
+              <a:buFont typeface="Arial" pitchFamily="34" charset="0"/>
+              <a:buChar char="•"/>
+            </a:pPr>
+            <a:r>
+              <a:rPr lang="en-GB" sz="2400" dirty="0" smtClean="0"/>
+              <a:t>Players stamina is restricted to a stamina bar seen in the UI. </a:t>
+            </a:r>
+          </a:p>
+          <a:p>
+            <a:pPr>
+              <a:buFont typeface="Arial" pitchFamily="34" charset="0"/>
+              <a:buChar char="•"/>
+            </a:pPr>
+            <a:endParaRPr lang="en-GB" sz="2400" dirty="0" smtClean="0"/>
+          </a:p>
+          <a:p>
+            <a:pPr>
+              <a:buFont typeface="Arial" pitchFamily="34" charset="0"/>
+              <a:buChar char="•"/>
+            </a:pPr>
+            <a:r>
+              <a:rPr lang="en-GB" sz="2400" dirty="0" smtClean="0"/>
+              <a:t>The more a player thrusts the less stamina they will have in turn.</a:t>
+            </a:r>
+          </a:p>
+          <a:p>
+            <a:pPr>
+              <a:buFont typeface="Arial" pitchFamily="34" charset="0"/>
+              <a:buChar char="•"/>
+            </a:pPr>
+            <a:endParaRPr lang="en-GB" sz="2400" dirty="0" smtClean="0"/>
+          </a:p>
+          <a:p>
+            <a:pPr>
+              <a:buFont typeface="Arial" pitchFamily="34" charset="0"/>
+              <a:buChar char="•"/>
+            </a:pPr>
+            <a:r>
+              <a:rPr lang="en-GB" sz="2400" dirty="0" smtClean="0"/>
+              <a:t>Budgeting stamina will in turn cause players to be strategic when planing to use their thrust function. Allowing for an overall strategic play.</a:t>
+            </a:r>
+            <a:endParaRPr lang="en-GB" sz="2400" dirty="0"/>
           </a:p>
         </p:txBody>
       </p:sp>
@@ -5794,7 +5982,7 @@
             <a:pPr algn="ctr"/>
             <a:r>
               <a:rPr lang="en-GB" sz="3200" dirty="0" smtClean="0"/>
-              <a:t>Player roles and actions </a:t>
+              <a:t>Game play and apperence </a:t>
             </a:r>
             <a:endParaRPr lang="en-GB" sz="3200" dirty="0"/>
           </a:p>
@@ -5802,14 +5990,58 @@
       </p:sp>
       <p:sp>
         <p:nvSpPr>
-          <p:cNvPr id="3" name="TextBox 2"/>
+          <p:cNvPr id="8" name="Rectangle 7"/>
+          <p:cNvSpPr/>
+          <p:nvPr/>
+        </p:nvSpPr>
+        <p:spPr>
+          <a:xfrm>
+            <a:off x="611560" y="1196752"/>
+            <a:ext cx="7992888" cy="1224136"/>
+          </a:xfrm>
+          <a:prstGeom prst="rect">
+            <a:avLst/>
+          </a:prstGeom>
+        </p:spPr>
+        <p:style>
+          <a:lnRef idx="2">
+            <a:schemeClr val="accent2">
+              <a:shade val="50000"/>
+            </a:schemeClr>
+          </a:lnRef>
+          <a:fillRef idx="1">
+            <a:schemeClr val="accent2"/>
+          </a:fillRef>
+          <a:effectRef idx="0">
+            <a:schemeClr val="accent2"/>
+          </a:effectRef>
+          <a:fontRef idx="minor">
+            <a:schemeClr val="lt1"/>
+          </a:fontRef>
+        </p:style>
+        <p:txBody>
+          <a:bodyPr rtlCol="0" anchor="ctr"/>
+          <a:lstStyle/>
+          <a:p>
+            <a:pPr algn="ctr"/>
+            <a:r>
+              <a:rPr lang="en-GB" dirty="0" smtClean="0"/>
+              <a:t>Prototype Showcase</a:t>
+            </a:r>
+            <a:endParaRPr lang="en-GB" dirty="0"/>
+          </a:p>
+        </p:txBody>
+      </p:sp>
+      <p:sp>
+        <p:nvSpPr>
+          <p:cNvPr id="5" name="TextBox 4"/>
           <p:cNvSpPr txBox="1"/>
           <p:nvPr/>
         </p:nvSpPr>
         <p:spPr>
           <a:xfrm>
-            <a:off x="683568" y="1556792"/>
-            <a:ext cx="7992888" cy="3416320"/>
+            <a:off x="611560" y="2564904"/>
+            <a:ext cx="7992888" cy="4524315"/>
           </a:xfrm>
           <a:prstGeom prst="rect">
             <a:avLst/>
@@ -5828,7 +6060,7 @@
             </a:pPr>
             <a:r>
               <a:rPr lang="en-GB" sz="2400" dirty="0" smtClean="0"/>
-              <a:t>Main objective: Travel furthest whilst budgeting stamina. </a:t>
+              <a:t>Players may also use the thrust function to avoid geometry based obstacles that may affect the distance travelled. </a:t>
             </a:r>
           </a:p>
           <a:p>
@@ -5845,7 +6077,7 @@
             </a:pPr>
             <a:r>
               <a:rPr lang="en-GB" sz="2400" dirty="0" smtClean="0"/>
-              <a:t>Secondary objective: Avoid obstacles which may draw travelled distance to a halt. </a:t>
+              <a:t>Once the players bird comes to a halt the distance travelled is calculated and stored leading into the next players turn. </a:t>
             </a:r>
           </a:p>
           <a:p>
@@ -5862,7 +6094,7 @@
             </a:pPr>
             <a:r>
               <a:rPr lang="en-GB" sz="2400" dirty="0" smtClean="0"/>
-              <a:t>Players thrust using a twich mechanic. </a:t>
+              <a:t>The player who travels the furthest wins the round. </a:t>
             </a:r>
           </a:p>
           <a:p>
@@ -5879,8 +6111,22 @@
             </a:pPr>
             <a:r>
               <a:rPr lang="en-GB" sz="2400" dirty="0" smtClean="0"/>
-              <a:t>Working with trajectory, momentum and budgeting stamina allows for a strategic play. </a:t>
-            </a:r>
+              <a:t>The game consist of three rounds, best two out three wins the game.</a:t>
+            </a:r>
+          </a:p>
+          <a:p>
+            <a:pPr>
+              <a:buFont typeface="Arial" pitchFamily="34" charset="0"/>
+              <a:buChar char="•"/>
+            </a:pPr>
+            <a:endParaRPr lang="en-GB" sz="2400" dirty="0" smtClean="0"/>
+          </a:p>
+          <a:p>
+            <a:pPr>
+              <a:buFont typeface="Arial" pitchFamily="34" charset="0"/>
+              <a:buChar char="•"/>
+            </a:pPr>
+            <a:endParaRPr lang="en-GB" sz="2400" dirty="0"/>
           </a:p>
         </p:txBody>
       </p:sp>
@@ -5918,105 +6164,45 @@
       </p:grpSpPr>
       <p:sp>
         <p:nvSpPr>
-          <p:cNvPr id="4" name="TextBox 3"/>
-          <p:cNvSpPr txBox="1"/>
+          <p:cNvPr id="8" name="Rectangle 7"/>
+          <p:cNvSpPr/>
           <p:nvPr/>
         </p:nvSpPr>
         <p:spPr>
           <a:xfrm>
-            <a:off x="467544" y="620688"/>
-            <a:ext cx="8208912" cy="584775"/>
+            <a:off x="539552" y="2924944"/>
+            <a:ext cx="7992888" cy="1224136"/>
           </a:xfrm>
           <a:prstGeom prst="rect">
             <a:avLst/>
           </a:prstGeom>
-          <a:noFill/>
         </p:spPr>
-        <p:txBody>
-          <a:bodyPr wrap="square" rtlCol="0">
-            <a:spAutoFit/>
-          </a:bodyPr>
+        <p:style>
+          <a:lnRef idx="2">
+            <a:schemeClr val="accent1">
+              <a:shade val="50000"/>
+            </a:schemeClr>
+          </a:lnRef>
+          <a:fillRef idx="1">
+            <a:schemeClr val="accent1"/>
+          </a:fillRef>
+          <a:effectRef idx="0">
+            <a:schemeClr val="accent1"/>
+          </a:effectRef>
+          <a:fontRef idx="minor">
+            <a:schemeClr val="lt1"/>
+          </a:fontRef>
+        </p:style>
+        <p:txBody>
+          <a:bodyPr rtlCol="0" anchor="ctr"/>
           <a:lstStyle/>
           <a:p>
             <a:pPr algn="ctr"/>
             <a:r>
-              <a:rPr lang="en-GB" sz="3200" dirty="0" smtClean="0"/>
-              <a:t>Development specifications</a:t>
-            </a:r>
-            <a:endParaRPr lang="en-GB" sz="3200" dirty="0"/>
-          </a:p>
-        </p:txBody>
-      </p:sp>
-      <p:sp>
-        <p:nvSpPr>
-          <p:cNvPr id="3" name="TextBox 2"/>
-          <p:cNvSpPr txBox="1"/>
-          <p:nvPr/>
-        </p:nvSpPr>
-        <p:spPr>
-          <a:xfrm>
-            <a:off x="683568" y="1556792"/>
-            <a:ext cx="7992888" cy="2308324"/>
-          </a:xfrm>
-          <a:prstGeom prst="rect">
-            <a:avLst/>
-          </a:prstGeom>
-          <a:noFill/>
-        </p:spPr>
-        <p:txBody>
-          <a:bodyPr wrap="square" rtlCol="0">
-            <a:spAutoFit/>
-          </a:bodyPr>
-          <a:lstStyle/>
-          <a:p>
-            <a:pPr>
-              <a:buFont typeface="Arial" pitchFamily="34" charset="0"/>
-              <a:buChar char="•"/>
-            </a:pPr>
-            <a:r>
-              <a:rPr lang="en-GB" sz="2400" dirty="0" smtClean="0"/>
-              <a:t>Unity 2D </a:t>
-            </a:r>
-          </a:p>
-          <a:p>
-            <a:pPr>
-              <a:buFont typeface="Arial" pitchFamily="34" charset="0"/>
-              <a:buChar char="•"/>
-            </a:pPr>
-            <a:endParaRPr lang="en-GB" sz="2400" dirty="0" smtClean="0"/>
-          </a:p>
-          <a:p>
-            <a:pPr>
-              <a:buFont typeface="Arial" pitchFamily="34" charset="0"/>
-              <a:buChar char="•"/>
-            </a:pPr>
-            <a:r>
-              <a:rPr lang="en-GB" sz="2400" dirty="0" smtClean="0"/>
-              <a:t>MonoDevelop / Visual studios</a:t>
-            </a:r>
-          </a:p>
-          <a:p>
-            <a:r>
-              <a:rPr lang="en-GB" sz="2400" dirty="0" smtClean="0"/>
-              <a:t>  </a:t>
-            </a:r>
-          </a:p>
-          <a:p>
-            <a:pPr>
-              <a:buFont typeface="Arial" pitchFamily="34" charset="0"/>
-              <a:buChar char="•"/>
-            </a:pPr>
-            <a:r>
-              <a:rPr lang="en-GB" sz="2400" dirty="0" smtClean="0"/>
-              <a:t>Photoshop </a:t>
-            </a:r>
-          </a:p>
-          <a:p>
-            <a:pPr>
-              <a:buFont typeface="Arial" pitchFamily="34" charset="0"/>
-              <a:buChar char="•"/>
-            </a:pPr>
-            <a:endParaRPr lang="en-GB" sz="2400" dirty="0" smtClean="0"/>
+              <a:rPr lang="en-GB" dirty="0" smtClean="0"/>
+              <a:t>Prototype Showcase</a:t>
+            </a:r>
+            <a:endParaRPr lang="en-GB" dirty="0"/>
           </a:p>
         </p:txBody>
       </p:sp>
@@ -6054,6 +6240,289 @@
       </p:grpSpPr>
       <p:sp>
         <p:nvSpPr>
+          <p:cNvPr id="4" name="TextBox 3"/>
+          <p:cNvSpPr txBox="1"/>
+          <p:nvPr/>
+        </p:nvSpPr>
+        <p:spPr>
+          <a:xfrm>
+            <a:off x="467544" y="620688"/>
+            <a:ext cx="8208912" cy="584775"/>
+          </a:xfrm>
+          <a:prstGeom prst="rect">
+            <a:avLst/>
+          </a:prstGeom>
+          <a:noFill/>
+        </p:spPr>
+        <p:txBody>
+          <a:bodyPr wrap="square" rtlCol="0">
+            <a:spAutoFit/>
+          </a:bodyPr>
+          <a:lstStyle/>
+          <a:p>
+            <a:pPr algn="ctr"/>
+            <a:r>
+              <a:rPr lang="en-GB" sz="3200" dirty="0" smtClean="0"/>
+              <a:t>Player roles and actions </a:t>
+            </a:r>
+            <a:endParaRPr lang="en-GB" sz="3200" dirty="0"/>
+          </a:p>
+        </p:txBody>
+      </p:sp>
+      <p:sp>
+        <p:nvSpPr>
+          <p:cNvPr id="3" name="TextBox 2"/>
+          <p:cNvSpPr txBox="1"/>
+          <p:nvPr/>
+        </p:nvSpPr>
+        <p:spPr>
+          <a:xfrm>
+            <a:off x="683568" y="1556792"/>
+            <a:ext cx="7992888" cy="3416320"/>
+          </a:xfrm>
+          <a:prstGeom prst="rect">
+            <a:avLst/>
+          </a:prstGeom>
+          <a:noFill/>
+        </p:spPr>
+        <p:txBody>
+          <a:bodyPr wrap="square" rtlCol="0">
+            <a:spAutoFit/>
+          </a:bodyPr>
+          <a:lstStyle/>
+          <a:p>
+            <a:pPr>
+              <a:buFont typeface="Arial" pitchFamily="34" charset="0"/>
+              <a:buChar char="•"/>
+            </a:pPr>
+            <a:r>
+              <a:rPr lang="en-GB" sz="2400" dirty="0" smtClean="0"/>
+              <a:t>Main objective: Travel furthest whilst budgeting stamina. </a:t>
+            </a:r>
+          </a:p>
+          <a:p>
+            <a:pPr>
+              <a:buFont typeface="Arial" pitchFamily="34" charset="0"/>
+              <a:buChar char="•"/>
+            </a:pPr>
+            <a:endParaRPr lang="en-GB" sz="2400" dirty="0" smtClean="0"/>
+          </a:p>
+          <a:p>
+            <a:pPr>
+              <a:buFont typeface="Arial" pitchFamily="34" charset="0"/>
+              <a:buChar char="•"/>
+            </a:pPr>
+            <a:r>
+              <a:rPr lang="en-GB" sz="2400" dirty="0" smtClean="0"/>
+              <a:t>Secondary objective: Avoid obstacles which may draw travelled distance to a halt. </a:t>
+            </a:r>
+          </a:p>
+          <a:p>
+            <a:pPr>
+              <a:buFont typeface="Arial" pitchFamily="34" charset="0"/>
+              <a:buChar char="•"/>
+            </a:pPr>
+            <a:endParaRPr lang="en-GB" sz="2400" dirty="0" smtClean="0"/>
+          </a:p>
+          <a:p>
+            <a:pPr>
+              <a:buFont typeface="Arial" pitchFamily="34" charset="0"/>
+              <a:buChar char="•"/>
+            </a:pPr>
+            <a:r>
+              <a:rPr lang="en-GB" sz="2400" dirty="0" smtClean="0"/>
+              <a:t>Players thrust using a twich mechanic. </a:t>
+            </a:r>
+          </a:p>
+          <a:p>
+            <a:pPr>
+              <a:buFont typeface="Arial" pitchFamily="34" charset="0"/>
+              <a:buChar char="•"/>
+            </a:pPr>
+            <a:endParaRPr lang="en-GB" sz="2400" dirty="0" smtClean="0"/>
+          </a:p>
+          <a:p>
+            <a:pPr>
+              <a:buFont typeface="Arial" pitchFamily="34" charset="0"/>
+              <a:buChar char="•"/>
+            </a:pPr>
+            <a:r>
+              <a:rPr lang="en-GB" sz="2400" dirty="0" smtClean="0"/>
+              <a:t>Working with trajectory, momentum and budgeting stamina allows for a strategic play. </a:t>
+            </a:r>
+          </a:p>
+        </p:txBody>
+      </p:sp>
+    </p:spTree>
+  </p:cSld>
+  <p:clrMapOvr>
+    <a:masterClrMapping/>
+  </p:clrMapOvr>
+  <p:timing>
+    <p:tnLst>
+      <p:par>
+        <p:cTn id="1" dur="indefinite" restart="never" nodeType="tmRoot"/>
+      </p:par>
+    </p:tnLst>
+  </p:timing>
+</p:sld>
+</file>
+
+<file path=ppt/slides/slide15.xml><?xml version="1.0" encoding="utf-8"?>
+<p:sld xmlns:a="http://schemas.openxmlformats.org/drawingml/2006/main" xmlns:r="http://schemas.openxmlformats.org/officeDocument/2006/relationships" xmlns:p="http://schemas.openxmlformats.org/presentationml/2006/main">
+  <p:cSld>
+    <p:spTree>
+      <p:nvGrpSpPr>
+        <p:cNvPr id="1" name=""/>
+        <p:cNvGrpSpPr/>
+        <p:nvPr/>
+      </p:nvGrpSpPr>
+      <p:grpSpPr>
+        <a:xfrm>
+          <a:off x="0" y="0"/>
+          <a:ext cx="0" cy="0"/>
+          <a:chOff x="0" y="0"/>
+          <a:chExt cx="0" cy="0"/>
+        </a:xfrm>
+      </p:grpSpPr>
+      <p:sp>
+        <p:nvSpPr>
+          <p:cNvPr id="4" name="TextBox 3"/>
+          <p:cNvSpPr txBox="1"/>
+          <p:nvPr/>
+        </p:nvSpPr>
+        <p:spPr>
+          <a:xfrm>
+            <a:off x="467544" y="620688"/>
+            <a:ext cx="8208912" cy="584775"/>
+          </a:xfrm>
+          <a:prstGeom prst="rect">
+            <a:avLst/>
+          </a:prstGeom>
+          <a:noFill/>
+        </p:spPr>
+        <p:txBody>
+          <a:bodyPr wrap="square" rtlCol="0">
+            <a:spAutoFit/>
+          </a:bodyPr>
+          <a:lstStyle/>
+          <a:p>
+            <a:pPr algn="ctr"/>
+            <a:r>
+              <a:rPr lang="en-GB" sz="3200" dirty="0" smtClean="0"/>
+              <a:t>Development specifications</a:t>
+            </a:r>
+            <a:endParaRPr lang="en-GB" sz="3200" dirty="0"/>
+          </a:p>
+        </p:txBody>
+      </p:sp>
+      <p:sp>
+        <p:nvSpPr>
+          <p:cNvPr id="3" name="TextBox 2"/>
+          <p:cNvSpPr txBox="1"/>
+          <p:nvPr/>
+        </p:nvSpPr>
+        <p:spPr>
+          <a:xfrm>
+            <a:off x="683568" y="1556792"/>
+            <a:ext cx="7992888" cy="2308324"/>
+          </a:xfrm>
+          <a:prstGeom prst="rect">
+            <a:avLst/>
+          </a:prstGeom>
+          <a:noFill/>
+        </p:spPr>
+        <p:txBody>
+          <a:bodyPr wrap="square" rtlCol="0">
+            <a:spAutoFit/>
+          </a:bodyPr>
+          <a:lstStyle/>
+          <a:p>
+            <a:pPr>
+              <a:buFont typeface="Arial" pitchFamily="34" charset="0"/>
+              <a:buChar char="•"/>
+            </a:pPr>
+            <a:r>
+              <a:rPr lang="en-GB" sz="2400" dirty="0" smtClean="0"/>
+              <a:t>Unity 2D </a:t>
+            </a:r>
+          </a:p>
+          <a:p>
+            <a:pPr>
+              <a:buFont typeface="Arial" pitchFamily="34" charset="0"/>
+              <a:buChar char="•"/>
+            </a:pPr>
+            <a:endParaRPr lang="en-GB" sz="2400" dirty="0" smtClean="0"/>
+          </a:p>
+          <a:p>
+            <a:pPr>
+              <a:buFont typeface="Arial" pitchFamily="34" charset="0"/>
+              <a:buChar char="•"/>
+            </a:pPr>
+            <a:r>
+              <a:rPr lang="en-GB" sz="2400" dirty="0" smtClean="0"/>
+              <a:t>MonoDevelop / Visual studios</a:t>
+            </a:r>
+          </a:p>
+          <a:p>
+            <a:r>
+              <a:rPr lang="en-GB" sz="2400" dirty="0" smtClean="0"/>
+              <a:t>  </a:t>
+            </a:r>
+          </a:p>
+          <a:p>
+            <a:pPr>
+              <a:buFont typeface="Arial" pitchFamily="34" charset="0"/>
+              <a:buChar char="•"/>
+            </a:pPr>
+            <a:r>
+              <a:rPr lang="en-GB" sz="2400" dirty="0" smtClean="0"/>
+              <a:t>Photoshop </a:t>
+            </a:r>
+          </a:p>
+          <a:p>
+            <a:pPr>
+              <a:buFont typeface="Arial" pitchFamily="34" charset="0"/>
+              <a:buChar char="•"/>
+            </a:pPr>
+            <a:endParaRPr lang="en-GB" sz="2400" dirty="0" smtClean="0"/>
+          </a:p>
+        </p:txBody>
+      </p:sp>
+    </p:spTree>
+  </p:cSld>
+  <p:clrMapOvr>
+    <a:masterClrMapping/>
+  </p:clrMapOvr>
+  <p:timing>
+    <p:tnLst>
+      <p:par>
+        <p:cTn id="1" dur="indefinite" restart="never" nodeType="tmRoot"/>
+      </p:par>
+    </p:tnLst>
+  </p:timing>
+</p:sld>
+</file>
+
+<file path=ppt/slides/slide16.xml><?xml version="1.0" encoding="utf-8"?>
+<p:sld xmlns:a="http://schemas.openxmlformats.org/drawingml/2006/main" xmlns:r="http://schemas.openxmlformats.org/officeDocument/2006/relationships" xmlns:p="http://schemas.openxmlformats.org/presentationml/2006/main">
+  <p:cSld>
+    <p:spTree>
+      <p:nvGrpSpPr>
+        <p:cNvPr id="1" name=""/>
+        <p:cNvGrpSpPr/>
+        <p:nvPr/>
+      </p:nvGrpSpPr>
+      <p:grpSpPr>
+        <a:xfrm>
+          <a:off x="0" y="0"/>
+          <a:ext cx="0" cy="0"/>
+          <a:chOff x="0" y="0"/>
+          <a:chExt cx="0" cy="0"/>
+        </a:xfrm>
+      </p:grpSpPr>
+      <p:sp>
+        <p:nvSpPr>
           <p:cNvPr id="2" name="Title 1"/>
           <p:cNvSpPr>
             <a:spLocks noGrp="1"/>
@@ -6221,7 +6690,7 @@
     </p:spTree>
     <p:extLst>
       <p:ext uri="{BB962C8B-B14F-4D97-AF65-F5344CB8AC3E}">
-        <p14:creationId xmlns:p14="http://schemas.microsoft.com/office/powerpoint/2010/main" xmlns="" val="294683533"/>
+        <p14:creationId xmlns:p14="http://schemas.microsoft.com/office/powerpoint/2010/main" val="294683533"/>
       </p:ext>
     </p:extLst>
   </p:cSld>
@@ -6238,7 +6707,7 @@
 </p:sld>
 </file>
 
-<file path=ppt/slides/slide15.xml><?xml version="1.0" encoding="utf-8"?>
+<file path=ppt/slides/slide17.xml><?xml version="1.0" encoding="utf-8"?>
 <p:sld xmlns:a="http://schemas.openxmlformats.org/drawingml/2006/main" xmlns:r="http://schemas.openxmlformats.org/officeDocument/2006/relationships" xmlns:p="http://schemas.openxmlformats.org/presentationml/2006/main">
   <p:cSld>
     <p:spTree>
@@ -6703,7 +7172,7 @@
     </p:spTree>
     <p:extLst>
       <p:ext uri="{BB962C8B-B14F-4D97-AF65-F5344CB8AC3E}">
-        <p14:creationId xmlns:p14="http://schemas.microsoft.com/office/powerpoint/2010/main" xmlns="" val="401632097"/>
+        <p14:creationId xmlns:p14="http://schemas.microsoft.com/office/powerpoint/2010/main" val="401632097"/>
       </p:ext>
     </p:extLst>
   </p:cSld>
@@ -6720,70 +7189,7 @@
 </p:sld>
 </file>
 
-<file path=ppt/slides/slide16.xml><?xml version="1.0" encoding="utf-8"?>
-<p:sld xmlns:a="http://schemas.openxmlformats.org/drawingml/2006/main" xmlns:r="http://schemas.openxmlformats.org/officeDocument/2006/relationships" xmlns:p="http://schemas.openxmlformats.org/presentationml/2006/main">
-  <p:cSld>
-    <p:spTree>
-      <p:nvGrpSpPr>
-        <p:cNvPr id="1" name=""/>
-        <p:cNvGrpSpPr/>
-        <p:nvPr/>
-      </p:nvGrpSpPr>
-      <p:grpSpPr>
-        <a:xfrm>
-          <a:off x="0" y="0"/>
-          <a:ext cx="0" cy="0"/>
-          <a:chOff x="0" y="0"/>
-          <a:chExt cx="0" cy="0"/>
-        </a:xfrm>
-      </p:grpSpPr>
-      <p:sp>
-        <p:nvSpPr>
-          <p:cNvPr id="4" name="TextBox 3"/>
-          <p:cNvSpPr txBox="1"/>
-          <p:nvPr/>
-        </p:nvSpPr>
-        <p:spPr>
-          <a:xfrm>
-            <a:off x="971600" y="332656"/>
-            <a:ext cx="7200800" cy="830997"/>
-          </a:xfrm>
-          <a:prstGeom prst="rect">
-            <a:avLst/>
-          </a:prstGeom>
-          <a:noFill/>
-        </p:spPr>
-        <p:txBody>
-          <a:bodyPr wrap="square" rtlCol="0">
-            <a:spAutoFit/>
-          </a:bodyPr>
-          <a:lstStyle/>
-          <a:p>
-            <a:pPr algn="ctr"/>
-            <a:r>
-              <a:rPr lang="en-GB" sz="4800" dirty="0" smtClean="0"/>
-              <a:t>Logged hours </a:t>
-            </a:r>
-            <a:endParaRPr lang="en-GB" sz="4800" dirty="0"/>
-          </a:p>
-        </p:txBody>
-      </p:sp>
-    </p:spTree>
-  </p:cSld>
-  <p:clrMapOvr>
-    <a:masterClrMapping/>
-  </p:clrMapOvr>
-  <p:timing>
-    <p:tnLst>
-      <p:par>
-        <p:cTn id="1" dur="indefinite" restart="never" nodeType="tmRoot"/>
-      </p:par>
-    </p:tnLst>
-  </p:timing>
-</p:sld>
-</file>
-
-<file path=ppt/slides/slide17.xml><?xml version="1.0" encoding="utf-8"?>
+<file path=ppt/slides/slide18.xml><?xml version="1.0" encoding="utf-8"?>
 <p:sld xmlns:a="http://schemas.openxmlformats.org/drawingml/2006/main" xmlns:r="http://schemas.openxmlformats.org/officeDocument/2006/relationships" xmlns:p="http://schemas.openxmlformats.org/presentationml/2006/main">
   <p:cSld>
     <p:spTree>
@@ -6895,11 +7301,7 @@
             <a:pPr algn="ctr"/>
             <a:r>
               <a:rPr lang="en-GB" sz="3200" dirty="0" smtClean="0"/>
-              <a:t>Stakeholders &amp; Ubisoft Bucharest  </a:t>
-            </a:r>
-            <a:r>
-              <a:rPr lang="en-GB" sz="3200" dirty="0" smtClean="0"/>
-              <a:t> </a:t>
+              <a:t>Stakeholders &amp; Ubisoft Bucharest   </a:t>
             </a:r>
           </a:p>
           <a:p>
@@ -7573,32 +7975,6 @@
           </a:graphicData>
         </a:graphic>
       </p:graphicFrame>
-      <p:pic>
-        <p:nvPicPr>
-          <p:cNvPr id="2050" name="Picture 2" descr="pegi-7"/>
-          <p:cNvPicPr>
-            <a:picLocks noChangeAspect="1" noChangeArrowheads="1"/>
-          </p:cNvPicPr>
-          <p:nvPr/>
-        </p:nvPicPr>
-        <p:blipFill>
-          <a:blip r:embed="rId3" cstate="print"/>
-          <a:srcRect/>
-          <a:stretch>
-            <a:fillRect/>
-          </a:stretch>
-        </p:blipFill>
-        <p:spPr bwMode="auto">
-          <a:xfrm>
-            <a:off x="5580112" y="4509120"/>
-            <a:ext cx="3378192" cy="2231529"/>
-          </a:xfrm>
-          <a:prstGeom prst="rect">
-            <a:avLst/>
-          </a:prstGeom>
-          <a:noFill/>
-        </p:spPr>
-      </p:pic>
     </p:spTree>
   </p:cSld>
   <p:clrMapOvr>
@@ -7995,7 +8371,7 @@
     </p:spTree>
     <p:extLst>
       <p:ext uri="{BB962C8B-B14F-4D97-AF65-F5344CB8AC3E}">
-        <p14:creationId xmlns:p14="http://schemas.microsoft.com/office/powerpoint/2010/main" xmlns="" val="1003085843"/>
+        <p14:creationId xmlns:p14="http://schemas.microsoft.com/office/powerpoint/2010/main" val="1003085843"/>
       </p:ext>
     </p:extLst>
   </p:cSld>
@@ -8037,7 +8413,7 @@
         </p:nvSpPr>
         <p:spPr>
           <a:xfrm>
-            <a:off x="467544" y="620688"/>
+            <a:off x="467544" y="188640"/>
             <a:ext cx="8208912" cy="584775"/>
           </a:xfrm>
           <a:prstGeom prst="rect">
@@ -8060,6 +8436,36 @@
           </a:p>
         </p:txBody>
       </p:sp>
+      <p:pic>
+        <p:nvPicPr>
+          <p:cNvPr id="3" name="Picture 2"/>
+          <p:cNvPicPr>
+            <a:picLocks noChangeAspect="1"/>
+          </p:cNvPicPr>
+          <p:nvPr/>
+        </p:nvPicPr>
+        <p:blipFill>
+          <a:blip r:embed="rId3" cstate="print">
+            <a:extLst>
+              <a:ext uri="{28A0092B-C50C-407E-A947-70E740481C1C}">
+                <a14:useLocalDpi xmlns:a14="http://schemas.microsoft.com/office/drawing/2010/main" val="0"/>
+              </a:ext>
+            </a:extLst>
+          </a:blip>
+          <a:stretch>
+            <a:fillRect/>
+          </a:stretch>
+        </p:blipFill>
+        <p:spPr>
+          <a:xfrm>
+            <a:off x="1291809" y="908720"/>
+            <a:ext cx="6560381" cy="5576324"/>
+          </a:xfrm>
+          <a:prstGeom prst="rect">
+            <a:avLst/>
+          </a:prstGeom>
+        </p:spPr>
+      </p:pic>
     </p:spTree>
   </p:cSld>
   <p:clrMapOvr>
@@ -8100,7 +8506,7 @@
         </p:nvSpPr>
         <p:spPr>
           <a:xfrm>
-            <a:off x="467544" y="620688"/>
+            <a:off x="558441" y="121752"/>
             <a:ext cx="8208912" cy="584775"/>
           </a:xfrm>
           <a:prstGeom prst="rect">
@@ -8117,125 +8523,48 @@
             <a:pPr algn="ctr"/>
             <a:r>
               <a:rPr lang="en-GB" sz="3200" dirty="0" smtClean="0"/>
-              <a:t>Game play and apperence </a:t>
+              <a:t>Moodboards and concpet </a:t>
             </a:r>
             <a:endParaRPr lang="en-GB" sz="3200" dirty="0"/>
           </a:p>
         </p:txBody>
       </p:sp>
-      <p:sp>
-        <p:nvSpPr>
-          <p:cNvPr id="6" name="TextBox 5"/>
-          <p:cNvSpPr txBox="1"/>
+      <p:pic>
+        <p:nvPicPr>
+          <p:cNvPr id="5" name="Picture 4"/>
+          <p:cNvPicPr>
+            <a:picLocks noChangeAspect="1"/>
+          </p:cNvPicPr>
           <p:nvPr/>
-        </p:nvSpPr>
+        </p:nvPicPr>
+        <p:blipFill>
+          <a:blip r:embed="rId3" cstate="print">
+            <a:extLst>
+              <a:ext uri="{28A0092B-C50C-407E-A947-70E740481C1C}">
+                <a14:useLocalDpi xmlns:a14="http://schemas.microsoft.com/office/drawing/2010/main" val="0"/>
+              </a:ext>
+            </a:extLst>
+          </a:blip>
+          <a:stretch>
+            <a:fillRect/>
+          </a:stretch>
+        </p:blipFill>
         <p:spPr>
           <a:xfrm>
-            <a:off x="539552" y="2924944"/>
-            <a:ext cx="7992888" cy="2677656"/>
-          </a:xfrm>
-          <a:prstGeom prst="rect">
-            <a:avLst/>
-          </a:prstGeom>
-          <a:noFill/>
-        </p:spPr>
-        <p:txBody>
-          <a:bodyPr wrap="square" rtlCol="0">
-            <a:spAutoFit/>
-          </a:bodyPr>
-          <a:lstStyle/>
-          <a:p>
-            <a:pPr>
-              <a:buFont typeface="Arial" pitchFamily="34" charset="0"/>
-              <a:buChar char="•"/>
-            </a:pPr>
-            <a:r>
-              <a:rPr lang="en-GB" sz="2400" dirty="0" smtClean="0"/>
-              <a:t>Action, phyics, adversray, turn based game. </a:t>
-            </a:r>
-          </a:p>
-          <a:p>
-            <a:pPr>
-              <a:buFont typeface="Arial" pitchFamily="34" charset="0"/>
-              <a:buChar char="•"/>
-            </a:pPr>
-            <a:endParaRPr lang="en-GB" sz="2400" dirty="0" smtClean="0"/>
-          </a:p>
-          <a:p>
-            <a:pPr>
-              <a:buFont typeface="Arial" pitchFamily="34" charset="0"/>
-              <a:buChar char="•"/>
-            </a:pPr>
-            <a:r>
-              <a:rPr lang="en-GB" sz="2400" dirty="0" smtClean="0"/>
-              <a:t>Main gameplay will take place on landscape 2D overworld.  </a:t>
-            </a:r>
-          </a:p>
-          <a:p>
-            <a:pPr>
-              <a:buFont typeface="Arial" pitchFamily="34" charset="0"/>
-              <a:buChar char="•"/>
-            </a:pPr>
-            <a:endParaRPr lang="en-GB" sz="2400" dirty="0" smtClean="0"/>
-          </a:p>
-          <a:p>
-            <a:pPr>
-              <a:buFont typeface="Arial" pitchFamily="34" charset="0"/>
-              <a:buChar char="•"/>
-            </a:pPr>
-            <a:r>
-              <a:rPr lang="en-GB" sz="2400" dirty="0" smtClean="0"/>
-              <a:t>Using the catapult, players can ajust tjhe trajectory and momentum of the flightless birds in order to travel the furthest distance. </a:t>
-            </a:r>
-            <a:endParaRPr lang="en-GB" sz="2400" dirty="0"/>
-          </a:p>
-        </p:txBody>
-      </p:sp>
-      <p:sp>
-        <p:nvSpPr>
-          <p:cNvPr id="8" name="Rectangle 7"/>
-          <p:cNvSpPr/>
-          <p:nvPr/>
-        </p:nvSpPr>
-        <p:spPr>
-          <a:xfrm>
-            <a:off x="539552" y="1556792"/>
-            <a:ext cx="7992888" cy="1224136"/>
+            <a:off x="971600" y="701407"/>
+            <a:ext cx="7382594" cy="5906075"/>
           </a:xfrm>
           <a:prstGeom prst="rect">
             <a:avLst/>
           </a:prstGeom>
         </p:spPr>
-        <p:style>
-          <a:lnRef idx="2">
-            <a:schemeClr val="accent1">
-              <a:shade val="50000"/>
-            </a:schemeClr>
-          </a:lnRef>
-          <a:fillRef idx="1">
-            <a:schemeClr val="accent1"/>
-          </a:fillRef>
-          <a:effectRef idx="0">
-            <a:schemeClr val="accent1"/>
-          </a:effectRef>
-          <a:fontRef idx="minor">
-            <a:schemeClr val="lt1"/>
-          </a:fontRef>
-        </p:style>
-        <p:txBody>
-          <a:bodyPr rtlCol="0" anchor="ctr"/>
-          <a:lstStyle/>
-          <a:p>
-            <a:pPr algn="ctr"/>
-            <a:r>
-              <a:rPr lang="en-GB" dirty="0" smtClean="0"/>
-              <a:t>Prototype Showcase</a:t>
-            </a:r>
-            <a:endParaRPr lang="en-GB" dirty="0"/>
-          </a:p>
-        </p:txBody>
-      </p:sp>
+      </p:pic>
     </p:spTree>
+    <p:extLst>
+      <p:ext uri="{BB962C8B-B14F-4D97-AF65-F5344CB8AC3E}">
+        <p14:creationId xmlns:p14="http://schemas.microsoft.com/office/powerpoint/2010/main" val="3824006778"/>
+      </p:ext>
+    </p:extLst>
   </p:cSld>
   <p:clrMapOvr>
     <a:masterClrMapping/>
@@ -8292,143 +8621,48 @@
             <a:pPr algn="ctr"/>
             <a:r>
               <a:rPr lang="en-GB" sz="3200" dirty="0" smtClean="0"/>
-              <a:t>Game play and apperence </a:t>
+              <a:t>Moodboards and concpet </a:t>
             </a:r>
             <a:endParaRPr lang="en-GB" sz="3200" dirty="0"/>
           </a:p>
         </p:txBody>
       </p:sp>
-      <p:sp>
-        <p:nvSpPr>
-          <p:cNvPr id="6" name="TextBox 5"/>
-          <p:cNvSpPr txBox="1"/>
+      <p:pic>
+        <p:nvPicPr>
+          <p:cNvPr id="2" name="Picture 1"/>
+          <p:cNvPicPr>
+            <a:picLocks noChangeAspect="1"/>
+          </p:cNvPicPr>
           <p:nvPr/>
-        </p:nvSpPr>
+        </p:nvPicPr>
+        <p:blipFill>
+          <a:blip r:embed="rId3" cstate="print">
+            <a:extLst>
+              <a:ext uri="{28A0092B-C50C-407E-A947-70E740481C1C}">
+                <a14:useLocalDpi xmlns:a14="http://schemas.microsoft.com/office/drawing/2010/main" val="0"/>
+              </a:ext>
+            </a:extLst>
+          </a:blip>
+          <a:stretch>
+            <a:fillRect/>
+          </a:stretch>
+        </p:blipFill>
         <p:spPr>
           <a:xfrm>
-            <a:off x="539552" y="2703016"/>
-            <a:ext cx="7992888" cy="4154984"/>
-          </a:xfrm>
-          <a:prstGeom prst="rect">
-            <a:avLst/>
-          </a:prstGeom>
-          <a:noFill/>
-        </p:spPr>
-        <p:txBody>
-          <a:bodyPr wrap="square" rtlCol="0">
-            <a:spAutoFit/>
-          </a:bodyPr>
-          <a:lstStyle/>
-          <a:p>
-            <a:pPr>
-              <a:buFont typeface="Arial" pitchFamily="34" charset="0"/>
-              <a:buChar char="•"/>
-            </a:pPr>
-            <a:r>
-              <a:rPr lang="en-GB" sz="2400" dirty="0" smtClean="0"/>
-              <a:t>Players can use the stamina to either thrust bird upwards or forwards. </a:t>
-            </a:r>
-          </a:p>
-          <a:p>
-            <a:pPr>
-              <a:buFont typeface="Arial" pitchFamily="34" charset="0"/>
-              <a:buChar char="•"/>
-            </a:pPr>
-            <a:endParaRPr lang="en-GB" sz="2400" dirty="0" smtClean="0"/>
-          </a:p>
-          <a:p>
-            <a:pPr>
-              <a:buFont typeface="Arial" pitchFamily="34" charset="0"/>
-              <a:buChar char="•"/>
-            </a:pPr>
-            <a:r>
-              <a:rPr lang="en-GB" sz="2400" dirty="0" smtClean="0"/>
-              <a:t>Thrusting forwards allows the bird to travel highter, thereby increasing the momentum of eventual impact. </a:t>
-            </a:r>
-          </a:p>
-          <a:p>
-            <a:pPr>
-              <a:buFont typeface="Arial" pitchFamily="34" charset="0"/>
-              <a:buChar char="•"/>
-            </a:pPr>
-            <a:endParaRPr lang="en-GB" sz="2400" dirty="0" smtClean="0"/>
-          </a:p>
-          <a:p>
-            <a:pPr>
-              <a:buFont typeface="Arial" pitchFamily="34" charset="0"/>
-              <a:buChar char="•"/>
-            </a:pPr>
-            <a:r>
-              <a:rPr lang="en-GB" sz="2400" dirty="0" smtClean="0"/>
-              <a:t>Players can trust be repeatedly pressing the allocated keys, which inturn causes a twich mechanic.</a:t>
-            </a:r>
-            <a:endParaRPr lang="en-GB" sz="2400" dirty="0" smtClean="0"/>
-          </a:p>
-          <a:p>
-            <a:pPr>
-              <a:buFont typeface="Arial" pitchFamily="34" charset="0"/>
-              <a:buChar char="•"/>
-            </a:pPr>
-            <a:endParaRPr lang="en-GB" sz="2400" dirty="0" smtClean="0"/>
-          </a:p>
-          <a:p>
-            <a:pPr>
-              <a:buFont typeface="Arial" pitchFamily="34" charset="0"/>
-              <a:buChar char="•"/>
-            </a:pPr>
-            <a:r>
-              <a:rPr lang="en-GB" sz="2400" dirty="0" smtClean="0"/>
-              <a:t>The larger the momentum upon impact, the further the bird will recoil.  </a:t>
-            </a:r>
-            <a:endParaRPr lang="en-GB" sz="2400" dirty="0"/>
-          </a:p>
-        </p:txBody>
-      </p:sp>
-      <p:sp>
-        <p:nvSpPr>
-          <p:cNvPr id="8" name="Rectangle 7"/>
-          <p:cNvSpPr/>
-          <p:nvPr/>
-        </p:nvSpPr>
-        <p:spPr>
-          <a:xfrm>
-            <a:off x="539552" y="1334864"/>
-            <a:ext cx="7992888" cy="1224136"/>
+            <a:off x="0" y="1775673"/>
+            <a:ext cx="9144000" cy="3306654"/>
           </a:xfrm>
           <a:prstGeom prst="rect">
             <a:avLst/>
           </a:prstGeom>
         </p:spPr>
-        <p:style>
-          <a:lnRef idx="2">
-            <a:schemeClr val="accent5">
-              <a:shade val="50000"/>
-            </a:schemeClr>
-          </a:lnRef>
-          <a:fillRef idx="1">
-            <a:schemeClr val="accent5"/>
-          </a:fillRef>
-          <a:effectRef idx="0">
-            <a:schemeClr val="accent5"/>
-          </a:effectRef>
-          <a:fontRef idx="minor">
-            <a:schemeClr val="lt1"/>
-          </a:fontRef>
-        </p:style>
-        <p:txBody>
-          <a:bodyPr rtlCol="0" anchor="ctr"/>
-          <a:lstStyle/>
-          <a:p>
-            <a:pPr algn="ctr"/>
-            <a:r>
-              <a:rPr lang="en-GB" dirty="0" smtClean="0"/>
-              <a:t>Prototype Showcase</a:t>
-            </a:r>
-            <a:endParaRPr lang="en-GB" dirty="0"/>
-          </a:p>
-        </p:txBody>
-      </p:sp>
+      </p:pic>
     </p:spTree>
+    <p:extLst>
+      <p:ext uri="{BB962C8B-B14F-4D97-AF65-F5344CB8AC3E}">
+        <p14:creationId xmlns:p14="http://schemas.microsoft.com/office/powerpoint/2010/main" val="101037927"/>
+      </p:ext>
+    </p:extLst>
   </p:cSld>
   <p:clrMapOvr>
     <a:masterClrMapping/>
@@ -8493,13 +8727,81 @@
       </p:sp>
       <p:sp>
         <p:nvSpPr>
+          <p:cNvPr id="6" name="TextBox 5"/>
+          <p:cNvSpPr txBox="1"/>
+          <p:nvPr/>
+        </p:nvSpPr>
+        <p:spPr>
+          <a:xfrm>
+            <a:off x="539552" y="2924944"/>
+            <a:ext cx="7992888" cy="2677656"/>
+          </a:xfrm>
+          <a:prstGeom prst="rect">
+            <a:avLst/>
+          </a:prstGeom>
+          <a:noFill/>
+        </p:spPr>
+        <p:txBody>
+          <a:bodyPr wrap="square" rtlCol="0">
+            <a:spAutoFit/>
+          </a:bodyPr>
+          <a:lstStyle/>
+          <a:p>
+            <a:pPr>
+              <a:buFont typeface="Arial" pitchFamily="34" charset="0"/>
+              <a:buChar char="•"/>
+            </a:pPr>
+            <a:r>
+              <a:rPr lang="en-GB" sz="2400" dirty="0" smtClean="0"/>
+              <a:t>Action, phyics, adversray, turn based game. </a:t>
+            </a:r>
+          </a:p>
+          <a:p>
+            <a:pPr>
+              <a:buFont typeface="Arial" pitchFamily="34" charset="0"/>
+              <a:buChar char="•"/>
+            </a:pPr>
+            <a:endParaRPr lang="en-GB" sz="2400" dirty="0" smtClean="0"/>
+          </a:p>
+          <a:p>
+            <a:pPr>
+              <a:buFont typeface="Arial" pitchFamily="34" charset="0"/>
+              <a:buChar char="•"/>
+            </a:pPr>
+            <a:r>
+              <a:rPr lang="en-GB" sz="2400" dirty="0" smtClean="0"/>
+              <a:t>Main gameplay will take place on landscape 2D overworld.  </a:t>
+            </a:r>
+          </a:p>
+          <a:p>
+            <a:pPr>
+              <a:buFont typeface="Arial" pitchFamily="34" charset="0"/>
+              <a:buChar char="•"/>
+            </a:pPr>
+            <a:endParaRPr lang="en-GB" sz="2400" dirty="0" smtClean="0"/>
+          </a:p>
+          <a:p>
+            <a:pPr>
+              <a:buFont typeface="Arial" pitchFamily="34" charset="0"/>
+              <a:buChar char="•"/>
+            </a:pPr>
+            <a:r>
+              <a:rPr lang="en-GB" sz="2400" dirty="0" smtClean="0"/>
+              <a:t>Using the catapult, players can ajust tjhe trajectory and momentum of the flightless birds in order to travel the furthest distance. </a:t>
+            </a:r>
+            <a:endParaRPr lang="en-GB" sz="2400" dirty="0"/>
+          </a:p>
+        </p:txBody>
+      </p:sp>
+      <p:sp>
+        <p:nvSpPr>
           <p:cNvPr id="8" name="Rectangle 7"/>
           <p:cNvSpPr/>
           <p:nvPr/>
         </p:nvSpPr>
         <p:spPr>
           <a:xfrm>
-            <a:off x="611560" y="1196752"/>
+            <a:off x="539552" y="1556792"/>
             <a:ext cx="7992888" cy="1224136"/>
           </a:xfrm>
           <a:prstGeom prst="rect">
@@ -8508,15 +8810,15 @@
         </p:spPr>
         <p:style>
           <a:lnRef idx="2">
-            <a:schemeClr val="accent3">
+            <a:schemeClr val="accent1">
               <a:shade val="50000"/>
             </a:schemeClr>
           </a:lnRef>
           <a:fillRef idx="1">
-            <a:schemeClr val="accent3"/>
+            <a:schemeClr val="accent1"/>
           </a:fillRef>
           <a:effectRef idx="0">
-            <a:schemeClr val="accent3"/>
+            <a:schemeClr val="accent1"/>
           </a:effectRef>
           <a:fontRef idx="minor">
             <a:schemeClr val="lt1"/>
@@ -8532,91 +8834,6 @@
               <a:t>Prototype Showcase</a:t>
             </a:r>
             <a:endParaRPr lang="en-GB" dirty="0"/>
-          </a:p>
-        </p:txBody>
-      </p:sp>
-      <p:sp>
-        <p:nvSpPr>
-          <p:cNvPr id="5" name="TextBox 4"/>
-          <p:cNvSpPr txBox="1"/>
-          <p:nvPr/>
-        </p:nvSpPr>
-        <p:spPr>
-          <a:xfrm>
-            <a:off x="611560" y="2564904"/>
-            <a:ext cx="7992888" cy="4154984"/>
-          </a:xfrm>
-          <a:prstGeom prst="rect">
-            <a:avLst/>
-          </a:prstGeom>
-          <a:noFill/>
-        </p:spPr>
-        <p:txBody>
-          <a:bodyPr wrap="square" rtlCol="0">
-            <a:spAutoFit/>
-          </a:bodyPr>
-          <a:lstStyle/>
-          <a:p>
-            <a:pPr>
-              <a:buFont typeface="Arial" pitchFamily="34" charset="0"/>
-              <a:buChar char="•"/>
-            </a:pPr>
-            <a:r>
-              <a:rPr lang="en-GB" sz="2400" dirty="0" smtClean="0"/>
-              <a:t>Thrusting forward will allows the bird to travel further prior to impact. </a:t>
-            </a:r>
-          </a:p>
-          <a:p>
-            <a:pPr>
-              <a:buFont typeface="Arial" pitchFamily="34" charset="0"/>
-              <a:buChar char="•"/>
-            </a:pPr>
-            <a:endParaRPr lang="en-GB" sz="2400" dirty="0" smtClean="0"/>
-          </a:p>
-          <a:p>
-            <a:pPr>
-              <a:buFont typeface="Arial" pitchFamily="34" charset="0"/>
-              <a:buChar char="•"/>
-            </a:pPr>
-            <a:r>
-              <a:rPr lang="en-GB" sz="2400" dirty="0" smtClean="0"/>
-              <a:t>Players stamina is restricted to a stamina bar seen in the UI. </a:t>
-            </a:r>
-          </a:p>
-          <a:p>
-            <a:pPr>
-              <a:buFont typeface="Arial" pitchFamily="34" charset="0"/>
-              <a:buChar char="•"/>
-            </a:pPr>
-            <a:endParaRPr lang="en-GB" sz="2400" dirty="0" smtClean="0"/>
-          </a:p>
-          <a:p>
-            <a:pPr>
-              <a:buFont typeface="Arial" pitchFamily="34" charset="0"/>
-              <a:buChar char="•"/>
-            </a:pPr>
-            <a:r>
-              <a:rPr lang="en-GB" sz="2400" dirty="0" smtClean="0"/>
-              <a:t>The more a player thrusts the less stamina they will have in turn.</a:t>
-            </a:r>
-          </a:p>
-          <a:p>
-            <a:pPr>
-              <a:buFont typeface="Arial" pitchFamily="34" charset="0"/>
-              <a:buChar char="•"/>
-            </a:pPr>
-            <a:endParaRPr lang="en-GB" sz="2400" dirty="0" smtClean="0"/>
-          </a:p>
-          <a:p>
-            <a:pPr>
-              <a:buFont typeface="Arial" pitchFamily="34" charset="0"/>
-              <a:buChar char="•"/>
-            </a:pPr>
-            <a:r>
-              <a:rPr lang="en-GB" sz="2400" dirty="0" smtClean="0"/>
-              <a:t>Budgeting stamina will in turn cause players to be strategic when planing to use their thrust function. Allowing for an overall strategic play.</a:t>
-            </a:r>
-            <a:endParaRPr lang="en-GB" sz="2400" dirty="0"/>
           </a:p>
         </p:txBody>
       </p:sp>

</xml_diff>

<commit_message>
Completed prototpe build, recorded prototype footage
I have now completed building our first game prototype.
New addition to the protoype include:
.ammentions to bird bounancy
.a level reset button.
</commit_message>
<xml_diff>
--- a/Presentation/Pitch Presentation_Group 19.pptx
+++ b/Presentation/Pitch Presentation_Group 19.pptx
@@ -5,7 +5,7 @@
     <p:sldMasterId id="2147483672" r:id="rId1"/>
   </p:sldMasterIdLst>
   <p:notesMasterIdLst>
-    <p:notesMasterId r:id="rId20"/>
+    <p:notesMasterId r:id="rId21"/>
   </p:notesMasterIdLst>
   <p:sldIdLst>
     <p:sldId id="256" r:id="rId2"/>
@@ -21,11 +21,12 @@
     <p:sldId id="283" r:id="rId12"/>
     <p:sldId id="284" r:id="rId13"/>
     <p:sldId id="287" r:id="rId14"/>
-    <p:sldId id="286" r:id="rId15"/>
-    <p:sldId id="288" r:id="rId16"/>
-    <p:sldId id="276" r:id="rId17"/>
-    <p:sldId id="274" r:id="rId18"/>
-    <p:sldId id="289" r:id="rId19"/>
+    <p:sldId id="292" r:id="rId15"/>
+    <p:sldId id="286" r:id="rId16"/>
+    <p:sldId id="288" r:id="rId17"/>
+    <p:sldId id="276" r:id="rId18"/>
+    <p:sldId id="274" r:id="rId19"/>
+    <p:sldId id="289" r:id="rId20"/>
   </p:sldIdLst>
   <p:sldSz cx="9144000" cy="6858000" type="screen4x3"/>
   <p:notesSz cx="6858000" cy="9144000"/>
@@ -192,7 +193,7 @@
             </a:lvl1pPr>
           </a:lstStyle>
           <a:p>
-            <a:endParaRPr lang="en-GB"/>
+            <a:endParaRPr lang="en-GB" dirty="0"/>
           </a:p>
         </p:txBody>
       </p:sp>
@@ -228,7 +229,7 @@
               <a:pPr/>
               <a:t>31/01/2017</a:t>
             </a:fld>
-            <a:endParaRPr lang="en-GB"/>
+            <a:endParaRPr lang="en-GB" dirty="0"/>
           </a:p>
         </p:txBody>
       </p:sp>
@@ -261,7 +262,7 @@
           <a:bodyPr vert="horz" lIns="91440" tIns="45720" rIns="91440" bIns="45720" rtlCol="0" anchor="ctr"/>
           <a:lstStyle/>
           <a:p>
-            <a:endParaRPr lang="en-GB"/>
+            <a:endParaRPr lang="en-GB" dirty="0"/>
           </a:p>
         </p:txBody>
       </p:sp>
@@ -354,7 +355,7 @@
             </a:lvl1pPr>
           </a:lstStyle>
           <a:p>
-            <a:endParaRPr lang="en-GB"/>
+            <a:endParaRPr lang="en-GB" dirty="0"/>
           </a:p>
         </p:txBody>
       </p:sp>
@@ -390,7 +391,7 @@
               <a:pPr/>
               <a:t>‹#›</a:t>
             </a:fld>
-            <a:endParaRPr lang="en-GB"/>
+            <a:endParaRPr lang="en-GB" dirty="0"/>
           </a:p>
         </p:txBody>
       </p:sp>
@@ -589,7 +590,7 @@
               <a:pPr/>
               <a:t>1</a:t>
             </a:fld>
-            <a:endParaRPr lang="en-GB"/>
+            <a:endParaRPr lang="en-GB" dirty="0"/>
           </a:p>
         </p:txBody>
       </p:sp>
@@ -680,7 +681,7 @@
               <a:pPr/>
               <a:t>10</a:t>
             </a:fld>
-            <a:endParaRPr lang="en-GB"/>
+            <a:endParaRPr lang="en-GB" dirty="0"/>
           </a:p>
         </p:txBody>
       </p:sp>
@@ -771,7 +772,7 @@
               <a:pPr/>
               <a:t>11</a:t>
             </a:fld>
-            <a:endParaRPr lang="en-GB"/>
+            <a:endParaRPr lang="en-GB" dirty="0"/>
           </a:p>
         </p:txBody>
       </p:sp>
@@ -862,7 +863,7 @@
               <a:pPr/>
               <a:t>12</a:t>
             </a:fld>
-            <a:endParaRPr lang="en-GB"/>
+            <a:endParaRPr lang="en-GB" dirty="0"/>
           </a:p>
         </p:txBody>
       </p:sp>
@@ -953,7 +954,7 @@
               <a:pPr/>
               <a:t>13</a:t>
             </a:fld>
-            <a:endParaRPr lang="en-GB"/>
+            <a:endParaRPr lang="en-GB" dirty="0"/>
           </a:p>
         </p:txBody>
       </p:sp>
@@ -1044,14 +1045,14 @@
               <a:pPr/>
               <a:t>14</a:t>
             </a:fld>
-            <a:endParaRPr lang="en-GB"/>
+            <a:endParaRPr lang="en-GB" dirty="0"/>
           </a:p>
         </p:txBody>
       </p:sp>
     </p:spTree>
     <p:extLst>
       <p:ext uri="{BB962C8B-B14F-4D97-AF65-F5344CB8AC3E}">
-        <p14:creationId xmlns:p14="http://schemas.microsoft.com/office/powerpoint/2010/main" val="2389549365"/>
+        <p14:creationId xmlns:p14="http://schemas.microsoft.com/office/powerpoint/2010/main" val="3933218464"/>
       </p:ext>
     </p:extLst>
   </p:cSld>
@@ -1135,7 +1136,7 @@
               <a:pPr/>
               <a:t>15</a:t>
             </a:fld>
-            <a:endParaRPr lang="en-GB"/>
+            <a:endParaRPr lang="en-GB" dirty="0"/>
           </a:p>
         </p:txBody>
       </p:sp>
@@ -1198,46 +1199,11 @@
           </a:bodyPr>
           <a:lstStyle/>
           <a:p>
-            <a:r>
-              <a:rPr lang="en-GB" dirty="0" smtClean="0"/>
-              <a:t>Hard fun : Goals Obstacles and Stratergy</a:t>
-            </a:r>
-            <a:r>
-              <a:rPr lang="en-GB" baseline="0" dirty="0" smtClean="0"/>
-              <a:t> </a:t>
-            </a:r>
-          </a:p>
-          <a:p>
+            <a:pPr>
+              <a:buFont typeface="Arial" pitchFamily="34" charset="0"/>
+              <a:buChar char="•"/>
+            </a:pPr>
             <a:endParaRPr lang="en-GB" baseline="0" dirty="0" smtClean="0"/>
-          </a:p>
-          <a:p>
-            <a:r>
-              <a:rPr lang="en-GB" dirty="0" smtClean="0"/>
-              <a:t>People fun: Compete, this</a:t>
-            </a:r>
-            <a:r>
-              <a:rPr lang="en-GB" baseline="0" dirty="0" smtClean="0"/>
-              <a:t> creates an amusment emotion </a:t>
-            </a:r>
-          </a:p>
-          <a:p>
-            <a:endParaRPr lang="en-GB" baseline="0" dirty="0" smtClean="0"/>
-          </a:p>
-          <a:p>
-            <a:r>
-              <a:rPr lang="en-GB" baseline="0" dirty="0" smtClean="0"/>
-              <a:t>Serious fun: </a:t>
-            </a:r>
-          </a:p>
-          <a:p>
-            <a:endParaRPr lang="en-GB" baseline="0" dirty="0" smtClean="0"/>
-          </a:p>
-          <a:p>
-            <a:r>
-              <a:rPr lang="en-GB" baseline="0" dirty="0" smtClean="0"/>
-              <a:t>Repition, rythm  this creates excitment </a:t>
-            </a:r>
-            <a:endParaRPr lang="en-GB" dirty="0"/>
           </a:p>
         </p:txBody>
       </p:sp>
@@ -1261,14 +1227,14 @@
               <a:pPr/>
               <a:t>16</a:t>
             </a:fld>
-            <a:endParaRPr lang="en-GB"/>
+            <a:endParaRPr lang="en-GB" dirty="0"/>
           </a:p>
         </p:txBody>
       </p:sp>
     </p:spTree>
     <p:extLst>
       <p:ext uri="{BB962C8B-B14F-4D97-AF65-F5344CB8AC3E}">
-        <p14:creationId xmlns:p14="http://schemas.microsoft.com/office/powerpoint/2010/main" val="2267549056"/>
+        <p14:creationId xmlns:p14="http://schemas.microsoft.com/office/powerpoint/2010/main" val="2389549365"/>
       </p:ext>
     </p:extLst>
   </p:cSld>
@@ -1324,17 +1290,45 @@
           </a:bodyPr>
           <a:lstStyle/>
           <a:p>
-            <a:pPr>
-              <a:buFont typeface="Arial" pitchFamily="34" charset="0"/>
-              <a:buChar char="•"/>
-            </a:pPr>
-            <a:endParaRPr lang="en-GB" dirty="0" smtClean="0"/>
-          </a:p>
-          <a:p>
-            <a:pPr>
-              <a:buFont typeface="Arial" pitchFamily="34" charset="0"/>
-              <a:buChar char="•"/>
-            </a:pPr>
+            <a:r>
+              <a:rPr lang="en-GB" dirty="0" smtClean="0"/>
+              <a:t>Hard fun : Goals Obstacles and Stratergy</a:t>
+            </a:r>
+            <a:r>
+              <a:rPr lang="en-GB" baseline="0" dirty="0" smtClean="0"/>
+              <a:t> </a:t>
+            </a:r>
+          </a:p>
+          <a:p>
+            <a:endParaRPr lang="en-GB" baseline="0" dirty="0" smtClean="0"/>
+          </a:p>
+          <a:p>
+            <a:r>
+              <a:rPr lang="en-GB" dirty="0" smtClean="0"/>
+              <a:t>People fun: Compete, this</a:t>
+            </a:r>
+            <a:r>
+              <a:rPr lang="en-GB" baseline="0" dirty="0" smtClean="0"/>
+              <a:t> creates an amusment emotion </a:t>
+            </a:r>
+          </a:p>
+          <a:p>
+            <a:endParaRPr lang="en-GB" baseline="0" dirty="0" smtClean="0"/>
+          </a:p>
+          <a:p>
+            <a:r>
+              <a:rPr lang="en-GB" baseline="0" dirty="0" smtClean="0"/>
+              <a:t>Serious fun: </a:t>
+            </a:r>
+          </a:p>
+          <a:p>
+            <a:endParaRPr lang="en-GB" baseline="0" dirty="0" smtClean="0"/>
+          </a:p>
+          <a:p>
+            <a:r>
+              <a:rPr lang="en-GB" baseline="0" dirty="0" smtClean="0"/>
+              <a:t>Repition, rythm  this creates excitment </a:t>
+            </a:r>
             <a:endParaRPr lang="en-GB" dirty="0"/>
           </a:p>
         </p:txBody>
@@ -1359,14 +1353,14 @@
               <a:pPr/>
               <a:t>17</a:t>
             </a:fld>
-            <a:endParaRPr lang="en-GB"/>
+            <a:endParaRPr lang="en-GB" dirty="0"/>
           </a:p>
         </p:txBody>
       </p:sp>
     </p:spTree>
     <p:extLst>
       <p:ext uri="{BB962C8B-B14F-4D97-AF65-F5344CB8AC3E}">
-        <p14:creationId xmlns:p14="http://schemas.microsoft.com/office/powerpoint/2010/main" val="3554389044"/>
+        <p14:creationId xmlns:p14="http://schemas.microsoft.com/office/powerpoint/2010/main" val="2267549056"/>
       </p:ext>
     </p:extLst>
   </p:cSld>
@@ -1426,6 +1420,13 @@
               <a:buFont typeface="Arial" pitchFamily="34" charset="0"/>
               <a:buChar char="•"/>
             </a:pPr>
+            <a:endParaRPr lang="en-GB" dirty="0" smtClean="0"/>
+          </a:p>
+          <a:p>
+            <a:pPr>
+              <a:buFont typeface="Arial" pitchFamily="34" charset="0"/>
+              <a:buChar char="•"/>
+            </a:pPr>
             <a:endParaRPr lang="en-GB" dirty="0"/>
           </a:p>
         </p:txBody>
@@ -1450,7 +1451,98 @@
               <a:pPr/>
               <a:t>18</a:t>
             </a:fld>
-            <a:endParaRPr lang="en-GB"/>
+            <a:endParaRPr lang="en-GB" dirty="0"/>
+          </a:p>
+        </p:txBody>
+      </p:sp>
+    </p:spTree>
+    <p:extLst>
+      <p:ext uri="{BB962C8B-B14F-4D97-AF65-F5344CB8AC3E}">
+        <p14:creationId xmlns:p14="http://schemas.microsoft.com/office/powerpoint/2010/main" val="3554389044"/>
+      </p:ext>
+    </p:extLst>
+  </p:cSld>
+  <p:clrMapOvr>
+    <a:masterClrMapping/>
+  </p:clrMapOvr>
+</p:notes>
+</file>
+
+<file path=ppt/notesSlides/notesSlide19.xml><?xml version="1.0" encoding="utf-8"?>
+<p:notes xmlns:a="http://schemas.openxmlformats.org/drawingml/2006/main" xmlns:r="http://schemas.openxmlformats.org/officeDocument/2006/relationships" xmlns:p="http://schemas.openxmlformats.org/presentationml/2006/main">
+  <p:cSld>
+    <p:spTree>
+      <p:nvGrpSpPr>
+        <p:cNvPr id="1" name=""/>
+        <p:cNvGrpSpPr/>
+        <p:nvPr/>
+      </p:nvGrpSpPr>
+      <p:grpSpPr>
+        <a:xfrm>
+          <a:off x="0" y="0"/>
+          <a:ext cx="0" cy="0"/>
+          <a:chOff x="0" y="0"/>
+          <a:chExt cx="0" cy="0"/>
+        </a:xfrm>
+      </p:grpSpPr>
+      <p:sp>
+        <p:nvSpPr>
+          <p:cNvPr id="2" name="Slide Image Placeholder 1"/>
+          <p:cNvSpPr>
+            <a:spLocks noGrp="1" noRot="1" noChangeAspect="1"/>
+          </p:cNvSpPr>
+          <p:nvPr>
+            <p:ph type="sldImg"/>
+          </p:nvPr>
+        </p:nvSpPr>
+        <p:spPr/>
+      </p:sp>
+      <p:sp>
+        <p:nvSpPr>
+          <p:cNvPr id="3" name="Notes Placeholder 2"/>
+          <p:cNvSpPr>
+            <a:spLocks noGrp="1"/>
+          </p:cNvSpPr>
+          <p:nvPr>
+            <p:ph type="body" idx="1"/>
+          </p:nvPr>
+        </p:nvSpPr>
+        <p:spPr/>
+        <p:txBody>
+          <a:bodyPr>
+            <a:normAutofit/>
+          </a:bodyPr>
+          <a:lstStyle/>
+          <a:p>
+            <a:pPr>
+              <a:buFont typeface="Arial" pitchFamily="34" charset="0"/>
+              <a:buChar char="•"/>
+            </a:pPr>
+            <a:endParaRPr lang="en-GB" dirty="0"/>
+          </a:p>
+        </p:txBody>
+      </p:sp>
+      <p:sp>
+        <p:nvSpPr>
+          <p:cNvPr id="4" name="Slide Number Placeholder 3"/>
+          <p:cNvSpPr>
+            <a:spLocks noGrp="1"/>
+          </p:cNvSpPr>
+          <p:nvPr>
+            <p:ph type="sldNum" sz="quarter" idx="10"/>
+          </p:nvPr>
+        </p:nvSpPr>
+        <p:spPr/>
+        <p:txBody>
+          <a:bodyPr/>
+          <a:lstStyle/>
+          <a:p>
+            <a:fld id="{45F5CB74-F2DC-437A-814C-76C01E4A5836}" type="slidenum">
+              <a:rPr lang="en-GB" smtClean="0"/>
+              <a:pPr/>
+              <a:t>19</a:t>
+            </a:fld>
+            <a:endParaRPr lang="en-GB" dirty="0"/>
           </a:p>
         </p:txBody>
       </p:sp>
@@ -1541,7 +1633,7 @@
               <a:pPr/>
               <a:t>2</a:t>
             </a:fld>
-            <a:endParaRPr lang="en-GB"/>
+            <a:endParaRPr lang="en-GB" dirty="0"/>
           </a:p>
         </p:txBody>
       </p:sp>
@@ -1744,7 +1836,7 @@
               <a:pPr/>
               <a:t>3</a:t>
             </a:fld>
-            <a:endParaRPr lang="en-GB"/>
+            <a:endParaRPr lang="en-GB" dirty="0"/>
           </a:p>
         </p:txBody>
       </p:sp>
@@ -1872,7 +1964,7 @@
               <a:pPr/>
               <a:t>4</a:t>
             </a:fld>
-            <a:endParaRPr lang="en-GB"/>
+            <a:endParaRPr lang="en-GB" dirty="0"/>
           </a:p>
         </p:txBody>
       </p:sp>
@@ -2019,7 +2111,7 @@
               <a:pPr/>
               <a:t>5</a:t>
             </a:fld>
-            <a:endParaRPr lang="en-GB"/>
+            <a:endParaRPr lang="en-GB" dirty="0"/>
           </a:p>
         </p:txBody>
       </p:sp>
@@ -2110,7 +2202,7 @@
               <a:pPr/>
               <a:t>6</a:t>
             </a:fld>
-            <a:endParaRPr lang="en-GB"/>
+            <a:endParaRPr lang="en-GB" dirty="0"/>
           </a:p>
         </p:txBody>
       </p:sp>
@@ -2201,7 +2293,7 @@
               <a:pPr/>
               <a:t>7</a:t>
             </a:fld>
-            <a:endParaRPr lang="en-GB"/>
+            <a:endParaRPr lang="en-GB" dirty="0"/>
           </a:p>
         </p:txBody>
       </p:sp>
@@ -2292,7 +2384,7 @@
               <a:pPr/>
               <a:t>8</a:t>
             </a:fld>
-            <a:endParaRPr lang="en-GB"/>
+            <a:endParaRPr lang="en-GB" dirty="0"/>
           </a:p>
         </p:txBody>
       </p:sp>
@@ -2383,7 +2475,7 @@
               <a:pPr/>
               <a:t>9</a:t>
             </a:fld>
-            <a:endParaRPr lang="en-GB"/>
+            <a:endParaRPr lang="en-GB" dirty="0"/>
           </a:p>
         </p:txBody>
       </p:sp>
@@ -2584,7 +2676,7 @@
               <a:pPr/>
               <a:t>31/01/2017</a:t>
             </a:fld>
-            <a:endParaRPr lang="en-GB"/>
+            <a:endParaRPr lang="en-GB" dirty="0"/>
           </a:p>
         </p:txBody>
       </p:sp>
@@ -2603,7 +2695,7 @@
           <a:bodyPr/>
           <a:lstStyle/>
           <a:p>
-            <a:endParaRPr lang="en-GB"/>
+            <a:endParaRPr lang="en-GB" dirty="0"/>
           </a:p>
         </p:txBody>
       </p:sp>
@@ -2627,7 +2719,7 @@
               <a:pPr/>
               <a:t>‹#›</a:t>
             </a:fld>
-            <a:endParaRPr lang="en-GB"/>
+            <a:endParaRPr lang="en-GB" dirty="0"/>
           </a:p>
         </p:txBody>
       </p:sp>
@@ -2751,7 +2843,7 @@
               <a:pPr/>
               <a:t>31/01/2017</a:t>
             </a:fld>
-            <a:endParaRPr lang="en-GB"/>
+            <a:endParaRPr lang="en-GB" dirty="0"/>
           </a:p>
         </p:txBody>
       </p:sp>
@@ -2770,7 +2862,7 @@
           <a:bodyPr/>
           <a:lstStyle/>
           <a:p>
-            <a:endParaRPr lang="en-GB"/>
+            <a:endParaRPr lang="en-GB" dirty="0"/>
           </a:p>
         </p:txBody>
       </p:sp>
@@ -2794,7 +2886,7 @@
               <a:pPr/>
               <a:t>‹#›</a:t>
             </a:fld>
-            <a:endParaRPr lang="en-GB"/>
+            <a:endParaRPr lang="en-GB" dirty="0"/>
           </a:p>
         </p:txBody>
       </p:sp>
@@ -2928,7 +3020,7 @@
               <a:pPr/>
               <a:t>31/01/2017</a:t>
             </a:fld>
-            <a:endParaRPr lang="en-GB"/>
+            <a:endParaRPr lang="en-GB" dirty="0"/>
           </a:p>
         </p:txBody>
       </p:sp>
@@ -2947,7 +3039,7 @@
           <a:bodyPr/>
           <a:lstStyle/>
           <a:p>
-            <a:endParaRPr lang="en-GB"/>
+            <a:endParaRPr lang="en-GB" dirty="0"/>
           </a:p>
         </p:txBody>
       </p:sp>
@@ -2971,7 +3063,7 @@
               <a:pPr/>
               <a:t>‹#›</a:t>
             </a:fld>
-            <a:endParaRPr lang="en-GB"/>
+            <a:endParaRPr lang="en-GB" dirty="0"/>
           </a:p>
         </p:txBody>
       </p:sp>
@@ -3095,7 +3187,7 @@
               <a:pPr/>
               <a:t>31/01/2017</a:t>
             </a:fld>
-            <a:endParaRPr lang="en-GB"/>
+            <a:endParaRPr lang="en-GB" dirty="0"/>
           </a:p>
         </p:txBody>
       </p:sp>
@@ -3114,7 +3206,7 @@
           <a:bodyPr/>
           <a:lstStyle/>
           <a:p>
-            <a:endParaRPr lang="en-GB"/>
+            <a:endParaRPr lang="en-GB" dirty="0"/>
           </a:p>
         </p:txBody>
       </p:sp>
@@ -3138,7 +3230,7 @@
               <a:pPr/>
               <a:t>‹#›</a:t>
             </a:fld>
-            <a:endParaRPr lang="en-GB"/>
+            <a:endParaRPr lang="en-GB" dirty="0"/>
           </a:p>
         </p:txBody>
       </p:sp>
@@ -3338,7 +3430,7 @@
               <a:pPr/>
               <a:t>31/01/2017</a:t>
             </a:fld>
-            <a:endParaRPr lang="en-GB"/>
+            <a:endParaRPr lang="en-GB" dirty="0"/>
           </a:p>
         </p:txBody>
       </p:sp>
@@ -3357,7 +3449,7 @@
           <a:bodyPr/>
           <a:lstStyle/>
           <a:p>
-            <a:endParaRPr lang="en-GB"/>
+            <a:endParaRPr lang="en-GB" dirty="0"/>
           </a:p>
         </p:txBody>
       </p:sp>
@@ -3381,7 +3473,7 @@
               <a:pPr/>
               <a:t>‹#›</a:t>
             </a:fld>
-            <a:endParaRPr lang="en-GB"/>
+            <a:endParaRPr lang="en-GB" dirty="0"/>
           </a:p>
         </p:txBody>
       </p:sp>
@@ -3623,7 +3715,7 @@
               <a:pPr/>
               <a:t>31/01/2017</a:t>
             </a:fld>
-            <a:endParaRPr lang="en-GB"/>
+            <a:endParaRPr lang="en-GB" dirty="0"/>
           </a:p>
         </p:txBody>
       </p:sp>
@@ -3642,7 +3734,7 @@
           <a:bodyPr/>
           <a:lstStyle/>
           <a:p>
-            <a:endParaRPr lang="en-GB"/>
+            <a:endParaRPr lang="en-GB" dirty="0"/>
           </a:p>
         </p:txBody>
       </p:sp>
@@ -3666,7 +3758,7 @@
               <a:pPr/>
               <a:t>‹#›</a:t>
             </a:fld>
-            <a:endParaRPr lang="en-GB"/>
+            <a:endParaRPr lang="en-GB" dirty="0"/>
           </a:p>
         </p:txBody>
       </p:sp>
@@ -4042,7 +4134,7 @@
               <a:pPr/>
               <a:t>31/01/2017</a:t>
             </a:fld>
-            <a:endParaRPr lang="en-GB"/>
+            <a:endParaRPr lang="en-GB" dirty="0"/>
           </a:p>
         </p:txBody>
       </p:sp>
@@ -4061,7 +4153,7 @@
           <a:bodyPr/>
           <a:lstStyle/>
           <a:p>
-            <a:endParaRPr lang="en-GB"/>
+            <a:endParaRPr lang="en-GB" dirty="0"/>
           </a:p>
         </p:txBody>
       </p:sp>
@@ -4085,7 +4177,7 @@
               <a:pPr/>
               <a:t>‹#›</a:t>
             </a:fld>
-            <a:endParaRPr lang="en-GB"/>
+            <a:endParaRPr lang="en-GB" dirty="0"/>
           </a:p>
         </p:txBody>
       </p:sp>
@@ -4157,7 +4249,7 @@
               <a:pPr/>
               <a:t>31/01/2017</a:t>
             </a:fld>
-            <a:endParaRPr lang="en-GB"/>
+            <a:endParaRPr lang="en-GB" dirty="0"/>
           </a:p>
         </p:txBody>
       </p:sp>
@@ -4176,7 +4268,7 @@
           <a:bodyPr/>
           <a:lstStyle/>
           <a:p>
-            <a:endParaRPr lang="en-GB"/>
+            <a:endParaRPr lang="en-GB" dirty="0"/>
           </a:p>
         </p:txBody>
       </p:sp>
@@ -4200,7 +4292,7 @@
               <a:pPr/>
               <a:t>‹#›</a:t>
             </a:fld>
-            <a:endParaRPr lang="en-GB"/>
+            <a:endParaRPr lang="en-GB" dirty="0"/>
           </a:p>
         </p:txBody>
       </p:sp>
@@ -4249,7 +4341,7 @@
               <a:pPr/>
               <a:t>31/01/2017</a:t>
             </a:fld>
-            <a:endParaRPr lang="en-GB"/>
+            <a:endParaRPr lang="en-GB" dirty="0"/>
           </a:p>
         </p:txBody>
       </p:sp>
@@ -4268,7 +4360,7 @@
           <a:bodyPr/>
           <a:lstStyle/>
           <a:p>
-            <a:endParaRPr lang="en-GB"/>
+            <a:endParaRPr lang="en-GB" dirty="0"/>
           </a:p>
         </p:txBody>
       </p:sp>
@@ -4292,7 +4384,7 @@
               <a:pPr/>
               <a:t>‹#›</a:t>
             </a:fld>
-            <a:endParaRPr lang="en-GB"/>
+            <a:endParaRPr lang="en-GB" dirty="0"/>
           </a:p>
         </p:txBody>
       </p:sp>
@@ -4523,7 +4615,7 @@
               <a:pPr/>
               <a:t>31/01/2017</a:t>
             </a:fld>
-            <a:endParaRPr lang="en-GB"/>
+            <a:endParaRPr lang="en-GB" dirty="0"/>
           </a:p>
         </p:txBody>
       </p:sp>
@@ -4542,7 +4634,7 @@
           <a:bodyPr/>
           <a:lstStyle/>
           <a:p>
-            <a:endParaRPr lang="en-GB"/>
+            <a:endParaRPr lang="en-GB" dirty="0"/>
           </a:p>
         </p:txBody>
       </p:sp>
@@ -4566,7 +4658,7 @@
               <a:pPr/>
               <a:t>‹#›</a:t>
             </a:fld>
-            <a:endParaRPr lang="en-GB"/>
+            <a:endParaRPr lang="en-GB" dirty="0"/>
           </a:p>
         </p:txBody>
       </p:sp>
@@ -4684,7 +4776,7 @@
             </a:lvl9pPr>
           </a:lstStyle>
           <a:p>
-            <a:endParaRPr lang="en-GB"/>
+            <a:endParaRPr lang="en-GB" dirty="0"/>
           </a:p>
         </p:txBody>
       </p:sp>
@@ -4773,7 +4865,7 @@
               <a:pPr/>
               <a:t>31/01/2017</a:t>
             </a:fld>
-            <a:endParaRPr lang="en-GB"/>
+            <a:endParaRPr lang="en-GB" dirty="0"/>
           </a:p>
         </p:txBody>
       </p:sp>
@@ -4792,7 +4884,7 @@
           <a:bodyPr/>
           <a:lstStyle/>
           <a:p>
-            <a:endParaRPr lang="en-GB"/>
+            <a:endParaRPr lang="en-GB" dirty="0"/>
           </a:p>
         </p:txBody>
       </p:sp>
@@ -4816,7 +4908,7 @@
               <a:pPr/>
               <a:t>‹#›</a:t>
             </a:fld>
-            <a:endParaRPr lang="en-GB"/>
+            <a:endParaRPr lang="en-GB" dirty="0"/>
           </a:p>
         </p:txBody>
       </p:sp>
@@ -4983,7 +5075,7 @@
               <a:pPr/>
               <a:t>31/01/2017</a:t>
             </a:fld>
-            <a:endParaRPr lang="en-GB"/>
+            <a:endParaRPr lang="en-GB" dirty="0"/>
           </a:p>
         </p:txBody>
       </p:sp>
@@ -5020,7 +5112,7 @@
             </a:lvl1pPr>
           </a:lstStyle>
           <a:p>
-            <a:endParaRPr lang="en-GB"/>
+            <a:endParaRPr lang="en-GB" dirty="0"/>
           </a:p>
         </p:txBody>
       </p:sp>
@@ -5062,7 +5154,7 @@
               <a:pPr/>
               <a:t>‹#›</a:t>
             </a:fld>
-            <a:endParaRPr lang="en-GB"/>
+            <a:endParaRPr lang="en-GB" dirty="0"/>
           </a:p>
         </p:txBody>
       </p:sp>
@@ -6247,7 +6339,7 @@
         <p:spPr>
           <a:xfrm>
             <a:off x="467544" y="620688"/>
-            <a:ext cx="8208912" cy="584775"/>
+            <a:ext cx="8208912" cy="1077218"/>
           </a:xfrm>
           <a:prstGeom prst="rect">
             <a:avLst/>
@@ -6263,97 +6355,29 @@
             <a:pPr algn="ctr"/>
             <a:r>
               <a:rPr lang="en-GB" sz="3200" dirty="0" smtClean="0"/>
-              <a:t>Player roles and actions </a:t>
+              <a:t>C</a:t>
+            </a:r>
+            <a:r>
+              <a:rPr lang="en-GB" sz="3200" dirty="0" smtClean="0"/>
+              <a:t>oncept art </a:t>
+            </a:r>
+          </a:p>
+          <a:p>
+            <a:pPr algn="ctr"/>
+            <a:r>
+              <a:rPr lang="en-GB" sz="3200" dirty="0" smtClean="0"/>
+              <a:t> </a:t>
             </a:r>
             <a:endParaRPr lang="en-GB" sz="3200" dirty="0"/>
           </a:p>
         </p:txBody>
       </p:sp>
-      <p:sp>
-        <p:nvSpPr>
-          <p:cNvPr id="3" name="TextBox 2"/>
-          <p:cNvSpPr txBox="1"/>
-          <p:nvPr/>
-        </p:nvSpPr>
-        <p:spPr>
-          <a:xfrm>
-            <a:off x="683568" y="1556792"/>
-            <a:ext cx="7992888" cy="3416320"/>
-          </a:xfrm>
-          <a:prstGeom prst="rect">
-            <a:avLst/>
-          </a:prstGeom>
-          <a:noFill/>
-        </p:spPr>
-        <p:txBody>
-          <a:bodyPr wrap="square" rtlCol="0">
-            <a:spAutoFit/>
-          </a:bodyPr>
-          <a:lstStyle/>
-          <a:p>
-            <a:pPr>
-              <a:buFont typeface="Arial" pitchFamily="34" charset="0"/>
-              <a:buChar char="•"/>
-            </a:pPr>
-            <a:r>
-              <a:rPr lang="en-GB" sz="2400" dirty="0" smtClean="0"/>
-              <a:t>Main objective: Travel furthest whilst budgeting stamina. </a:t>
-            </a:r>
-          </a:p>
-          <a:p>
-            <a:pPr>
-              <a:buFont typeface="Arial" pitchFamily="34" charset="0"/>
-              <a:buChar char="•"/>
-            </a:pPr>
-            <a:endParaRPr lang="en-GB" sz="2400" dirty="0" smtClean="0"/>
-          </a:p>
-          <a:p>
-            <a:pPr>
-              <a:buFont typeface="Arial" pitchFamily="34" charset="0"/>
-              <a:buChar char="•"/>
-            </a:pPr>
-            <a:r>
-              <a:rPr lang="en-GB" sz="2400" dirty="0" smtClean="0"/>
-              <a:t>Secondary objective: Avoid obstacles which may draw travelled distance to a halt. </a:t>
-            </a:r>
-          </a:p>
-          <a:p>
-            <a:pPr>
-              <a:buFont typeface="Arial" pitchFamily="34" charset="0"/>
-              <a:buChar char="•"/>
-            </a:pPr>
-            <a:endParaRPr lang="en-GB" sz="2400" dirty="0" smtClean="0"/>
-          </a:p>
-          <a:p>
-            <a:pPr>
-              <a:buFont typeface="Arial" pitchFamily="34" charset="0"/>
-              <a:buChar char="•"/>
-            </a:pPr>
-            <a:r>
-              <a:rPr lang="en-GB" sz="2400" dirty="0" smtClean="0"/>
-              <a:t>Players thrust using a twich mechanic. </a:t>
-            </a:r>
-          </a:p>
-          <a:p>
-            <a:pPr>
-              <a:buFont typeface="Arial" pitchFamily="34" charset="0"/>
-              <a:buChar char="•"/>
-            </a:pPr>
-            <a:endParaRPr lang="en-GB" sz="2400" dirty="0" smtClean="0"/>
-          </a:p>
-          <a:p>
-            <a:pPr>
-              <a:buFont typeface="Arial" pitchFamily="34" charset="0"/>
-              <a:buChar char="•"/>
-            </a:pPr>
-            <a:r>
-              <a:rPr lang="en-GB" sz="2400" dirty="0" smtClean="0"/>
-              <a:t>Working with trajectory, momentum and budgeting stamina allows for a strategic play. </a:t>
-            </a:r>
-          </a:p>
-        </p:txBody>
-      </p:sp>
     </p:spTree>
+    <p:extLst>
+      <p:ext uri="{BB962C8B-B14F-4D97-AF65-F5344CB8AC3E}">
+        <p14:creationId xmlns:p14="http://schemas.microsoft.com/office/powerpoint/2010/main" val="514150301"/>
+      </p:ext>
+    </p:extLst>
   </p:cSld>
   <p:clrMapOvr>
     <a:masterClrMapping/>
@@ -6410,7 +6434,7 @@
             <a:pPr algn="ctr"/>
             <a:r>
               <a:rPr lang="en-GB" sz="3200" dirty="0" smtClean="0"/>
-              <a:t>Development specifications</a:t>
+              <a:t>Player roles and actions </a:t>
             </a:r>
             <a:endParaRPr lang="en-GB" sz="3200" dirty="0"/>
           </a:p>
@@ -6425,7 +6449,7 @@
         <p:spPr>
           <a:xfrm>
             <a:off x="683568" y="1556792"/>
-            <a:ext cx="7992888" cy="2308324"/>
+            <a:ext cx="7992888" cy="3416320"/>
           </a:xfrm>
           <a:prstGeom prst="rect">
             <a:avLst/>
@@ -6444,7 +6468,7 @@
             </a:pPr>
             <a:r>
               <a:rPr lang="en-GB" sz="2400" dirty="0" smtClean="0"/>
-              <a:t>Unity 2D </a:t>
+              <a:t>Main objective: Travel furthest whilst budgeting stamina. </a:t>
             </a:r>
           </a:p>
           <a:p>
@@ -6461,23 +6485,7 @@
             </a:pPr>
             <a:r>
               <a:rPr lang="en-GB" sz="2400" dirty="0" smtClean="0"/>
-              <a:t>MonoDevelop / Visual studios</a:t>
-            </a:r>
-          </a:p>
-          <a:p>
-            <a:r>
-              <a:rPr lang="en-GB" sz="2400" dirty="0" smtClean="0"/>
-              <a:t>  </a:t>
-            </a:r>
-          </a:p>
-          <a:p>
-            <a:pPr>
-              <a:buFont typeface="Arial" pitchFamily="34" charset="0"/>
-              <a:buChar char="•"/>
-            </a:pPr>
-            <a:r>
-              <a:rPr lang="en-GB" sz="2400" dirty="0" smtClean="0"/>
-              <a:t>Photoshop </a:t>
+              <a:t>Secondary objective: Avoid obstacles which may draw travelled distance to a halt. </a:t>
             </a:r>
           </a:p>
           <a:p>
@@ -6486,6 +6494,33 @@
               <a:buChar char="•"/>
             </a:pPr>
             <a:endParaRPr lang="en-GB" sz="2400" dirty="0" smtClean="0"/>
+          </a:p>
+          <a:p>
+            <a:pPr>
+              <a:buFont typeface="Arial" pitchFamily="34" charset="0"/>
+              <a:buChar char="•"/>
+            </a:pPr>
+            <a:r>
+              <a:rPr lang="en-GB" sz="2400" dirty="0" smtClean="0"/>
+              <a:t>Players thrust using a twich mechanic. </a:t>
+            </a:r>
+          </a:p>
+          <a:p>
+            <a:pPr>
+              <a:buFont typeface="Arial" pitchFamily="34" charset="0"/>
+              <a:buChar char="•"/>
+            </a:pPr>
+            <a:endParaRPr lang="en-GB" sz="2400" dirty="0" smtClean="0"/>
+          </a:p>
+          <a:p>
+            <a:pPr>
+              <a:buFont typeface="Arial" pitchFamily="34" charset="0"/>
+              <a:buChar char="•"/>
+            </a:pPr>
+            <a:r>
+              <a:rPr lang="en-GB" sz="2400" dirty="0" smtClean="0"/>
+              <a:t>Working with trajectory, momentum and budgeting stamina allows for a strategic play. </a:t>
+            </a:r>
           </a:p>
         </p:txBody>
       </p:sp>
@@ -6523,6 +6558,142 @@
       </p:grpSpPr>
       <p:sp>
         <p:nvSpPr>
+          <p:cNvPr id="4" name="TextBox 3"/>
+          <p:cNvSpPr txBox="1"/>
+          <p:nvPr/>
+        </p:nvSpPr>
+        <p:spPr>
+          <a:xfrm>
+            <a:off x="467544" y="620688"/>
+            <a:ext cx="8208912" cy="584775"/>
+          </a:xfrm>
+          <a:prstGeom prst="rect">
+            <a:avLst/>
+          </a:prstGeom>
+          <a:noFill/>
+        </p:spPr>
+        <p:txBody>
+          <a:bodyPr wrap="square" rtlCol="0">
+            <a:spAutoFit/>
+          </a:bodyPr>
+          <a:lstStyle/>
+          <a:p>
+            <a:pPr algn="ctr"/>
+            <a:r>
+              <a:rPr lang="en-GB" sz="3200" dirty="0" smtClean="0"/>
+              <a:t>Development specifications</a:t>
+            </a:r>
+            <a:endParaRPr lang="en-GB" sz="3200" dirty="0"/>
+          </a:p>
+        </p:txBody>
+      </p:sp>
+      <p:sp>
+        <p:nvSpPr>
+          <p:cNvPr id="3" name="TextBox 2"/>
+          <p:cNvSpPr txBox="1"/>
+          <p:nvPr/>
+        </p:nvSpPr>
+        <p:spPr>
+          <a:xfrm>
+            <a:off x="683568" y="1556792"/>
+            <a:ext cx="7992888" cy="2308324"/>
+          </a:xfrm>
+          <a:prstGeom prst="rect">
+            <a:avLst/>
+          </a:prstGeom>
+          <a:noFill/>
+        </p:spPr>
+        <p:txBody>
+          <a:bodyPr wrap="square" rtlCol="0">
+            <a:spAutoFit/>
+          </a:bodyPr>
+          <a:lstStyle/>
+          <a:p>
+            <a:pPr>
+              <a:buFont typeface="Arial" pitchFamily="34" charset="0"/>
+              <a:buChar char="•"/>
+            </a:pPr>
+            <a:r>
+              <a:rPr lang="en-GB" sz="2400" dirty="0" smtClean="0"/>
+              <a:t>Unity 2D </a:t>
+            </a:r>
+          </a:p>
+          <a:p>
+            <a:pPr>
+              <a:buFont typeface="Arial" pitchFamily="34" charset="0"/>
+              <a:buChar char="•"/>
+            </a:pPr>
+            <a:endParaRPr lang="en-GB" sz="2400" dirty="0" smtClean="0"/>
+          </a:p>
+          <a:p>
+            <a:pPr>
+              <a:buFont typeface="Arial" pitchFamily="34" charset="0"/>
+              <a:buChar char="•"/>
+            </a:pPr>
+            <a:r>
+              <a:rPr lang="en-GB" sz="2400" dirty="0" smtClean="0"/>
+              <a:t>MonoDevelop / Visual studios</a:t>
+            </a:r>
+          </a:p>
+          <a:p>
+            <a:r>
+              <a:rPr lang="en-GB" sz="2400" dirty="0" smtClean="0"/>
+              <a:t>  </a:t>
+            </a:r>
+          </a:p>
+          <a:p>
+            <a:pPr>
+              <a:buFont typeface="Arial" pitchFamily="34" charset="0"/>
+              <a:buChar char="•"/>
+            </a:pPr>
+            <a:r>
+              <a:rPr lang="en-GB" sz="2400" dirty="0" smtClean="0"/>
+              <a:t>Photoshop </a:t>
+            </a:r>
+          </a:p>
+          <a:p>
+            <a:pPr>
+              <a:buFont typeface="Arial" pitchFamily="34" charset="0"/>
+              <a:buChar char="•"/>
+            </a:pPr>
+            <a:endParaRPr lang="en-GB" sz="2400" dirty="0" smtClean="0"/>
+          </a:p>
+        </p:txBody>
+      </p:sp>
+    </p:spTree>
+  </p:cSld>
+  <p:clrMapOvr>
+    <a:masterClrMapping/>
+  </p:clrMapOvr>
+  <p:timing>
+    <p:tnLst>
+      <p:par>
+        <p:cTn id="1" dur="indefinite" restart="never" nodeType="tmRoot"/>
+      </p:par>
+    </p:tnLst>
+  </p:timing>
+</p:sld>
+</file>
+
+<file path=ppt/slides/slide17.xml><?xml version="1.0" encoding="utf-8"?>
+<p:sld xmlns:a="http://schemas.openxmlformats.org/drawingml/2006/main" xmlns:r="http://schemas.openxmlformats.org/officeDocument/2006/relationships" xmlns:p="http://schemas.openxmlformats.org/presentationml/2006/main">
+  <p:cSld>
+    <p:spTree>
+      <p:nvGrpSpPr>
+        <p:cNvPr id="1" name=""/>
+        <p:cNvGrpSpPr/>
+        <p:nvPr/>
+      </p:nvGrpSpPr>
+      <p:grpSpPr>
+        <a:xfrm>
+          <a:off x="0" y="0"/>
+          <a:ext cx="0" cy="0"/>
+          <a:chOff x="0" y="0"/>
+          <a:chExt cx="0" cy="0"/>
+        </a:xfrm>
+      </p:grpSpPr>
+      <p:sp>
+        <p:nvSpPr>
           <p:cNvPr id="2" name="Title 1"/>
           <p:cNvSpPr>
             <a:spLocks noGrp="1"/>
@@ -6707,7 +6878,7 @@
 </p:sld>
 </file>
 
-<file path=ppt/slides/slide17.xml><?xml version="1.0" encoding="utf-8"?>
+<file path=ppt/slides/slide18.xml><?xml version="1.0" encoding="utf-8"?>
 <p:sld xmlns:a="http://schemas.openxmlformats.org/drawingml/2006/main" xmlns:r="http://schemas.openxmlformats.org/officeDocument/2006/relationships" xmlns:p="http://schemas.openxmlformats.org/presentationml/2006/main">
   <p:cSld>
     <p:spTree>
@@ -6824,7 +6995,7 @@
           <a:lstStyle/>
           <a:p>
             <a:pPr algn="ctr"/>
-            <a:endParaRPr lang="en-GB"/>
+            <a:endParaRPr lang="en-GB" dirty="0"/>
           </a:p>
         </p:txBody>
       </p:sp>
@@ -6895,7 +7066,7 @@
           <a:lstStyle/>
           <a:p>
             <a:pPr algn="ctr"/>
-            <a:endParaRPr lang="en-GB"/>
+            <a:endParaRPr lang="en-GB" dirty="0"/>
           </a:p>
         </p:txBody>
       </p:sp>
@@ -6935,7 +7106,7 @@
           <a:lstStyle/>
           <a:p>
             <a:pPr algn="ctr"/>
-            <a:endParaRPr lang="en-GB"/>
+            <a:endParaRPr lang="en-GB" dirty="0"/>
           </a:p>
         </p:txBody>
       </p:sp>
@@ -7189,7 +7360,7 @@
 </p:sld>
 </file>
 
-<file path=ppt/slides/slide18.xml><?xml version="1.0" encoding="utf-8"?>
+<file path=ppt/slides/slide19.xml><?xml version="1.0" encoding="utf-8"?>
 <p:sld xmlns:a="http://schemas.openxmlformats.org/drawingml/2006/main" xmlns:r="http://schemas.openxmlformats.org/officeDocument/2006/relationships" xmlns:p="http://schemas.openxmlformats.org/presentationml/2006/main">
   <p:cSld>
     <p:spTree>
@@ -7743,7 +7914,13 @@
           <p:cNvGraphicFramePr>
             <a:graphicFrameLocks noGrp="1"/>
           </p:cNvGraphicFramePr>
-          <p:nvPr/>
+          <p:nvPr>
+            <p:extLst>
+              <p:ext uri="{D42A27DB-BD31-4B8C-83A1-F6EECF244321}">
+                <p14:modId xmlns:p14="http://schemas.microsoft.com/office/powerpoint/2010/main" val="704878679"/>
+              </p:ext>
+            </p:extLst>
+          </p:nvPr>
         </p:nvGraphicFramePr>
         <p:xfrm>
           <a:off x="1524000" y="1397000"/>
@@ -7927,11 +8104,15 @@
                     <a:p>
                       <a:r>
                         <a:rPr lang="en-GB" dirty="0" smtClean="0"/>
-                        <a:t>Platyform</a:t>
+                        <a:t>Platform</a:t>
                       </a:r>
                       <a:r>
                         <a:rPr lang="en-GB" baseline="0" dirty="0" smtClean="0"/>
-                        <a:t> Specs: </a:t>
+                        <a:t> </a:t>
+                      </a:r>
+                      <a:r>
+                        <a:rPr lang="en-GB" baseline="0" dirty="0" smtClean="0"/>
+                        <a:t>Specs: </a:t>
                       </a:r>
                       <a:endParaRPr lang="en-GB" dirty="0"/>
                     </a:p>
@@ -8430,7 +8611,11 @@
             <a:pPr algn="ctr"/>
             <a:r>
               <a:rPr lang="en-GB" sz="3200" dirty="0" smtClean="0"/>
-              <a:t>Moodboards and concpet </a:t>
+              <a:t>Moodboards and </a:t>
+            </a:r>
+            <a:r>
+              <a:rPr lang="en-GB" sz="3200" dirty="0" smtClean="0"/>
+              <a:t>concept </a:t>
             </a:r>
             <a:endParaRPr lang="en-GB" sz="3200" dirty="0"/>
           </a:p>
@@ -8523,7 +8708,11 @@
             <a:pPr algn="ctr"/>
             <a:r>
               <a:rPr lang="en-GB" sz="3200" dirty="0" smtClean="0"/>
-              <a:t>Moodboards and concpet </a:t>
+              <a:t>Moodboards and </a:t>
+            </a:r>
+            <a:r>
+              <a:rPr lang="en-GB" sz="3200" dirty="0" smtClean="0"/>
+              <a:t>concept </a:t>
             </a:r>
             <a:endParaRPr lang="en-GB" sz="3200" dirty="0"/>
           </a:p>
@@ -8621,7 +8810,11 @@
             <a:pPr algn="ctr"/>
             <a:r>
               <a:rPr lang="en-GB" sz="3200" dirty="0" smtClean="0"/>
-              <a:t>Moodboards and concpet </a:t>
+              <a:t>Moodboards and </a:t>
+            </a:r>
+            <a:r>
+              <a:rPr lang="en-GB" sz="3200" dirty="0" smtClean="0"/>
+              <a:t>concept </a:t>
             </a:r>
             <a:endParaRPr lang="en-GB" sz="3200" dirty="0"/>
           </a:p>

</xml_diff>

<commit_message>
Ammended presentation and meeting errors
</commit_message>
<xml_diff>
--- a/Presentation/Pitch Presentation_Group 19.pptx
+++ b/Presentation/Pitch Presentation_Group 19.pptx
@@ -5,7 +5,7 @@
     <p:sldMasterId id="2147483672" r:id="rId1"/>
   </p:sldMasterIdLst>
   <p:notesMasterIdLst>
-    <p:notesMasterId r:id="rId21"/>
+    <p:notesMasterId r:id="rId19"/>
   </p:notesMasterIdLst>
   <p:sldIdLst>
     <p:sldId id="256" r:id="rId2"/>
@@ -15,18 +15,16 @@
     <p:sldId id="270" r:id="rId6"/>
     <p:sldId id="285" r:id="rId7"/>
     <p:sldId id="290" r:id="rId8"/>
-    <p:sldId id="291" r:id="rId9"/>
-    <p:sldId id="279" r:id="rId10"/>
-    <p:sldId id="280" r:id="rId11"/>
-    <p:sldId id="283" r:id="rId12"/>
-    <p:sldId id="284" r:id="rId13"/>
-    <p:sldId id="287" r:id="rId14"/>
-    <p:sldId id="292" r:id="rId15"/>
-    <p:sldId id="286" r:id="rId16"/>
-    <p:sldId id="288" r:id="rId17"/>
-    <p:sldId id="276" r:id="rId18"/>
-    <p:sldId id="274" r:id="rId19"/>
-    <p:sldId id="289" r:id="rId20"/>
+    <p:sldId id="279" r:id="rId9"/>
+    <p:sldId id="280" r:id="rId10"/>
+    <p:sldId id="283" r:id="rId11"/>
+    <p:sldId id="284" r:id="rId12"/>
+    <p:sldId id="287" r:id="rId13"/>
+    <p:sldId id="286" r:id="rId14"/>
+    <p:sldId id="288" r:id="rId15"/>
+    <p:sldId id="276" r:id="rId16"/>
+    <p:sldId id="274" r:id="rId17"/>
+    <p:sldId id="291" r:id="rId18"/>
   </p:sldIdLst>
   <p:sldSz cx="9144000" cy="6858000" type="screen4x3"/>
   <p:notesSz cx="6858000" cy="9144000"/>
@@ -928,7 +926,7 @@
           <a:p>
             <a:pPr>
               <a:buFont typeface="Arial" pitchFamily="34" charset="0"/>
-              <a:buNone/>
+              <a:buChar char="•"/>
             </a:pPr>
             <a:endParaRPr lang="en-GB" baseline="0" dirty="0" smtClean="0"/>
           </a:p>
@@ -1052,7 +1050,7 @@
     </p:spTree>
     <p:extLst>
       <p:ext uri="{BB962C8B-B14F-4D97-AF65-F5344CB8AC3E}">
-        <p14:creationId xmlns:p14="http://schemas.microsoft.com/office/powerpoint/2010/main" val="3933218464"/>
+        <p14:creationId xmlns:p14="http://schemas.microsoft.com/office/powerpoint/2010/main" val="2389549365"/>
       </p:ext>
     </p:extLst>
   </p:cSld>
@@ -1108,11 +1106,40 @@
           </a:bodyPr>
           <a:lstStyle/>
           <a:p>
-            <a:pPr>
-              <a:buFont typeface="Arial" pitchFamily="34" charset="0"/>
-              <a:buChar char="•"/>
-            </a:pPr>
-            <a:endParaRPr lang="en-GB" baseline="0" dirty="0" smtClean="0"/>
+            <a:r>
+              <a:rPr lang="en-GB" dirty="0" smtClean="0"/>
+              <a:t>Hard fun: Goals Obstacles and Strategy </a:t>
+            </a:r>
+          </a:p>
+          <a:p>
+            <a:endParaRPr lang="en-GB" dirty="0" smtClean="0"/>
+          </a:p>
+          <a:p>
+            <a:r>
+              <a:rPr lang="en-GB" dirty="0" smtClean="0"/>
+              <a:t>People fun: Compete, this creates an amusement emotion </a:t>
+            </a:r>
+          </a:p>
+          <a:p>
+            <a:endParaRPr lang="en-GB" dirty="0" smtClean="0"/>
+          </a:p>
+          <a:p>
+            <a:r>
+              <a:rPr lang="en-GB" dirty="0" smtClean="0"/>
+              <a:t>Serious fun: </a:t>
+            </a:r>
+          </a:p>
+          <a:p>
+            <a:endParaRPr lang="en-GB" dirty="0" smtClean="0"/>
+          </a:p>
+          <a:p>
+            <a:r>
+              <a:rPr lang="en-GB" dirty="0" smtClean="0"/>
+              <a:t>Repetition, rhythm  this creates excitement </a:t>
+            </a:r>
+          </a:p>
+          <a:p>
+            <a:endParaRPr lang="en-GB" dirty="0"/>
           </a:p>
         </p:txBody>
       </p:sp>
@@ -1143,7 +1170,7 @@
     </p:spTree>
     <p:extLst>
       <p:ext uri="{BB962C8B-B14F-4D97-AF65-F5344CB8AC3E}">
-        <p14:creationId xmlns:p14="http://schemas.microsoft.com/office/powerpoint/2010/main" val="2389549365"/>
+        <p14:creationId xmlns:p14="http://schemas.microsoft.com/office/powerpoint/2010/main" val="2267549056"/>
       </p:ext>
     </p:extLst>
   </p:cSld>
@@ -1203,7 +1230,14 @@
               <a:buFont typeface="Arial" pitchFamily="34" charset="0"/>
               <a:buChar char="•"/>
             </a:pPr>
-            <a:endParaRPr lang="en-GB" baseline="0" dirty="0" smtClean="0"/>
+            <a:endParaRPr lang="en-GB" dirty="0" smtClean="0"/>
+          </a:p>
+          <a:p>
+            <a:pPr>
+              <a:buFont typeface="Arial" pitchFamily="34" charset="0"/>
+              <a:buChar char="•"/>
+            </a:pPr>
+            <a:endParaRPr lang="en-GB" dirty="0"/>
           </a:p>
         </p:txBody>
       </p:sp>
@@ -1234,7 +1268,7 @@
     </p:spTree>
     <p:extLst>
       <p:ext uri="{BB962C8B-B14F-4D97-AF65-F5344CB8AC3E}">
-        <p14:creationId xmlns:p14="http://schemas.microsoft.com/office/powerpoint/2010/main" val="2389549365"/>
+        <p14:creationId xmlns:p14="http://schemas.microsoft.com/office/powerpoint/2010/main" val="3554389044"/>
       </p:ext>
     </p:extLst>
   </p:cSld>
@@ -1290,45 +1324,10 @@
           </a:bodyPr>
           <a:lstStyle/>
           <a:p>
-            <a:r>
-              <a:rPr lang="en-GB" dirty="0" smtClean="0"/>
-              <a:t>Hard fun : Goals Obstacles and Stratergy</a:t>
-            </a:r>
-            <a:r>
-              <a:rPr lang="en-GB" baseline="0" dirty="0" smtClean="0"/>
-              <a:t> </a:t>
-            </a:r>
-          </a:p>
-          <a:p>
-            <a:endParaRPr lang="en-GB" baseline="0" dirty="0" smtClean="0"/>
-          </a:p>
-          <a:p>
-            <a:r>
-              <a:rPr lang="en-GB" dirty="0" smtClean="0"/>
-              <a:t>People fun: Compete, this</a:t>
-            </a:r>
-            <a:r>
-              <a:rPr lang="en-GB" baseline="0" dirty="0" smtClean="0"/>
-              <a:t> creates an amusment emotion </a:t>
-            </a:r>
-          </a:p>
-          <a:p>
-            <a:endParaRPr lang="en-GB" baseline="0" dirty="0" smtClean="0"/>
-          </a:p>
-          <a:p>
-            <a:r>
-              <a:rPr lang="en-GB" baseline="0" dirty="0" smtClean="0"/>
-              <a:t>Serious fun: </a:t>
-            </a:r>
-          </a:p>
-          <a:p>
-            <a:endParaRPr lang="en-GB" baseline="0" dirty="0" smtClean="0"/>
-          </a:p>
-          <a:p>
-            <a:r>
-              <a:rPr lang="en-GB" baseline="0" dirty="0" smtClean="0"/>
-              <a:t>Repition, rythm  this creates excitment </a:t>
-            </a:r>
+            <a:pPr>
+              <a:buFont typeface="Arial" pitchFamily="34" charset="0"/>
+              <a:buChar char="•"/>
+            </a:pPr>
             <a:endParaRPr lang="en-GB" dirty="0"/>
           </a:p>
         </p:txBody>
@@ -1360,196 +1359,7 @@
     </p:spTree>
     <p:extLst>
       <p:ext uri="{BB962C8B-B14F-4D97-AF65-F5344CB8AC3E}">
-        <p14:creationId xmlns:p14="http://schemas.microsoft.com/office/powerpoint/2010/main" val="2267549056"/>
-      </p:ext>
-    </p:extLst>
-  </p:cSld>
-  <p:clrMapOvr>
-    <a:masterClrMapping/>
-  </p:clrMapOvr>
-</p:notes>
-</file>
-
-<file path=ppt/notesSlides/notesSlide18.xml><?xml version="1.0" encoding="utf-8"?>
-<p:notes xmlns:a="http://schemas.openxmlformats.org/drawingml/2006/main" xmlns:r="http://schemas.openxmlformats.org/officeDocument/2006/relationships" xmlns:p="http://schemas.openxmlformats.org/presentationml/2006/main">
-  <p:cSld>
-    <p:spTree>
-      <p:nvGrpSpPr>
-        <p:cNvPr id="1" name=""/>
-        <p:cNvGrpSpPr/>
-        <p:nvPr/>
-      </p:nvGrpSpPr>
-      <p:grpSpPr>
-        <a:xfrm>
-          <a:off x="0" y="0"/>
-          <a:ext cx="0" cy="0"/>
-          <a:chOff x="0" y="0"/>
-          <a:chExt cx="0" cy="0"/>
-        </a:xfrm>
-      </p:grpSpPr>
-      <p:sp>
-        <p:nvSpPr>
-          <p:cNvPr id="2" name="Slide Image Placeholder 1"/>
-          <p:cNvSpPr>
-            <a:spLocks noGrp="1" noRot="1" noChangeAspect="1"/>
-          </p:cNvSpPr>
-          <p:nvPr>
-            <p:ph type="sldImg"/>
-          </p:nvPr>
-        </p:nvSpPr>
-        <p:spPr/>
-      </p:sp>
-      <p:sp>
-        <p:nvSpPr>
-          <p:cNvPr id="3" name="Notes Placeholder 2"/>
-          <p:cNvSpPr>
-            <a:spLocks noGrp="1"/>
-          </p:cNvSpPr>
-          <p:nvPr>
-            <p:ph type="body" idx="1"/>
-          </p:nvPr>
-        </p:nvSpPr>
-        <p:spPr/>
-        <p:txBody>
-          <a:bodyPr>
-            <a:normAutofit/>
-          </a:bodyPr>
-          <a:lstStyle/>
-          <a:p>
-            <a:pPr>
-              <a:buFont typeface="Arial" pitchFamily="34" charset="0"/>
-              <a:buChar char="•"/>
-            </a:pPr>
-            <a:endParaRPr lang="en-GB" dirty="0" smtClean="0"/>
-          </a:p>
-          <a:p>
-            <a:pPr>
-              <a:buFont typeface="Arial" pitchFamily="34" charset="0"/>
-              <a:buChar char="•"/>
-            </a:pPr>
-            <a:endParaRPr lang="en-GB" dirty="0"/>
-          </a:p>
-        </p:txBody>
-      </p:sp>
-      <p:sp>
-        <p:nvSpPr>
-          <p:cNvPr id="4" name="Slide Number Placeholder 3"/>
-          <p:cNvSpPr>
-            <a:spLocks noGrp="1"/>
-          </p:cNvSpPr>
-          <p:nvPr>
-            <p:ph type="sldNum" sz="quarter" idx="10"/>
-          </p:nvPr>
-        </p:nvSpPr>
-        <p:spPr/>
-        <p:txBody>
-          <a:bodyPr/>
-          <a:lstStyle/>
-          <a:p>
-            <a:fld id="{45F5CB74-F2DC-437A-814C-76C01E4A5836}" type="slidenum">
-              <a:rPr lang="en-GB" smtClean="0"/>
-              <a:pPr/>
-              <a:t>18</a:t>
-            </a:fld>
-            <a:endParaRPr lang="en-GB" dirty="0"/>
-          </a:p>
-        </p:txBody>
-      </p:sp>
-    </p:spTree>
-    <p:extLst>
-      <p:ext uri="{BB962C8B-B14F-4D97-AF65-F5344CB8AC3E}">
-        <p14:creationId xmlns:p14="http://schemas.microsoft.com/office/powerpoint/2010/main" val="3554389044"/>
-      </p:ext>
-    </p:extLst>
-  </p:cSld>
-  <p:clrMapOvr>
-    <a:masterClrMapping/>
-  </p:clrMapOvr>
-</p:notes>
-</file>
-
-<file path=ppt/notesSlides/notesSlide19.xml><?xml version="1.0" encoding="utf-8"?>
-<p:notes xmlns:a="http://schemas.openxmlformats.org/drawingml/2006/main" xmlns:r="http://schemas.openxmlformats.org/officeDocument/2006/relationships" xmlns:p="http://schemas.openxmlformats.org/presentationml/2006/main">
-  <p:cSld>
-    <p:spTree>
-      <p:nvGrpSpPr>
-        <p:cNvPr id="1" name=""/>
-        <p:cNvGrpSpPr/>
-        <p:nvPr/>
-      </p:nvGrpSpPr>
-      <p:grpSpPr>
-        <a:xfrm>
-          <a:off x="0" y="0"/>
-          <a:ext cx="0" cy="0"/>
-          <a:chOff x="0" y="0"/>
-          <a:chExt cx="0" cy="0"/>
-        </a:xfrm>
-      </p:grpSpPr>
-      <p:sp>
-        <p:nvSpPr>
-          <p:cNvPr id="2" name="Slide Image Placeholder 1"/>
-          <p:cNvSpPr>
-            <a:spLocks noGrp="1" noRot="1" noChangeAspect="1"/>
-          </p:cNvSpPr>
-          <p:nvPr>
-            <p:ph type="sldImg"/>
-          </p:nvPr>
-        </p:nvSpPr>
-        <p:spPr/>
-      </p:sp>
-      <p:sp>
-        <p:nvSpPr>
-          <p:cNvPr id="3" name="Notes Placeholder 2"/>
-          <p:cNvSpPr>
-            <a:spLocks noGrp="1"/>
-          </p:cNvSpPr>
-          <p:nvPr>
-            <p:ph type="body" idx="1"/>
-          </p:nvPr>
-        </p:nvSpPr>
-        <p:spPr/>
-        <p:txBody>
-          <a:bodyPr>
-            <a:normAutofit/>
-          </a:bodyPr>
-          <a:lstStyle/>
-          <a:p>
-            <a:pPr>
-              <a:buFont typeface="Arial" pitchFamily="34" charset="0"/>
-              <a:buChar char="•"/>
-            </a:pPr>
-            <a:endParaRPr lang="en-GB" dirty="0"/>
-          </a:p>
-        </p:txBody>
-      </p:sp>
-      <p:sp>
-        <p:nvSpPr>
-          <p:cNvPr id="4" name="Slide Number Placeholder 3"/>
-          <p:cNvSpPr>
-            <a:spLocks noGrp="1"/>
-          </p:cNvSpPr>
-          <p:nvPr>
-            <p:ph type="sldNum" sz="quarter" idx="10"/>
-          </p:nvPr>
-        </p:nvSpPr>
-        <p:spPr/>
-        <p:txBody>
-          <a:bodyPr/>
-          <a:lstStyle/>
-          <a:p>
-            <a:fld id="{45F5CB74-F2DC-437A-814C-76C01E4A5836}" type="slidenum">
-              <a:rPr lang="en-GB" smtClean="0"/>
-              <a:pPr/>
-              <a:t>19</a:t>
-            </a:fld>
-            <a:endParaRPr lang="en-GB" dirty="0"/>
-          </a:p>
-        </p:txBody>
-      </p:sp>
-    </p:spTree>
-    <p:extLst>
-      <p:ext uri="{BB962C8B-B14F-4D97-AF65-F5344CB8AC3E}">
-        <p14:creationId xmlns:p14="http://schemas.microsoft.com/office/powerpoint/2010/main" val="1312158051"/>
+        <p14:creationId xmlns:p14="http://schemas.microsoft.com/office/powerpoint/2010/main" val="2847181239"/>
       </p:ext>
     </p:extLst>
   </p:cSld>
@@ -1698,112 +1508,7 @@
           <a:p>
             <a:pPr>
               <a:buFont typeface="Arial" pitchFamily="34" charset="0"/>
-              <a:buChar char="•"/>
-            </a:pPr>
-            <a:r>
-              <a:rPr lang="en-GB" dirty="0" smtClean="0"/>
-              <a:t>Before</a:t>
-            </a:r>
-            <a:r>
-              <a:rPr lang="en-GB" baseline="0" dirty="0" smtClean="0"/>
-              <a:t> we begin, here is a breif run through of iur market overview/game specs. </a:t>
-            </a:r>
-          </a:p>
-          <a:p>
-            <a:pPr>
-              <a:buFont typeface="Arial" pitchFamily="34" charset="0"/>
-              <a:buChar char="•"/>
-            </a:pPr>
-            <a:endParaRPr lang="en-GB" baseline="0" dirty="0"/>
-          </a:p>
-          <a:p>
-            <a:pPr>
-              <a:buFont typeface="Arial" pitchFamily="34" charset="0"/>
-              <a:buChar char="•"/>
-            </a:pPr>
-            <a:r>
-              <a:rPr lang="en-GB" baseline="0" dirty="0" smtClean="0"/>
-              <a:t>Projected demographic: We are targeting our game off the succes of the games such as angry birds. The game will be geared towrads uchildren of both genders from 7 and up, although the game is also open to a universal audience. </a:t>
-            </a:r>
-          </a:p>
-          <a:p>
-            <a:pPr>
-              <a:buFont typeface="Arial" pitchFamily="34" charset="0"/>
-              <a:buChar char="•"/>
-            </a:pPr>
-            <a:r>
-              <a:rPr lang="en-GB" baseline="0" dirty="0" smtClean="0"/>
-              <a:t>This is because ethe game will induct simple to learn mechanics that will still pose as a challenge to master. </a:t>
-            </a:r>
-          </a:p>
-          <a:p>
-            <a:pPr>
-              <a:buFont typeface="Arial" pitchFamily="34" charset="0"/>
-              <a:buChar char="•"/>
-            </a:pPr>
-            <a:endParaRPr lang="en-GB" baseline="0" dirty="0" smtClean="0"/>
-          </a:p>
-          <a:p>
-            <a:pPr>
-              <a:buFont typeface="Arial" pitchFamily="34" charset="0"/>
-              <a:buChar char="•"/>
-            </a:pPr>
-            <a:r>
-              <a:rPr lang="en-GB" baseline="0" dirty="0" smtClean="0"/>
-              <a:t>The genre of our game is something we dubbed; Tripple A. </a:t>
-            </a:r>
-          </a:p>
-          <a:p>
-            <a:pPr>
-              <a:buFont typeface="Arial" pitchFamily="34" charset="0"/>
-              <a:buChar char="•"/>
-            </a:pPr>
-            <a:r>
-              <a:rPr lang="en-GB" baseline="0" dirty="0" smtClean="0"/>
-              <a:t>This is:Action,Arcade amnd Adversary. </a:t>
-            </a:r>
-          </a:p>
-          <a:p>
-            <a:pPr>
-              <a:buFont typeface="Arial" pitchFamily="34" charset="0"/>
-              <a:buChar char="•"/>
-            </a:pPr>
-            <a:r>
-              <a:rPr lang="en-GB" baseline="0" dirty="0" smtClean="0"/>
-              <a:t>The premise and overall goal is to beat yopur oppenents score. </a:t>
-            </a:r>
-          </a:p>
-          <a:p>
-            <a:pPr>
-              <a:buFont typeface="Arial" pitchFamily="34" charset="0"/>
-              <a:buChar char="•"/>
-            </a:pPr>
-            <a:endParaRPr lang="en-GB" baseline="0" dirty="0" smtClean="0"/>
-          </a:p>
-          <a:p>
-            <a:pPr>
-              <a:buFont typeface="Arial" pitchFamily="34" charset="0"/>
-              <a:buChar char="•"/>
-            </a:pPr>
-            <a:r>
-              <a:rPr lang="en-GB" baseline="0" dirty="0" smtClean="0"/>
-              <a:t>Platform Soecs: </a:t>
-            </a:r>
-          </a:p>
-          <a:p>
-            <a:pPr>
-              <a:buFont typeface="Arial" pitchFamily="34" charset="0"/>
-              <a:buChar char="•"/>
-            </a:pPr>
-            <a:r>
-              <a:rPr lang="en-GB" baseline="0" dirty="0" smtClean="0"/>
-              <a:t>The game will be playable on PCs as a Windows executable file </a:t>
-            </a:r>
-          </a:p>
-          <a:p>
-            <a:pPr>
-              <a:buFont typeface="Arial" pitchFamily="34" charset="0"/>
-              <a:buChar char="•"/>
+              <a:buNone/>
             </a:pPr>
             <a:endParaRPr lang="en-GB" baseline="0" dirty="0" smtClean="0"/>
           </a:p>
@@ -1812,6 +1517,109 @@
               <a:buFont typeface="Arial" pitchFamily="34" charset="0"/>
               <a:buNone/>
             </a:pPr>
+            <a:r>
+              <a:rPr lang="en-GB" baseline="0" dirty="0" smtClean="0"/>
+              <a:t>Before we begin, here is a brief run through of our market overview/game specs. </a:t>
+            </a:r>
+          </a:p>
+          <a:p>
+            <a:pPr>
+              <a:buFont typeface="Arial" pitchFamily="34" charset="0"/>
+              <a:buNone/>
+            </a:pPr>
+            <a:endParaRPr lang="en-GB" baseline="0" dirty="0" smtClean="0"/>
+          </a:p>
+          <a:p>
+            <a:pPr>
+              <a:buFont typeface="Arial" pitchFamily="34" charset="0"/>
+              <a:buNone/>
+            </a:pPr>
+            <a:r>
+              <a:rPr lang="en-GB" baseline="0" dirty="0" smtClean="0"/>
+              <a:t>Projected demographic: We are targeting our game off the success of the games such as angry birds. The game will be geared towards children of both genders from 7 and up, although the game is also open to a universal audience. </a:t>
+            </a:r>
+          </a:p>
+          <a:p>
+            <a:pPr>
+              <a:buFont typeface="Arial" pitchFamily="34" charset="0"/>
+              <a:buNone/>
+            </a:pPr>
+            <a:r>
+              <a:rPr lang="en-GB" baseline="0" dirty="0" smtClean="0"/>
+              <a:t>This is because the game will induct simple to learn mechanics that will still pose a challenge to master. </a:t>
+            </a:r>
+          </a:p>
+          <a:p>
+            <a:pPr>
+              <a:buFont typeface="Arial" pitchFamily="34" charset="0"/>
+              <a:buNone/>
+            </a:pPr>
+            <a:endParaRPr lang="en-GB" baseline="0" dirty="0" smtClean="0"/>
+          </a:p>
+          <a:p>
+            <a:pPr>
+              <a:buFont typeface="Arial" pitchFamily="34" charset="0"/>
+              <a:buNone/>
+            </a:pPr>
+            <a:r>
+              <a:rPr lang="en-GB" baseline="0" dirty="0" smtClean="0"/>
+              <a:t>The genre of our game is something we dubbed; </a:t>
+            </a:r>
+            <a:r>
+              <a:rPr lang="en-GB" baseline="0" dirty="0" err="1" smtClean="0"/>
+              <a:t>Tripple</a:t>
+            </a:r>
+            <a:r>
+              <a:rPr lang="en-GB" baseline="0" dirty="0" smtClean="0"/>
+              <a:t> A. </a:t>
+            </a:r>
+          </a:p>
+          <a:p>
+            <a:pPr>
+              <a:buFont typeface="Arial" pitchFamily="34" charset="0"/>
+              <a:buNone/>
+            </a:pPr>
+            <a:r>
+              <a:rPr lang="en-GB" baseline="0" dirty="0" smtClean="0"/>
+              <a:t>This is Action, Arcade, and Adversary. </a:t>
+            </a:r>
+          </a:p>
+          <a:p>
+            <a:pPr>
+              <a:buFont typeface="Arial" pitchFamily="34" charset="0"/>
+              <a:buNone/>
+            </a:pPr>
+            <a:r>
+              <a:rPr lang="en-GB" baseline="0" dirty="0" smtClean="0"/>
+              <a:t>The premise and overall goal is to beat your opponents score. </a:t>
+            </a:r>
+          </a:p>
+          <a:p>
+            <a:pPr>
+              <a:buFont typeface="Arial" pitchFamily="34" charset="0"/>
+              <a:buNone/>
+            </a:pPr>
+            <a:endParaRPr lang="en-GB" baseline="0" dirty="0" smtClean="0"/>
+          </a:p>
+          <a:p>
+            <a:pPr>
+              <a:buFont typeface="Arial" pitchFamily="34" charset="0"/>
+              <a:buNone/>
+            </a:pPr>
+            <a:r>
+              <a:rPr lang="en-GB" baseline="0" dirty="0" smtClean="0"/>
+              <a:t>Platform Specs: </a:t>
+            </a:r>
+          </a:p>
+          <a:p>
+            <a:pPr>
+              <a:buFont typeface="Arial" pitchFamily="34" charset="0"/>
+              <a:buNone/>
+            </a:pPr>
+            <a:r>
+              <a:rPr lang="en-GB" baseline="0" dirty="0" smtClean="0"/>
+              <a:t>The game will be playable on PCs as a Windows executable file </a:t>
+            </a:r>
             <a:endParaRPr lang="en-GB" baseline="0" dirty="0" smtClean="0"/>
           </a:p>
         </p:txBody>
@@ -1901,46 +1709,102 @@
           <a:p>
             <a:pPr>
               <a:buFont typeface="Arial" pitchFamily="34" charset="0"/>
-              <a:buChar char="•"/>
+              <a:buNone/>
             </a:pPr>
-            <a:r>
-              <a:rPr lang="en-GB" baseline="0" dirty="0" smtClean="0"/>
-              <a:t>Durring our research we were fund of games which featured trajectory and moementum as central mechanics. </a:t>
-            </a:r>
+            <a:endParaRPr lang="en-GB" baseline="0" dirty="0" smtClean="0"/>
           </a:p>
           <a:p>
             <a:pPr>
               <a:buFont typeface="Arial" pitchFamily="34" charset="0"/>
-              <a:buChar char="•"/>
+              <a:buNone/>
+            </a:pPr>
+            <a:r>
+              <a:rPr lang="en-GB" baseline="0" dirty="0" smtClean="0"/>
+              <a:t>During our research, we were fond of games which featured trajectory and momentum as central mechanics. </a:t>
+            </a:r>
+          </a:p>
+          <a:p>
+            <a:pPr>
+              <a:buFont typeface="Arial" pitchFamily="34" charset="0"/>
+              <a:buNone/>
             </a:pPr>
             <a:endParaRPr lang="en-GB" baseline="0" dirty="0" smtClean="0"/>
           </a:p>
           <a:p>
             <a:pPr>
               <a:buFont typeface="Arial" pitchFamily="34" charset="0"/>
-              <a:buChar char="•"/>
+              <a:buNone/>
             </a:pPr>
             <a:r>
               <a:rPr lang="en-GB" baseline="0" dirty="0" smtClean="0"/>
-              <a:t>These mechanaics take center stage in games such as ......... Etc. </a:t>
+              <a:t>These </a:t>
+            </a:r>
+            <a:r>
+              <a:rPr lang="en-GB" baseline="0" dirty="0" err="1" smtClean="0"/>
+              <a:t>mechanaics</a:t>
+            </a:r>
+            <a:r>
+              <a:rPr lang="en-GB" baseline="0" dirty="0" smtClean="0"/>
+              <a:t> take </a:t>
+            </a:r>
+            <a:r>
+              <a:rPr lang="en-GB" baseline="0" dirty="0" err="1" smtClean="0"/>
+              <a:t>center</a:t>
+            </a:r>
+            <a:r>
+              <a:rPr lang="en-GB" baseline="0" dirty="0" smtClean="0"/>
+              <a:t> stage in games such as ......... Etc. </a:t>
             </a:r>
           </a:p>
           <a:p>
             <a:pPr>
               <a:buFont typeface="Arial" pitchFamily="34" charset="0"/>
-              <a:buChar char="•"/>
+              <a:buNone/>
             </a:pPr>
             <a:endParaRPr lang="en-GB" baseline="0" dirty="0" smtClean="0"/>
           </a:p>
           <a:p>
             <a:pPr>
               <a:buFont typeface="Arial" pitchFamily="34" charset="0"/>
-              <a:buChar char="•"/>
+              <a:buNone/>
             </a:pPr>
             <a:r>
               <a:rPr lang="en-GB" baseline="0" dirty="0" smtClean="0"/>
-              <a:t>We aimed to incooporate these mechamnic as they would allow players to take stragigly thought out playthroughs, as they will be calculating where the projectile will land and how far it could travel.  </a:t>
-            </a:r>
+              <a:t>We aimed to </a:t>
+            </a:r>
+            <a:r>
+              <a:rPr lang="en-GB" baseline="0" dirty="0" err="1" smtClean="0"/>
+              <a:t>incooporate</a:t>
+            </a:r>
+            <a:r>
+              <a:rPr lang="en-GB" baseline="0" dirty="0" smtClean="0"/>
+              <a:t> these </a:t>
+            </a:r>
+            <a:r>
+              <a:rPr lang="en-GB" baseline="0" dirty="0" err="1" smtClean="0"/>
+              <a:t>mechamnic</a:t>
+            </a:r>
+            <a:r>
+              <a:rPr lang="en-GB" baseline="0" dirty="0" smtClean="0"/>
+              <a:t> as they would allow players to take </a:t>
+            </a:r>
+            <a:r>
+              <a:rPr lang="en-GB" baseline="0" dirty="0" err="1" smtClean="0"/>
+              <a:t>stragigly</a:t>
+            </a:r>
+            <a:r>
+              <a:rPr lang="en-GB" baseline="0" dirty="0" smtClean="0"/>
+              <a:t> thought out </a:t>
+            </a:r>
+            <a:r>
+              <a:rPr lang="en-GB" baseline="0" dirty="0" err="1" smtClean="0"/>
+              <a:t>playthroughs</a:t>
+            </a:r>
+            <a:r>
+              <a:rPr lang="en-GB" baseline="0" dirty="0" smtClean="0"/>
+              <a:t>, as they will be calculating where the projectile will land and how far it could travel. </a:t>
+            </a:r>
+            <a:endParaRPr lang="en-GB" baseline="0" dirty="0" smtClean="0"/>
           </a:p>
         </p:txBody>
       </p:sp>
@@ -2037,48 +1901,9 @@
             </a:r>
           </a:p>
           <a:p>
-            <a:pPr marL="0" marR="0" lvl="0" indent="0" algn="l" defTabSz="914400" rtl="0" eaLnBrk="1" fontAlgn="auto" latinLnBrk="0" hangingPunct="1">
-              <a:lnSpc>
-                <a:spcPct val="100000"/>
-              </a:lnSpc>
-              <a:spcBef>
-                <a:spcPts val="0"/>
-              </a:spcBef>
-              <a:spcAft>
-                <a:spcPts val="0"/>
-              </a:spcAft>
-              <a:buClrTx/>
-              <a:buSzTx/>
-              <a:buFont typeface="Arial" pitchFamily="34" charset="0"/>
-              <a:buChar char="•"/>
-              <a:tabLst/>
-              <a:defRPr/>
-            </a:pPr>
-            <a:r>
-              <a:rPr lang="en-GB" sz="1200" dirty="0" smtClean="0"/>
-              <a:t>Mans best friend must now brave this new adventure as he struggles to </a:t>
-            </a:r>
-            <a:r>
-              <a:rPr lang="en-GB" sz="1200" b="1" dirty="0" smtClean="0"/>
-              <a:t>avoid</a:t>
-            </a:r>
-            <a:r>
-              <a:rPr lang="en-GB" sz="1200" dirty="0" smtClean="0"/>
-              <a:t> vicious feline ghouls whilst </a:t>
-            </a:r>
-            <a:r>
-              <a:rPr lang="en-GB" sz="1200" b="1" dirty="0" smtClean="0"/>
-              <a:t>collecting</a:t>
-            </a:r>
-            <a:r>
-              <a:rPr lang="en-GB" sz="1200" dirty="0" smtClean="0"/>
-              <a:t> the remnants of his memories.</a:t>
-            </a:r>
-          </a:p>
-          <a:p>
             <a:pPr>
               <a:buFont typeface="Arial" pitchFamily="34" charset="0"/>
-              <a:buChar char="•"/>
+              <a:buNone/>
             </a:pPr>
             <a:endParaRPr lang="en-GB" dirty="0" smtClean="0"/>
           </a:p>
@@ -2178,6 +2003,27 @@
               <a:buFont typeface="Arial" pitchFamily="34" charset="0"/>
               <a:buChar char="•"/>
             </a:pPr>
+            <a:r>
+              <a:rPr lang="en-GB" baseline="0" dirty="0" smtClean="0"/>
+              <a:t>The mood board display multiple suggestive background themes for the games level. These themes are based around birds and their habitats. </a:t>
+            </a:r>
+          </a:p>
+          <a:p>
+            <a:pPr>
+              <a:buFont typeface="Arial" pitchFamily="34" charset="0"/>
+              <a:buChar char="•"/>
+            </a:pPr>
+            <a:endParaRPr lang="en-GB" baseline="0" dirty="0" smtClean="0"/>
+          </a:p>
+          <a:p>
+            <a:pPr>
+              <a:buFont typeface="Arial" pitchFamily="34" charset="0"/>
+              <a:buChar char="•"/>
+            </a:pPr>
+            <a:r>
+              <a:rPr lang="en-GB" baseline="0" dirty="0" smtClean="0"/>
+              <a:t>Foregrounds will be developed to run along side the background. The foreground being the main playing field of the game will house uneven geometry posing as a challenge for players.</a:t>
+            </a:r>
             <a:endParaRPr lang="en-GB" baseline="0" dirty="0" smtClean="0"/>
           </a:p>
         </p:txBody>
@@ -2269,6 +2115,10 @@
               <a:buFont typeface="Arial" pitchFamily="34" charset="0"/>
               <a:buChar char="•"/>
             </a:pPr>
+            <a:r>
+              <a:rPr lang="en-GB" baseline="0" dirty="0" smtClean="0"/>
+              <a:t>Using cartoon like and quirky art will add to the overall comedic tone of our game.</a:t>
+            </a:r>
             <a:endParaRPr lang="en-GB" baseline="0" dirty="0" smtClean="0"/>
           </a:p>
         </p:txBody>
@@ -2358,7 +2208,7 @@
           <a:p>
             <a:pPr>
               <a:buFont typeface="Arial" pitchFamily="34" charset="0"/>
-              <a:buChar char="•"/>
+              <a:buNone/>
             </a:pPr>
             <a:endParaRPr lang="en-GB" baseline="0" dirty="0" smtClean="0"/>
           </a:p>
@@ -2391,7 +2241,7 @@
     </p:spTree>
     <p:extLst>
       <p:ext uri="{BB962C8B-B14F-4D97-AF65-F5344CB8AC3E}">
-        <p14:creationId xmlns:p14="http://schemas.microsoft.com/office/powerpoint/2010/main" val="623160091"/>
+        <p14:creationId xmlns:p14="http://schemas.microsoft.com/office/powerpoint/2010/main" val="2389549365"/>
       </p:ext>
     </p:extLst>
   </p:cSld>
@@ -5698,98 +5548,13 @@
       </p:sp>
       <p:sp>
         <p:nvSpPr>
-          <p:cNvPr id="6" name="TextBox 5"/>
-          <p:cNvSpPr txBox="1"/>
-          <p:nvPr/>
-        </p:nvSpPr>
-        <p:spPr>
-          <a:xfrm>
-            <a:off x="539552" y="2703016"/>
-            <a:ext cx="7992888" cy="4154984"/>
-          </a:xfrm>
-          <a:prstGeom prst="rect">
-            <a:avLst/>
-          </a:prstGeom>
-          <a:noFill/>
-        </p:spPr>
-        <p:txBody>
-          <a:bodyPr wrap="square" rtlCol="0">
-            <a:spAutoFit/>
-          </a:bodyPr>
-          <a:lstStyle/>
-          <a:p>
-            <a:pPr>
-              <a:buFont typeface="Arial" pitchFamily="34" charset="0"/>
-              <a:buChar char="•"/>
-            </a:pPr>
-            <a:r>
-              <a:rPr lang="en-GB" sz="2400" dirty="0" smtClean="0"/>
-              <a:t>Players can use the stamina to either thrust bird upwards or forwards. </a:t>
-            </a:r>
-          </a:p>
-          <a:p>
-            <a:pPr>
-              <a:buFont typeface="Arial" pitchFamily="34" charset="0"/>
-              <a:buChar char="•"/>
-            </a:pPr>
-            <a:endParaRPr lang="en-GB" sz="2400" dirty="0" smtClean="0"/>
-          </a:p>
-          <a:p>
-            <a:pPr>
-              <a:buFont typeface="Arial" pitchFamily="34" charset="0"/>
-              <a:buChar char="•"/>
-            </a:pPr>
-            <a:r>
-              <a:rPr lang="en-GB" sz="2400" dirty="0" smtClean="0"/>
-              <a:t>Thrusting forwards allows the bird to travel highter, thereby increasing the momentum of eventual impact. </a:t>
-            </a:r>
-          </a:p>
-          <a:p>
-            <a:pPr>
-              <a:buFont typeface="Arial" pitchFamily="34" charset="0"/>
-              <a:buChar char="•"/>
-            </a:pPr>
-            <a:endParaRPr lang="en-GB" sz="2400" dirty="0" smtClean="0"/>
-          </a:p>
-          <a:p>
-            <a:pPr>
-              <a:buFont typeface="Arial" pitchFamily="34" charset="0"/>
-              <a:buChar char="•"/>
-            </a:pPr>
-            <a:r>
-              <a:rPr lang="en-GB" sz="2400" dirty="0" smtClean="0"/>
-              <a:t>Players can trust be repeatedly pressing the allocated keys, which inturn causes a twich mechanic.</a:t>
-            </a:r>
-          </a:p>
-          <a:p>
-            <a:pPr>
-              <a:buFont typeface="Arial" pitchFamily="34" charset="0"/>
-              <a:buChar char="•"/>
-            </a:pPr>
-            <a:endParaRPr lang="en-GB" sz="2400" dirty="0" smtClean="0"/>
-          </a:p>
-          <a:p>
-            <a:pPr>
-              <a:buFont typeface="Arial" pitchFamily="34" charset="0"/>
-              <a:buChar char="•"/>
-            </a:pPr>
-            <a:r>
-              <a:rPr lang="en-GB" sz="2400" dirty="0" smtClean="0"/>
-              <a:t>The larger the momentum upon impact, the further the bird will recoil.  </a:t>
-            </a:r>
-            <a:endParaRPr lang="en-GB" sz="2400" dirty="0"/>
-          </a:p>
-        </p:txBody>
-      </p:sp>
-      <p:sp>
-        <p:nvSpPr>
           <p:cNvPr id="8" name="Rectangle 7"/>
           <p:cNvSpPr/>
           <p:nvPr/>
         </p:nvSpPr>
         <p:spPr>
           <a:xfrm>
-            <a:off x="539552" y="1334864"/>
+            <a:off x="611560" y="1196752"/>
             <a:ext cx="7992888" cy="1224136"/>
           </a:xfrm>
           <a:prstGeom prst="rect">
@@ -5798,15 +5563,15 @@
         </p:spPr>
         <p:style>
           <a:lnRef idx="2">
-            <a:schemeClr val="accent5">
+            <a:schemeClr val="accent3">
               <a:shade val="50000"/>
             </a:schemeClr>
           </a:lnRef>
           <a:fillRef idx="1">
-            <a:schemeClr val="accent5"/>
+            <a:schemeClr val="accent3"/>
           </a:fillRef>
           <a:effectRef idx="0">
-            <a:schemeClr val="accent5"/>
+            <a:schemeClr val="accent3"/>
           </a:effectRef>
           <a:fontRef idx="minor">
             <a:schemeClr val="lt1"/>
@@ -5822,6 +5587,91 @@
               <a:t>Prototype Showcase</a:t>
             </a:r>
             <a:endParaRPr lang="en-GB" dirty="0"/>
+          </a:p>
+        </p:txBody>
+      </p:sp>
+      <p:sp>
+        <p:nvSpPr>
+          <p:cNvPr id="5" name="TextBox 4"/>
+          <p:cNvSpPr txBox="1"/>
+          <p:nvPr/>
+        </p:nvSpPr>
+        <p:spPr>
+          <a:xfrm>
+            <a:off x="611560" y="2564904"/>
+            <a:ext cx="7992888" cy="4154984"/>
+          </a:xfrm>
+          <a:prstGeom prst="rect">
+            <a:avLst/>
+          </a:prstGeom>
+          <a:noFill/>
+        </p:spPr>
+        <p:txBody>
+          <a:bodyPr wrap="square" rtlCol="0">
+            <a:spAutoFit/>
+          </a:bodyPr>
+          <a:lstStyle/>
+          <a:p>
+            <a:pPr>
+              <a:buFont typeface="Arial" pitchFamily="34" charset="0"/>
+              <a:buChar char="•"/>
+            </a:pPr>
+            <a:r>
+              <a:rPr lang="en-GB" sz="2400"/>
+              <a:t>Thrusting forward will allow the bird to travel further prior to impact. </a:t>
+            </a:r>
+          </a:p>
+          <a:p>
+            <a:pPr>
+              <a:buFont typeface="Arial" pitchFamily="34" charset="0"/>
+              <a:buChar char="•"/>
+            </a:pPr>
+            <a:endParaRPr lang="en-GB" sz="2400"/>
+          </a:p>
+          <a:p>
+            <a:pPr>
+              <a:buFont typeface="Arial" pitchFamily="34" charset="0"/>
+              <a:buChar char="•"/>
+            </a:pPr>
+            <a:r>
+              <a:rPr lang="en-GB" sz="2400"/>
+              <a:t>Players stamina is restricted to a stamina bar seen in the UI. </a:t>
+            </a:r>
+          </a:p>
+          <a:p>
+            <a:pPr>
+              <a:buFont typeface="Arial" pitchFamily="34" charset="0"/>
+              <a:buChar char="•"/>
+            </a:pPr>
+            <a:endParaRPr lang="en-GB" sz="2400"/>
+          </a:p>
+          <a:p>
+            <a:pPr>
+              <a:buFont typeface="Arial" pitchFamily="34" charset="0"/>
+              <a:buChar char="•"/>
+            </a:pPr>
+            <a:r>
+              <a:rPr lang="en-GB" sz="2400"/>
+              <a:t>The more a player thrusts the less stamina they will have in turn.</a:t>
+            </a:r>
+          </a:p>
+          <a:p>
+            <a:pPr>
+              <a:buFont typeface="Arial" pitchFamily="34" charset="0"/>
+              <a:buChar char="•"/>
+            </a:pPr>
+            <a:endParaRPr lang="en-GB" sz="2400"/>
+          </a:p>
+          <a:p>
+            <a:pPr>
+              <a:buFont typeface="Arial" pitchFamily="34" charset="0"/>
+              <a:buChar char="•"/>
+            </a:pPr>
+            <a:r>
+              <a:rPr lang="en-GB" sz="2400"/>
+              <a:t>Budgeting stamina will in turn cause players to be strategic when planning to use their thrust function. Allowing for an overall strategic play.</a:t>
+            </a:r>
+            <a:endParaRPr lang="en-GB" sz="2400" dirty="0"/>
           </a:p>
         </p:txBody>
       </p:sp>
@@ -5905,15 +5755,15 @@
         </p:spPr>
         <p:style>
           <a:lnRef idx="2">
-            <a:schemeClr val="accent3">
+            <a:schemeClr val="accent2">
               <a:shade val="50000"/>
             </a:schemeClr>
           </a:lnRef>
           <a:fillRef idx="1">
-            <a:schemeClr val="accent3"/>
+            <a:schemeClr val="accent2"/>
           </a:fillRef>
           <a:effectRef idx="0">
-            <a:schemeClr val="accent3"/>
+            <a:schemeClr val="accent2"/>
           </a:effectRef>
           <a:fontRef idx="minor">
             <a:schemeClr val="lt1"/>
@@ -5941,7 +5791,7 @@
         <p:spPr>
           <a:xfrm>
             <a:off x="611560" y="2564904"/>
-            <a:ext cx="7992888" cy="4154984"/>
+            <a:ext cx="7992888" cy="3785652"/>
           </a:xfrm>
           <a:prstGeom prst="rect">
             <a:avLst/>
@@ -5959,8 +5809,8 @@
               <a:buChar char="•"/>
             </a:pPr>
             <a:r>
-              <a:rPr lang="en-GB" sz="2400" dirty="0" smtClean="0"/>
-              <a:t>Thrusting forward will allows the bird to travel further prior to impact. </a:t>
+              <a:rPr lang="en-GB" sz="2400"/>
+              <a:t>Players may also use the thrust function to avoid geometry based obstacles that may affect the distance traveled. </a:t>
             </a:r>
           </a:p>
           <a:p>
@@ -5968,7 +5818,7 @@
               <a:buFont typeface="Arial" pitchFamily="34" charset="0"/>
               <a:buChar char="•"/>
             </a:pPr>
-            <a:endParaRPr lang="en-GB" sz="2400" dirty="0" smtClean="0"/>
+            <a:endParaRPr lang="en-GB" sz="2400"/>
           </a:p>
           <a:p>
             <a:pPr>
@@ -5976,8 +5826,8 @@
               <a:buChar char="•"/>
             </a:pPr>
             <a:r>
-              <a:rPr lang="en-GB" sz="2400" dirty="0" smtClean="0"/>
-              <a:t>Players stamina is restricted to a stamina bar seen in the UI. </a:t>
+              <a:rPr lang="en-GB" sz="2400"/>
+              <a:t>Once the player's bird comes to a halt the distance traveled is calculated and stored leading into the next players turn. </a:t>
             </a:r>
           </a:p>
           <a:p>
@@ -5985,7 +5835,7 @@
               <a:buFont typeface="Arial" pitchFamily="34" charset="0"/>
               <a:buChar char="•"/>
             </a:pPr>
-            <a:endParaRPr lang="en-GB" sz="2400" dirty="0" smtClean="0"/>
+            <a:endParaRPr lang="en-GB" sz="2400"/>
           </a:p>
           <a:p>
             <a:pPr>
@@ -5993,8 +5843,8 @@
               <a:buChar char="•"/>
             </a:pPr>
             <a:r>
-              <a:rPr lang="en-GB" sz="2400" dirty="0" smtClean="0"/>
-              <a:t>The more a player thrusts the less stamina they will have in turn.</a:t>
+              <a:rPr lang="en-GB" sz="2400"/>
+              <a:t>The player who travels the furthest wins the round. </a:t>
             </a:r>
           </a:p>
           <a:p>
@@ -6002,7 +5852,7 @@
               <a:buFont typeface="Arial" pitchFamily="34" charset="0"/>
               <a:buChar char="•"/>
             </a:pPr>
-            <a:endParaRPr lang="en-GB" sz="2400" dirty="0" smtClean="0"/>
+            <a:endParaRPr lang="en-GB" sz="2400"/>
           </a:p>
           <a:p>
             <a:pPr>
@@ -6010,8 +5860,8 @@
               <a:buChar char="•"/>
             </a:pPr>
             <a:r>
-              <a:rPr lang="en-GB" sz="2400" dirty="0" smtClean="0"/>
-              <a:t>Budgeting stamina will in turn cause players to be strategic when planing to use their thrust function. Allowing for an overall strategic play.</a:t>
+              <a:rPr lang="en-GB" sz="2400"/>
+              <a:t>The game consists of three rounds, best two out three wins the game.</a:t>
             </a:r>
             <a:endParaRPr lang="en-GB" sz="2400" dirty="0"/>
           </a:p>
@@ -6051,44 +5901,13 @@
       </p:grpSpPr>
       <p:sp>
         <p:nvSpPr>
-          <p:cNvPr id="4" name="TextBox 3"/>
-          <p:cNvSpPr txBox="1"/>
-          <p:nvPr/>
-        </p:nvSpPr>
-        <p:spPr>
-          <a:xfrm>
-            <a:off x="467544" y="620688"/>
-            <a:ext cx="8208912" cy="584775"/>
-          </a:xfrm>
-          <a:prstGeom prst="rect">
-            <a:avLst/>
-          </a:prstGeom>
-          <a:noFill/>
-        </p:spPr>
-        <p:txBody>
-          <a:bodyPr wrap="square" rtlCol="0">
-            <a:spAutoFit/>
-          </a:bodyPr>
-          <a:lstStyle/>
-          <a:p>
-            <a:pPr algn="ctr"/>
-            <a:r>
-              <a:rPr lang="en-GB" sz="3200" dirty="0" smtClean="0"/>
-              <a:t>Game play and apperence </a:t>
-            </a:r>
-            <a:endParaRPr lang="en-GB" sz="3200" dirty="0"/>
-          </a:p>
-        </p:txBody>
-      </p:sp>
-      <p:sp>
-        <p:nvSpPr>
           <p:cNvPr id="8" name="Rectangle 7"/>
           <p:cNvSpPr/>
           <p:nvPr/>
         </p:nvSpPr>
         <p:spPr>
           <a:xfrm>
-            <a:off x="611560" y="1196752"/>
+            <a:off x="539552" y="2924944"/>
             <a:ext cx="7992888" cy="1224136"/>
           </a:xfrm>
           <a:prstGeom prst="rect">
@@ -6097,15 +5916,15 @@
         </p:spPr>
         <p:style>
           <a:lnRef idx="2">
-            <a:schemeClr val="accent2">
+            <a:schemeClr val="accent1">
               <a:shade val="50000"/>
             </a:schemeClr>
           </a:lnRef>
           <a:fillRef idx="1">
-            <a:schemeClr val="accent2"/>
+            <a:schemeClr val="accent1"/>
           </a:fillRef>
           <a:effectRef idx="0">
-            <a:schemeClr val="accent2"/>
+            <a:schemeClr val="accent1"/>
           </a:effectRef>
           <a:fontRef idx="minor">
             <a:schemeClr val="lt1"/>
@@ -6121,104 +5940,6 @@
               <a:t>Prototype Showcase</a:t>
             </a:r>
             <a:endParaRPr lang="en-GB" dirty="0"/>
-          </a:p>
-        </p:txBody>
-      </p:sp>
-      <p:sp>
-        <p:nvSpPr>
-          <p:cNvPr id="5" name="TextBox 4"/>
-          <p:cNvSpPr txBox="1"/>
-          <p:nvPr/>
-        </p:nvSpPr>
-        <p:spPr>
-          <a:xfrm>
-            <a:off x="611560" y="2564904"/>
-            <a:ext cx="7992888" cy="4524315"/>
-          </a:xfrm>
-          <a:prstGeom prst="rect">
-            <a:avLst/>
-          </a:prstGeom>
-          <a:noFill/>
-        </p:spPr>
-        <p:txBody>
-          <a:bodyPr wrap="square" rtlCol="0">
-            <a:spAutoFit/>
-          </a:bodyPr>
-          <a:lstStyle/>
-          <a:p>
-            <a:pPr>
-              <a:buFont typeface="Arial" pitchFamily="34" charset="0"/>
-              <a:buChar char="•"/>
-            </a:pPr>
-            <a:r>
-              <a:rPr lang="en-GB" sz="2400" dirty="0" smtClean="0"/>
-              <a:t>Players may also use the thrust function to avoid geometry based obstacles that may affect the distance travelled. </a:t>
-            </a:r>
-          </a:p>
-          <a:p>
-            <a:pPr>
-              <a:buFont typeface="Arial" pitchFamily="34" charset="0"/>
-              <a:buChar char="•"/>
-            </a:pPr>
-            <a:endParaRPr lang="en-GB" sz="2400" dirty="0" smtClean="0"/>
-          </a:p>
-          <a:p>
-            <a:pPr>
-              <a:buFont typeface="Arial" pitchFamily="34" charset="0"/>
-              <a:buChar char="•"/>
-            </a:pPr>
-            <a:r>
-              <a:rPr lang="en-GB" sz="2400" dirty="0" smtClean="0"/>
-              <a:t>Once the players bird comes to a halt the distance travelled is calculated and stored leading into the next players turn. </a:t>
-            </a:r>
-          </a:p>
-          <a:p>
-            <a:pPr>
-              <a:buFont typeface="Arial" pitchFamily="34" charset="0"/>
-              <a:buChar char="•"/>
-            </a:pPr>
-            <a:endParaRPr lang="en-GB" sz="2400" dirty="0" smtClean="0"/>
-          </a:p>
-          <a:p>
-            <a:pPr>
-              <a:buFont typeface="Arial" pitchFamily="34" charset="0"/>
-              <a:buChar char="•"/>
-            </a:pPr>
-            <a:r>
-              <a:rPr lang="en-GB" sz="2400" dirty="0" smtClean="0"/>
-              <a:t>The player who travels the furthest wins the round. </a:t>
-            </a:r>
-          </a:p>
-          <a:p>
-            <a:pPr>
-              <a:buFont typeface="Arial" pitchFamily="34" charset="0"/>
-              <a:buChar char="•"/>
-            </a:pPr>
-            <a:endParaRPr lang="en-GB" sz="2400" dirty="0" smtClean="0"/>
-          </a:p>
-          <a:p>
-            <a:pPr>
-              <a:buFont typeface="Arial" pitchFamily="34" charset="0"/>
-              <a:buChar char="•"/>
-            </a:pPr>
-            <a:r>
-              <a:rPr lang="en-GB" sz="2400" dirty="0" smtClean="0"/>
-              <a:t>The game consist of three rounds, best two out three wins the game.</a:t>
-            </a:r>
-          </a:p>
-          <a:p>
-            <a:pPr>
-              <a:buFont typeface="Arial" pitchFamily="34" charset="0"/>
-              <a:buChar char="•"/>
-            </a:pPr>
-            <a:endParaRPr lang="en-GB" sz="2400" dirty="0" smtClean="0"/>
-          </a:p>
-          <a:p>
-            <a:pPr>
-              <a:buFont typeface="Arial" pitchFamily="34" charset="0"/>
-              <a:buChar char="•"/>
-            </a:pPr>
-            <a:endParaRPr lang="en-GB" sz="2400" dirty="0"/>
           </a:p>
         </p:txBody>
       </p:sp>
@@ -6256,45 +5977,117 @@
       </p:grpSpPr>
       <p:sp>
         <p:nvSpPr>
-          <p:cNvPr id="8" name="Rectangle 7"/>
-          <p:cNvSpPr/>
+          <p:cNvPr id="4" name="TextBox 3"/>
+          <p:cNvSpPr txBox="1"/>
           <p:nvPr/>
         </p:nvSpPr>
         <p:spPr>
           <a:xfrm>
-            <a:off x="539552" y="2924944"/>
-            <a:ext cx="7992888" cy="1224136"/>
+            <a:off x="467544" y="620688"/>
+            <a:ext cx="8208912" cy="584775"/>
           </a:xfrm>
           <a:prstGeom prst="rect">
             <a:avLst/>
           </a:prstGeom>
+          <a:noFill/>
         </p:spPr>
-        <p:style>
-          <a:lnRef idx="2">
-            <a:schemeClr val="accent1">
-              <a:shade val="50000"/>
-            </a:schemeClr>
-          </a:lnRef>
-          <a:fillRef idx="1">
-            <a:schemeClr val="accent1"/>
-          </a:fillRef>
-          <a:effectRef idx="0">
-            <a:schemeClr val="accent1"/>
-          </a:effectRef>
-          <a:fontRef idx="minor">
-            <a:schemeClr val="lt1"/>
-          </a:fontRef>
-        </p:style>
-        <p:txBody>
-          <a:bodyPr rtlCol="0" anchor="ctr"/>
+        <p:txBody>
+          <a:bodyPr wrap="square" rtlCol="0">
+            <a:spAutoFit/>
+          </a:bodyPr>
           <a:lstStyle/>
           <a:p>
             <a:pPr algn="ctr"/>
             <a:r>
-              <a:rPr lang="en-GB" dirty="0" smtClean="0"/>
-              <a:t>Prototype Showcase</a:t>
-            </a:r>
-            <a:endParaRPr lang="en-GB" dirty="0"/>
+              <a:rPr lang="en-GB" sz="3200" dirty="0" smtClean="0"/>
+              <a:t>Player roles and actions </a:t>
+            </a:r>
+            <a:endParaRPr lang="en-GB" sz="3200" dirty="0"/>
+          </a:p>
+        </p:txBody>
+      </p:sp>
+      <p:sp>
+        <p:nvSpPr>
+          <p:cNvPr id="3" name="TextBox 2"/>
+          <p:cNvSpPr txBox="1"/>
+          <p:nvPr/>
+        </p:nvSpPr>
+        <p:spPr>
+          <a:xfrm>
+            <a:off x="683568" y="1556792"/>
+            <a:ext cx="7992888" cy="3416320"/>
+          </a:xfrm>
+          <a:prstGeom prst="rect">
+            <a:avLst/>
+          </a:prstGeom>
+          <a:noFill/>
+        </p:spPr>
+        <p:txBody>
+          <a:bodyPr wrap="square" rtlCol="0">
+            <a:spAutoFit/>
+          </a:bodyPr>
+          <a:lstStyle/>
+          <a:p>
+            <a:pPr>
+              <a:buFont typeface="Arial" pitchFamily="34" charset="0"/>
+              <a:buChar char="•"/>
+            </a:pPr>
+            <a:r>
+              <a:rPr lang="en-GB" sz="2400"/>
+              <a:t>The main objective: Travel furthest whilst budgeting stamina. </a:t>
+            </a:r>
+          </a:p>
+          <a:p>
+            <a:pPr>
+              <a:buFont typeface="Arial" pitchFamily="34" charset="0"/>
+              <a:buChar char="•"/>
+            </a:pPr>
+            <a:endParaRPr lang="en-GB" sz="2400"/>
+          </a:p>
+          <a:p>
+            <a:pPr>
+              <a:buFont typeface="Arial" pitchFamily="34" charset="0"/>
+              <a:buChar char="•"/>
+            </a:pPr>
+            <a:r>
+              <a:rPr lang="en-GB" sz="2400"/>
+              <a:t>Secondary objective: Avoid obstacles which may draw traveled distance to a halt. </a:t>
+            </a:r>
+          </a:p>
+          <a:p>
+            <a:pPr>
+              <a:buFont typeface="Arial" pitchFamily="34" charset="0"/>
+              <a:buChar char="•"/>
+            </a:pPr>
+            <a:endParaRPr lang="en-GB" sz="2400"/>
+          </a:p>
+          <a:p>
+            <a:pPr>
+              <a:buFont typeface="Arial" pitchFamily="34" charset="0"/>
+              <a:buChar char="•"/>
+            </a:pPr>
+            <a:r>
+              <a:rPr lang="en-GB" sz="2400"/>
+              <a:t>Players thrust using a twitch mechanic. </a:t>
+            </a:r>
+          </a:p>
+          <a:p>
+            <a:pPr>
+              <a:buFont typeface="Arial" pitchFamily="34" charset="0"/>
+              <a:buChar char="•"/>
+            </a:pPr>
+            <a:endParaRPr lang="en-GB" sz="2400"/>
+          </a:p>
+          <a:p>
+            <a:pPr>
+              <a:buFont typeface="Arial" pitchFamily="34" charset="0"/>
+              <a:buChar char="•"/>
+            </a:pPr>
+            <a:r>
+              <a:rPr lang="en-GB" sz="2400"/>
+              <a:t>Working with trajectory, momentum and budgeting stamina allows for a strategic play. </a:t>
+            </a:r>
+            <a:endParaRPr lang="en-GB" sz="2400" dirty="0"/>
           </a:p>
         </p:txBody>
       </p:sp>
@@ -6339,7 +6132,7 @@
         <p:spPr>
           <a:xfrm>
             <a:off x="467544" y="620688"/>
-            <a:ext cx="8208912" cy="1077218"/>
+            <a:ext cx="8208912" cy="584775"/>
           </a:xfrm>
           <a:prstGeom prst="rect">
             <a:avLst/>
@@ -6355,29 +6148,86 @@
             <a:pPr algn="ctr"/>
             <a:r>
               <a:rPr lang="en-GB" sz="3200" dirty="0" smtClean="0"/>
-              <a:t>C</a:t>
-            </a:r>
-            <a:r>
-              <a:rPr lang="en-GB" sz="3200" dirty="0" smtClean="0"/>
-              <a:t>oncept art </a:t>
-            </a:r>
-          </a:p>
-          <a:p>
-            <a:pPr algn="ctr"/>
-            <a:r>
-              <a:rPr lang="en-GB" sz="3200" dirty="0" smtClean="0"/>
-              <a:t> </a:t>
+              <a:t>Development specifications</a:t>
             </a:r>
             <a:endParaRPr lang="en-GB" sz="3200" dirty="0"/>
           </a:p>
         </p:txBody>
       </p:sp>
+      <p:sp>
+        <p:nvSpPr>
+          <p:cNvPr id="3" name="TextBox 2"/>
+          <p:cNvSpPr txBox="1"/>
+          <p:nvPr/>
+        </p:nvSpPr>
+        <p:spPr>
+          <a:xfrm>
+            <a:off x="683568" y="1556792"/>
+            <a:ext cx="7992888" cy="2308324"/>
+          </a:xfrm>
+          <a:prstGeom prst="rect">
+            <a:avLst/>
+          </a:prstGeom>
+          <a:noFill/>
+        </p:spPr>
+        <p:txBody>
+          <a:bodyPr wrap="square" rtlCol="0">
+            <a:spAutoFit/>
+          </a:bodyPr>
+          <a:lstStyle/>
+          <a:p>
+            <a:pPr>
+              <a:buFont typeface="Arial" pitchFamily="34" charset="0"/>
+              <a:buChar char="•"/>
+            </a:pPr>
+            <a:r>
+              <a:rPr lang="en-GB" sz="2400" dirty="0" smtClean="0"/>
+              <a:t>Unity 2D </a:t>
+            </a:r>
+          </a:p>
+          <a:p>
+            <a:pPr>
+              <a:buFont typeface="Arial" pitchFamily="34" charset="0"/>
+              <a:buChar char="•"/>
+            </a:pPr>
+            <a:endParaRPr lang="en-GB" sz="2400" dirty="0" smtClean="0"/>
+          </a:p>
+          <a:p>
+            <a:pPr>
+              <a:buFont typeface="Arial" pitchFamily="34" charset="0"/>
+              <a:buChar char="•"/>
+            </a:pPr>
+            <a:r>
+              <a:rPr lang="en-GB" sz="2400" dirty="0" smtClean="0"/>
+              <a:t>MonoDevelop / Visual studios</a:t>
+            </a:r>
+          </a:p>
+          <a:p>
+            <a:r>
+              <a:rPr lang="en-GB" sz="2400" dirty="0" smtClean="0"/>
+              <a:t>  </a:t>
+            </a:r>
+          </a:p>
+          <a:p>
+            <a:pPr>
+              <a:buFont typeface="Arial" pitchFamily="34" charset="0"/>
+              <a:buChar char="•"/>
+            </a:pPr>
+            <a:r>
+              <a:rPr lang="en-GB" sz="2400" dirty="0" smtClean="0"/>
+              <a:t>Photoshop </a:t>
+            </a:r>
+          </a:p>
+          <a:p>
+            <a:pPr>
+              <a:buFont typeface="Arial" pitchFamily="34" charset="0"/>
+              <a:buChar char="•"/>
+            </a:pPr>
+            <a:endParaRPr lang="en-GB" sz="2400" dirty="0" smtClean="0"/>
+          </a:p>
+        </p:txBody>
+      </p:sp>
     </p:spTree>
-    <p:extLst>
-      <p:ext uri="{BB962C8B-B14F-4D97-AF65-F5344CB8AC3E}">
-        <p14:creationId xmlns:p14="http://schemas.microsoft.com/office/powerpoint/2010/main" val="514150301"/>
-      </p:ext>
-    </p:extLst>
   </p:cSld>
   <p:clrMapOvr>
     <a:masterClrMapping/>
@@ -6411,289 +6261,6 @@
       </p:grpSpPr>
       <p:sp>
         <p:nvSpPr>
-          <p:cNvPr id="4" name="TextBox 3"/>
-          <p:cNvSpPr txBox="1"/>
-          <p:nvPr/>
-        </p:nvSpPr>
-        <p:spPr>
-          <a:xfrm>
-            <a:off x="467544" y="620688"/>
-            <a:ext cx="8208912" cy="584775"/>
-          </a:xfrm>
-          <a:prstGeom prst="rect">
-            <a:avLst/>
-          </a:prstGeom>
-          <a:noFill/>
-        </p:spPr>
-        <p:txBody>
-          <a:bodyPr wrap="square" rtlCol="0">
-            <a:spAutoFit/>
-          </a:bodyPr>
-          <a:lstStyle/>
-          <a:p>
-            <a:pPr algn="ctr"/>
-            <a:r>
-              <a:rPr lang="en-GB" sz="3200" dirty="0" smtClean="0"/>
-              <a:t>Player roles and actions </a:t>
-            </a:r>
-            <a:endParaRPr lang="en-GB" sz="3200" dirty="0"/>
-          </a:p>
-        </p:txBody>
-      </p:sp>
-      <p:sp>
-        <p:nvSpPr>
-          <p:cNvPr id="3" name="TextBox 2"/>
-          <p:cNvSpPr txBox="1"/>
-          <p:nvPr/>
-        </p:nvSpPr>
-        <p:spPr>
-          <a:xfrm>
-            <a:off x="683568" y="1556792"/>
-            <a:ext cx="7992888" cy="3416320"/>
-          </a:xfrm>
-          <a:prstGeom prst="rect">
-            <a:avLst/>
-          </a:prstGeom>
-          <a:noFill/>
-        </p:spPr>
-        <p:txBody>
-          <a:bodyPr wrap="square" rtlCol="0">
-            <a:spAutoFit/>
-          </a:bodyPr>
-          <a:lstStyle/>
-          <a:p>
-            <a:pPr>
-              <a:buFont typeface="Arial" pitchFamily="34" charset="0"/>
-              <a:buChar char="•"/>
-            </a:pPr>
-            <a:r>
-              <a:rPr lang="en-GB" sz="2400" dirty="0" smtClean="0"/>
-              <a:t>Main objective: Travel furthest whilst budgeting stamina. </a:t>
-            </a:r>
-          </a:p>
-          <a:p>
-            <a:pPr>
-              <a:buFont typeface="Arial" pitchFamily="34" charset="0"/>
-              <a:buChar char="•"/>
-            </a:pPr>
-            <a:endParaRPr lang="en-GB" sz="2400" dirty="0" smtClean="0"/>
-          </a:p>
-          <a:p>
-            <a:pPr>
-              <a:buFont typeface="Arial" pitchFamily="34" charset="0"/>
-              <a:buChar char="•"/>
-            </a:pPr>
-            <a:r>
-              <a:rPr lang="en-GB" sz="2400" dirty="0" smtClean="0"/>
-              <a:t>Secondary objective: Avoid obstacles which may draw travelled distance to a halt. </a:t>
-            </a:r>
-          </a:p>
-          <a:p>
-            <a:pPr>
-              <a:buFont typeface="Arial" pitchFamily="34" charset="0"/>
-              <a:buChar char="•"/>
-            </a:pPr>
-            <a:endParaRPr lang="en-GB" sz="2400" dirty="0" smtClean="0"/>
-          </a:p>
-          <a:p>
-            <a:pPr>
-              <a:buFont typeface="Arial" pitchFamily="34" charset="0"/>
-              <a:buChar char="•"/>
-            </a:pPr>
-            <a:r>
-              <a:rPr lang="en-GB" sz="2400" dirty="0" smtClean="0"/>
-              <a:t>Players thrust using a twich mechanic. </a:t>
-            </a:r>
-          </a:p>
-          <a:p>
-            <a:pPr>
-              <a:buFont typeface="Arial" pitchFamily="34" charset="0"/>
-              <a:buChar char="•"/>
-            </a:pPr>
-            <a:endParaRPr lang="en-GB" sz="2400" dirty="0" smtClean="0"/>
-          </a:p>
-          <a:p>
-            <a:pPr>
-              <a:buFont typeface="Arial" pitchFamily="34" charset="0"/>
-              <a:buChar char="•"/>
-            </a:pPr>
-            <a:r>
-              <a:rPr lang="en-GB" sz="2400" dirty="0" smtClean="0"/>
-              <a:t>Working with trajectory, momentum and budgeting stamina allows for a strategic play. </a:t>
-            </a:r>
-          </a:p>
-        </p:txBody>
-      </p:sp>
-    </p:spTree>
-  </p:cSld>
-  <p:clrMapOvr>
-    <a:masterClrMapping/>
-  </p:clrMapOvr>
-  <p:timing>
-    <p:tnLst>
-      <p:par>
-        <p:cTn id="1" dur="indefinite" restart="never" nodeType="tmRoot"/>
-      </p:par>
-    </p:tnLst>
-  </p:timing>
-</p:sld>
-</file>
-
-<file path=ppt/slides/slide16.xml><?xml version="1.0" encoding="utf-8"?>
-<p:sld xmlns:a="http://schemas.openxmlformats.org/drawingml/2006/main" xmlns:r="http://schemas.openxmlformats.org/officeDocument/2006/relationships" xmlns:p="http://schemas.openxmlformats.org/presentationml/2006/main">
-  <p:cSld>
-    <p:spTree>
-      <p:nvGrpSpPr>
-        <p:cNvPr id="1" name=""/>
-        <p:cNvGrpSpPr/>
-        <p:nvPr/>
-      </p:nvGrpSpPr>
-      <p:grpSpPr>
-        <a:xfrm>
-          <a:off x="0" y="0"/>
-          <a:ext cx="0" cy="0"/>
-          <a:chOff x="0" y="0"/>
-          <a:chExt cx="0" cy="0"/>
-        </a:xfrm>
-      </p:grpSpPr>
-      <p:sp>
-        <p:nvSpPr>
-          <p:cNvPr id="4" name="TextBox 3"/>
-          <p:cNvSpPr txBox="1"/>
-          <p:nvPr/>
-        </p:nvSpPr>
-        <p:spPr>
-          <a:xfrm>
-            <a:off x="467544" y="620688"/>
-            <a:ext cx="8208912" cy="584775"/>
-          </a:xfrm>
-          <a:prstGeom prst="rect">
-            <a:avLst/>
-          </a:prstGeom>
-          <a:noFill/>
-        </p:spPr>
-        <p:txBody>
-          <a:bodyPr wrap="square" rtlCol="0">
-            <a:spAutoFit/>
-          </a:bodyPr>
-          <a:lstStyle/>
-          <a:p>
-            <a:pPr algn="ctr"/>
-            <a:r>
-              <a:rPr lang="en-GB" sz="3200" dirty="0" smtClean="0"/>
-              <a:t>Development specifications</a:t>
-            </a:r>
-            <a:endParaRPr lang="en-GB" sz="3200" dirty="0"/>
-          </a:p>
-        </p:txBody>
-      </p:sp>
-      <p:sp>
-        <p:nvSpPr>
-          <p:cNvPr id="3" name="TextBox 2"/>
-          <p:cNvSpPr txBox="1"/>
-          <p:nvPr/>
-        </p:nvSpPr>
-        <p:spPr>
-          <a:xfrm>
-            <a:off x="683568" y="1556792"/>
-            <a:ext cx="7992888" cy="2308324"/>
-          </a:xfrm>
-          <a:prstGeom prst="rect">
-            <a:avLst/>
-          </a:prstGeom>
-          <a:noFill/>
-        </p:spPr>
-        <p:txBody>
-          <a:bodyPr wrap="square" rtlCol="0">
-            <a:spAutoFit/>
-          </a:bodyPr>
-          <a:lstStyle/>
-          <a:p>
-            <a:pPr>
-              <a:buFont typeface="Arial" pitchFamily="34" charset="0"/>
-              <a:buChar char="•"/>
-            </a:pPr>
-            <a:r>
-              <a:rPr lang="en-GB" sz="2400" dirty="0" smtClean="0"/>
-              <a:t>Unity 2D </a:t>
-            </a:r>
-          </a:p>
-          <a:p>
-            <a:pPr>
-              <a:buFont typeface="Arial" pitchFamily="34" charset="0"/>
-              <a:buChar char="•"/>
-            </a:pPr>
-            <a:endParaRPr lang="en-GB" sz="2400" dirty="0" smtClean="0"/>
-          </a:p>
-          <a:p>
-            <a:pPr>
-              <a:buFont typeface="Arial" pitchFamily="34" charset="0"/>
-              <a:buChar char="•"/>
-            </a:pPr>
-            <a:r>
-              <a:rPr lang="en-GB" sz="2400" dirty="0" smtClean="0"/>
-              <a:t>MonoDevelop / Visual studios</a:t>
-            </a:r>
-          </a:p>
-          <a:p>
-            <a:r>
-              <a:rPr lang="en-GB" sz="2400" dirty="0" smtClean="0"/>
-              <a:t>  </a:t>
-            </a:r>
-          </a:p>
-          <a:p>
-            <a:pPr>
-              <a:buFont typeface="Arial" pitchFamily="34" charset="0"/>
-              <a:buChar char="•"/>
-            </a:pPr>
-            <a:r>
-              <a:rPr lang="en-GB" sz="2400" dirty="0" smtClean="0"/>
-              <a:t>Photoshop </a:t>
-            </a:r>
-          </a:p>
-          <a:p>
-            <a:pPr>
-              <a:buFont typeface="Arial" pitchFamily="34" charset="0"/>
-              <a:buChar char="•"/>
-            </a:pPr>
-            <a:endParaRPr lang="en-GB" sz="2400" dirty="0" smtClean="0"/>
-          </a:p>
-        </p:txBody>
-      </p:sp>
-    </p:spTree>
-  </p:cSld>
-  <p:clrMapOvr>
-    <a:masterClrMapping/>
-  </p:clrMapOvr>
-  <p:timing>
-    <p:tnLst>
-      <p:par>
-        <p:cTn id="1" dur="indefinite" restart="never" nodeType="tmRoot"/>
-      </p:par>
-    </p:tnLst>
-  </p:timing>
-</p:sld>
-</file>
-
-<file path=ppt/slides/slide17.xml><?xml version="1.0" encoding="utf-8"?>
-<p:sld xmlns:a="http://schemas.openxmlformats.org/drawingml/2006/main" xmlns:r="http://schemas.openxmlformats.org/officeDocument/2006/relationships" xmlns:p="http://schemas.openxmlformats.org/presentationml/2006/main">
-  <p:cSld>
-    <p:spTree>
-      <p:nvGrpSpPr>
-        <p:cNvPr id="1" name=""/>
-        <p:cNvGrpSpPr/>
-        <p:nvPr/>
-      </p:nvGrpSpPr>
-      <p:grpSpPr>
-        <a:xfrm>
-          <a:off x="0" y="0"/>
-          <a:ext cx="0" cy="0"/>
-          <a:chOff x="0" y="0"/>
-          <a:chExt cx="0" cy="0"/>
-        </a:xfrm>
-      </p:grpSpPr>
-      <p:sp>
-        <p:nvSpPr>
           <p:cNvPr id="2" name="Title 1"/>
           <p:cNvSpPr>
             <a:spLocks noGrp="1"/>
@@ -6878,7 +6445,7 @@
 </p:sld>
 </file>
 
-<file path=ppt/slides/slide18.xml><?xml version="1.0" encoding="utf-8"?>
+<file path=ppt/slides/slide16.xml><?xml version="1.0" encoding="utf-8"?>
 <p:sld xmlns:a="http://schemas.openxmlformats.org/drawingml/2006/main" xmlns:r="http://schemas.openxmlformats.org/officeDocument/2006/relationships" xmlns:p="http://schemas.openxmlformats.org/presentationml/2006/main">
   <p:cSld>
     <p:spTree>
@@ -7360,7 +6927,7 @@
 </p:sld>
 </file>
 
-<file path=ppt/slides/slide19.xml><?xml version="1.0" encoding="utf-8"?>
+<file path=ppt/slides/slide17.xml><?xml version="1.0" encoding="utf-8"?>
 <p:sld xmlns:a="http://schemas.openxmlformats.org/drawingml/2006/main" xmlns:r="http://schemas.openxmlformats.org/officeDocument/2006/relationships" xmlns:p="http://schemas.openxmlformats.org/presentationml/2006/main">
   <p:cSld>
     <p:spTree>
@@ -7385,7 +6952,7 @@
         </p:nvSpPr>
         <p:spPr>
           <a:xfrm>
-            <a:off x="971600" y="332656"/>
+            <a:off x="1043608" y="2612607"/>
             <a:ext cx="7200800" cy="830997"/>
           </a:xfrm>
           <a:prstGeom prst="rect">
@@ -7402,13 +6969,18 @@
             <a:pPr algn="ctr"/>
             <a:r>
               <a:rPr lang="en-GB" sz="4800" dirty="0" smtClean="0"/>
-              <a:t>Emails sent</a:t>
+              <a:t>Questions?</a:t>
             </a:r>
             <a:endParaRPr lang="en-GB" sz="4800" dirty="0"/>
           </a:p>
         </p:txBody>
       </p:sp>
     </p:spTree>
+    <p:extLst>
+      <p:ext uri="{BB962C8B-B14F-4D97-AF65-F5344CB8AC3E}">
+        <p14:creationId xmlns:p14="http://schemas.microsoft.com/office/powerpoint/2010/main" val="2473044283"/>
+      </p:ext>
+    </p:extLst>
   </p:cSld>
   <p:clrMapOvr>
     <a:masterClrMapping/>
@@ -7536,8 +7108,13 @@
           <a:p>
             <a:r>
               <a:rPr lang="en-GB" sz="3600" dirty="0" smtClean="0"/>
-              <a:t>Game Title CBA</a:t>
-            </a:r>
+              <a:t>Game Title </a:t>
+            </a:r>
+            <a:r>
+              <a:rPr lang="en-GB" sz="3600" dirty="0" smtClean="0"/>
+              <a:t>TBC</a:t>
+            </a:r>
+            <a:endParaRPr lang="en-GB" sz="3600" dirty="0" smtClean="0"/>
           </a:p>
           <a:p>
             <a:endParaRPr lang="en-GB" dirty="0"/>
@@ -8108,11 +7685,7 @@
                       </a:r>
                       <a:r>
                         <a:rPr lang="en-GB" baseline="0" dirty="0" smtClean="0"/>
-                        <a:t> </a:t>
-                      </a:r>
-                      <a:r>
-                        <a:rPr lang="en-GB" baseline="0" dirty="0" smtClean="0"/>
-                        <a:t>Specs: </a:t>
+                        <a:t> Specs: </a:t>
                       </a:r>
                       <a:endParaRPr lang="en-GB" dirty="0"/>
                     </a:p>
@@ -8611,11 +8184,7 @@
             <a:pPr algn="ctr"/>
             <a:r>
               <a:rPr lang="en-GB" sz="3200" dirty="0" smtClean="0"/>
-              <a:t>Moodboards and </a:t>
-            </a:r>
-            <a:r>
-              <a:rPr lang="en-GB" sz="3200" dirty="0" smtClean="0"/>
-              <a:t>concept </a:t>
+              <a:t>Moodboards and concept </a:t>
             </a:r>
             <a:endParaRPr lang="en-GB" sz="3200" dirty="0"/>
           </a:p>
@@ -8629,7 +8198,7 @@
           </p:cNvPicPr>
           <p:nvPr/>
         </p:nvPicPr>
-        <p:blipFill>
+        <p:blipFill rotWithShape="1">
           <a:blip r:embed="rId3" cstate="print">
             <a:extLst>
               <a:ext uri="{28A0092B-C50C-407E-A947-70E740481C1C}">
@@ -8637,14 +8206,13 @@
               </a:ext>
             </a:extLst>
           </a:blip>
-          <a:stretch>
-            <a:fillRect/>
-          </a:stretch>
+          <a:srcRect t="15496"/>
+          <a:stretch/>
         </p:blipFill>
         <p:spPr>
           <a:xfrm>
-            <a:off x="1291809" y="908720"/>
-            <a:ext cx="6560381" cy="5576324"/>
+            <a:off x="1291809" y="1340768"/>
+            <a:ext cx="6560381" cy="4712228"/>
           </a:xfrm>
           <a:prstGeom prst="rect">
             <a:avLst/>
@@ -8708,11 +8276,7 @@
             <a:pPr algn="ctr"/>
             <a:r>
               <a:rPr lang="en-GB" sz="3200" dirty="0" smtClean="0"/>
-              <a:t>Moodboards and </a:t>
-            </a:r>
-            <a:r>
-              <a:rPr lang="en-GB" sz="3200" dirty="0" smtClean="0"/>
-              <a:t>concept </a:t>
+              <a:t>Moodboards and concept </a:t>
             </a:r>
             <a:endParaRPr lang="en-GB" sz="3200" dirty="0"/>
           </a:p>
@@ -8726,7 +8290,7 @@
           </p:cNvPicPr>
           <p:nvPr/>
         </p:nvPicPr>
-        <p:blipFill>
+        <p:blipFill rotWithShape="1">
           <a:blip r:embed="rId3" cstate="print">
             <a:extLst>
               <a:ext uri="{28A0092B-C50C-407E-A947-70E740481C1C}">
@@ -8734,14 +8298,42 @@
               </a:ext>
             </a:extLst>
           </a:blip>
-          <a:stretch>
-            <a:fillRect/>
-          </a:stretch>
+          <a:srcRect t="12045"/>
+          <a:stretch/>
         </p:blipFill>
         <p:spPr>
           <a:xfrm>
-            <a:off x="971600" y="701407"/>
-            <a:ext cx="7382594" cy="5906075"/>
+            <a:off x="2123728" y="1268760"/>
+            <a:ext cx="4605123" cy="3240360"/>
+          </a:xfrm>
+          <a:prstGeom prst="rect">
+            <a:avLst/>
+          </a:prstGeom>
+        </p:spPr>
+      </p:pic>
+      <p:pic>
+        <p:nvPicPr>
+          <p:cNvPr id="6" name="Picture 5"/>
+          <p:cNvPicPr>
+            <a:picLocks noChangeAspect="1"/>
+          </p:cNvPicPr>
+          <p:nvPr/>
+        </p:nvPicPr>
+        <p:blipFill rotWithShape="1">
+          <a:blip r:embed="rId4" cstate="print">
+            <a:extLst>
+              <a:ext uri="{28A0092B-C50C-407E-A947-70E740481C1C}">
+                <a14:useLocalDpi xmlns:a14="http://schemas.microsoft.com/office/drawing/2010/main" val="0"/>
+              </a:ext>
+            </a:extLst>
+          </a:blip>
+          <a:srcRect t="12980"/>
+          <a:stretch/>
+        </p:blipFill>
+        <p:spPr>
+          <a:xfrm>
+            <a:off x="2138455" y="4509120"/>
+            <a:ext cx="4590396" cy="1435201"/>
           </a:xfrm>
           <a:prstGeom prst="rect">
             <a:avLst/>
@@ -8810,52 +8402,125 @@
             <a:pPr algn="ctr"/>
             <a:r>
               <a:rPr lang="en-GB" sz="3200" dirty="0" smtClean="0"/>
-              <a:t>Moodboards and </a:t>
-            </a:r>
-            <a:r>
-              <a:rPr lang="en-GB" sz="3200" dirty="0" smtClean="0"/>
-              <a:t>concept </a:t>
+              <a:t>Game play and apperence </a:t>
             </a:r>
             <a:endParaRPr lang="en-GB" sz="3200" dirty="0"/>
           </a:p>
         </p:txBody>
       </p:sp>
-      <p:pic>
-        <p:nvPicPr>
-          <p:cNvPr id="2" name="Picture 1"/>
-          <p:cNvPicPr>
-            <a:picLocks noChangeAspect="1"/>
-          </p:cNvPicPr>
+      <p:sp>
+        <p:nvSpPr>
+          <p:cNvPr id="6" name="TextBox 5"/>
+          <p:cNvSpPr txBox="1"/>
           <p:nvPr/>
-        </p:nvPicPr>
-        <p:blipFill>
-          <a:blip r:embed="rId3" cstate="print">
-            <a:extLst>
-              <a:ext uri="{28A0092B-C50C-407E-A947-70E740481C1C}">
-                <a14:useLocalDpi xmlns:a14="http://schemas.microsoft.com/office/drawing/2010/main" val="0"/>
-              </a:ext>
-            </a:extLst>
-          </a:blip>
-          <a:stretch>
-            <a:fillRect/>
-          </a:stretch>
-        </p:blipFill>
+        </p:nvSpPr>
         <p:spPr>
           <a:xfrm>
-            <a:off x="0" y="1775673"/>
-            <a:ext cx="9144000" cy="3306654"/>
+            <a:off x="539552" y="2924944"/>
+            <a:ext cx="7992888" cy="2677656"/>
+          </a:xfrm>
+          <a:prstGeom prst="rect">
+            <a:avLst/>
+          </a:prstGeom>
+          <a:noFill/>
+        </p:spPr>
+        <p:txBody>
+          <a:bodyPr wrap="square" rtlCol="0">
+            <a:spAutoFit/>
+          </a:bodyPr>
+          <a:lstStyle/>
+          <a:p>
+            <a:pPr>
+              <a:buFont typeface="Arial" pitchFamily="34" charset="0"/>
+              <a:buChar char="•"/>
+            </a:pPr>
+            <a:r>
+              <a:rPr lang="en-GB" sz="2400"/>
+              <a:t>Action, physics, adversary, turn based game. </a:t>
+            </a:r>
+          </a:p>
+          <a:p>
+            <a:pPr>
+              <a:buFont typeface="Arial" pitchFamily="34" charset="0"/>
+              <a:buChar char="•"/>
+            </a:pPr>
+            <a:endParaRPr lang="en-GB" sz="2400"/>
+          </a:p>
+          <a:p>
+            <a:pPr>
+              <a:buFont typeface="Arial" pitchFamily="34" charset="0"/>
+              <a:buChar char="•"/>
+            </a:pPr>
+            <a:r>
+              <a:rPr lang="en-GB" sz="2400"/>
+              <a:t>Main gameplay will take place on landscape 2D overworld.  </a:t>
+            </a:r>
+          </a:p>
+          <a:p>
+            <a:pPr>
+              <a:buFont typeface="Arial" pitchFamily="34" charset="0"/>
+              <a:buChar char="•"/>
+            </a:pPr>
+            <a:endParaRPr lang="en-GB" sz="2400"/>
+          </a:p>
+          <a:p>
+            <a:pPr>
+              <a:buFont typeface="Arial" pitchFamily="34" charset="0"/>
+              <a:buChar char="•"/>
+            </a:pPr>
+            <a:r>
+              <a:rPr lang="en-GB" sz="2400"/>
+              <a:t>Using the catapult, players can adjust the trajectory and momentum of the flightless birds in order to travel the furthest distance. </a:t>
+            </a:r>
+            <a:endParaRPr lang="en-GB" sz="2400" dirty="0"/>
+          </a:p>
+        </p:txBody>
+      </p:sp>
+      <p:sp>
+        <p:nvSpPr>
+          <p:cNvPr id="8" name="Rectangle 7"/>
+          <p:cNvSpPr/>
+          <p:nvPr/>
+        </p:nvSpPr>
+        <p:spPr>
+          <a:xfrm>
+            <a:off x="539552" y="1556792"/>
+            <a:ext cx="7992888" cy="1224136"/>
           </a:xfrm>
           <a:prstGeom prst="rect">
             <a:avLst/>
           </a:prstGeom>
         </p:spPr>
-      </p:pic>
+        <p:style>
+          <a:lnRef idx="2">
+            <a:schemeClr val="accent1">
+              <a:shade val="50000"/>
+            </a:schemeClr>
+          </a:lnRef>
+          <a:fillRef idx="1">
+            <a:schemeClr val="accent1"/>
+          </a:fillRef>
+          <a:effectRef idx="0">
+            <a:schemeClr val="accent1"/>
+          </a:effectRef>
+          <a:fontRef idx="minor">
+            <a:schemeClr val="lt1"/>
+          </a:fontRef>
+        </p:style>
+        <p:txBody>
+          <a:bodyPr rtlCol="0" anchor="ctr"/>
+          <a:lstStyle/>
+          <a:p>
+            <a:pPr algn="ctr"/>
+            <a:r>
+              <a:rPr lang="en-GB" dirty="0" smtClean="0"/>
+              <a:t>Prototype Showcase</a:t>
+            </a:r>
+            <a:endParaRPr lang="en-GB" dirty="0"/>
+          </a:p>
+        </p:txBody>
+      </p:sp>
     </p:spTree>
-    <p:extLst>
-      <p:ext uri="{BB962C8B-B14F-4D97-AF65-F5344CB8AC3E}">
-        <p14:creationId xmlns:p14="http://schemas.microsoft.com/office/powerpoint/2010/main" val="101037927"/>
-      </p:ext>
-    </p:extLst>
   </p:cSld>
   <p:clrMapOvr>
     <a:masterClrMapping/>
@@ -8926,8 +8591,8 @@
         </p:nvSpPr>
         <p:spPr>
           <a:xfrm>
-            <a:off x="539552" y="2924944"/>
-            <a:ext cx="7992888" cy="2677656"/>
+            <a:off x="539552" y="2703016"/>
+            <a:ext cx="7992888" cy="4154984"/>
           </a:xfrm>
           <a:prstGeom prst="rect">
             <a:avLst/>
@@ -8945,8 +8610,8 @@
               <a:buChar char="•"/>
             </a:pPr>
             <a:r>
-              <a:rPr lang="en-GB" sz="2400" dirty="0" smtClean="0"/>
-              <a:t>Action, phyics, adversray, turn based game. </a:t>
+              <a:rPr lang="en-GB" sz="2400"/>
+              <a:t>Players can use the stamina to either thrust bird upwards or forwards. </a:t>
             </a:r>
           </a:p>
           <a:p>
@@ -8954,7 +8619,7 @@
               <a:buFont typeface="Arial" pitchFamily="34" charset="0"/>
               <a:buChar char="•"/>
             </a:pPr>
-            <a:endParaRPr lang="en-GB" sz="2400" dirty="0" smtClean="0"/>
+            <a:endParaRPr lang="en-GB" sz="2400"/>
           </a:p>
           <a:p>
             <a:pPr>
@@ -8962,8 +8627,8 @@
               <a:buChar char="•"/>
             </a:pPr>
             <a:r>
-              <a:rPr lang="en-GB" sz="2400" dirty="0" smtClean="0"/>
-              <a:t>Main gameplay will take place on landscape 2D overworld.  </a:t>
+              <a:rPr lang="en-GB" sz="2400"/>
+              <a:t>Thrusting forwards allows the bird to travel higher, thereby increasing the momentum of eventual impact. </a:t>
             </a:r>
           </a:p>
           <a:p>
@@ -8971,7 +8636,7 @@
               <a:buFont typeface="Arial" pitchFamily="34" charset="0"/>
               <a:buChar char="•"/>
             </a:pPr>
-            <a:endParaRPr lang="en-GB" sz="2400" dirty="0" smtClean="0"/>
+            <a:endParaRPr lang="en-GB" sz="2400"/>
           </a:p>
           <a:p>
             <a:pPr>
@@ -8979,8 +8644,25 @@
               <a:buChar char="•"/>
             </a:pPr>
             <a:r>
-              <a:rPr lang="en-GB" sz="2400" dirty="0" smtClean="0"/>
-              <a:t>Using the catapult, players can ajust tjhe trajectory and momentum of the flightless birds in order to travel the furthest distance. </a:t>
+              <a:rPr lang="en-GB" sz="2400"/>
+              <a:t>Players can trust be repeatedly pressing the allocated keys, which in turn causes a twitch mechanic.</a:t>
+            </a:r>
+          </a:p>
+          <a:p>
+            <a:pPr>
+              <a:buFont typeface="Arial" pitchFamily="34" charset="0"/>
+              <a:buChar char="•"/>
+            </a:pPr>
+            <a:endParaRPr lang="en-GB" sz="2400"/>
+          </a:p>
+          <a:p>
+            <a:pPr>
+              <a:buFont typeface="Arial" pitchFamily="34" charset="0"/>
+              <a:buChar char="•"/>
+            </a:pPr>
+            <a:r>
+              <a:rPr lang="en-GB" sz="2400"/>
+              <a:t>The larger the momentum upon impact, the further the bird will recoil. </a:t>
             </a:r>
             <a:endParaRPr lang="en-GB" sz="2400" dirty="0"/>
           </a:p>
@@ -8994,7 +8676,7 @@
         </p:nvSpPr>
         <p:spPr>
           <a:xfrm>
-            <a:off x="539552" y="1556792"/>
+            <a:off x="539552" y="1334864"/>
             <a:ext cx="7992888" cy="1224136"/>
           </a:xfrm>
           <a:prstGeom prst="rect">
@@ -9003,15 +8685,15 @@
         </p:spPr>
         <p:style>
           <a:lnRef idx="2">
-            <a:schemeClr val="accent1">
+            <a:schemeClr val="accent5">
               <a:shade val="50000"/>
             </a:schemeClr>
           </a:lnRef>
           <a:fillRef idx="1">
-            <a:schemeClr val="accent1"/>
+            <a:schemeClr val="accent5"/>
           </a:fillRef>
           <a:effectRef idx="0">
-            <a:schemeClr val="accent1"/>
+            <a:schemeClr val="accent5"/>
           </a:effectRef>
           <a:fontRef idx="minor">
             <a:schemeClr val="lt1"/>

</xml_diff>